<commit_message>
Add slides to concepts 2
</commit_message>
<xml_diff>
--- a/2018/python/Python Programming Concepts II.pptx
+++ b/2018/python/Python Programming Concepts II.pptx
@@ -7,7 +7,7 @@
     <p:sldMasterId id="2147483666" r:id="rId3"/>
   </p:sldMasterIdLst>
   <p:notesMasterIdLst>
-    <p:notesMasterId r:id="rId45"/>
+    <p:notesMasterId r:id="rId49"/>
   </p:notesMasterIdLst>
   <p:sldIdLst>
     <p:sldId id="256" r:id="rId4"/>
@@ -26,31 +26,35 @@
     <p:sldId id="261" r:id="rId17"/>
     <p:sldId id="262" r:id="rId18"/>
     <p:sldId id="263" r:id="rId19"/>
-    <p:sldId id="264" r:id="rId20"/>
-    <p:sldId id="265" r:id="rId21"/>
-    <p:sldId id="266" r:id="rId22"/>
-    <p:sldId id="267" r:id="rId23"/>
-    <p:sldId id="268" r:id="rId24"/>
-    <p:sldId id="269" r:id="rId25"/>
-    <p:sldId id="270" r:id="rId26"/>
-    <p:sldId id="271" r:id="rId27"/>
-    <p:sldId id="272" r:id="rId28"/>
-    <p:sldId id="273" r:id="rId29"/>
-    <p:sldId id="274" r:id="rId30"/>
-    <p:sldId id="278" r:id="rId31"/>
-    <p:sldId id="279" r:id="rId32"/>
-    <p:sldId id="282" r:id="rId33"/>
-    <p:sldId id="294" r:id="rId34"/>
-    <p:sldId id="283" r:id="rId35"/>
-    <p:sldId id="284" r:id="rId36"/>
-    <p:sldId id="285" r:id="rId37"/>
-    <p:sldId id="286" r:id="rId38"/>
-    <p:sldId id="287" r:id="rId39"/>
-    <p:sldId id="288" r:id="rId40"/>
-    <p:sldId id="289" r:id="rId41"/>
-    <p:sldId id="290" r:id="rId42"/>
-    <p:sldId id="291" r:id="rId43"/>
-    <p:sldId id="292" r:id="rId44"/>
+    <p:sldId id="303" r:id="rId20"/>
+    <p:sldId id="264" r:id="rId21"/>
+    <p:sldId id="265" r:id="rId22"/>
+    <p:sldId id="266" r:id="rId23"/>
+    <p:sldId id="267" r:id="rId24"/>
+    <p:sldId id="268" r:id="rId25"/>
+    <p:sldId id="269" r:id="rId26"/>
+    <p:sldId id="270" r:id="rId27"/>
+    <p:sldId id="271" r:id="rId28"/>
+    <p:sldId id="272" r:id="rId29"/>
+    <p:sldId id="273" r:id="rId30"/>
+    <p:sldId id="274" r:id="rId31"/>
+    <p:sldId id="278" r:id="rId32"/>
+    <p:sldId id="279" r:id="rId33"/>
+    <p:sldId id="282" r:id="rId34"/>
+    <p:sldId id="294" r:id="rId35"/>
+    <p:sldId id="283" r:id="rId36"/>
+    <p:sldId id="284" r:id="rId37"/>
+    <p:sldId id="285" r:id="rId38"/>
+    <p:sldId id="304" r:id="rId39"/>
+    <p:sldId id="286" r:id="rId40"/>
+    <p:sldId id="287" r:id="rId41"/>
+    <p:sldId id="288" r:id="rId42"/>
+    <p:sldId id="305" r:id="rId43"/>
+    <p:sldId id="289" r:id="rId44"/>
+    <p:sldId id="290" r:id="rId45"/>
+    <p:sldId id="291" r:id="rId46"/>
+    <p:sldId id="306" r:id="rId47"/>
+    <p:sldId id="292" r:id="rId48"/>
   </p:sldIdLst>
   <p:sldSz cx="9144000" cy="6858000" type="screen4x3"/>
   <p:notesSz cx="6858000" cy="9144000"/>
@@ -267,7 +271,7 @@
   </p:defaultTextStyle>
   <p:extLst>
     <p:ext uri="{EFAFB233-063F-42B5-8137-9DF3F51BA10A}">
-      <p15:sldGuideLst xmlns="" xmlns:p15="http://schemas.microsoft.com/office/powerpoint/2012/main">
+      <p15:sldGuideLst xmlns:p15="http://schemas.microsoft.com/office/powerpoint/2012/main" xmlns="">
         <p15:guide id="1" orient="horz" pos="2160">
           <p15:clr>
             <a:srgbClr val="A4A3A4"/>
@@ -13038,6 +13042,98 @@
   <p:cSld>
     <p:spTree>
       <p:nvGrpSpPr>
+        <p:cNvPr id="1" name=""/>
+        <p:cNvGrpSpPr/>
+        <p:nvPr/>
+      </p:nvGrpSpPr>
+      <p:grpSpPr>
+        <a:xfrm>
+          <a:off x="0" y="0"/>
+          <a:ext cx="0" cy="0"/>
+          <a:chOff x="0" y="0"/>
+          <a:chExt cx="0" cy="0"/>
+        </a:xfrm>
+      </p:grpSpPr>
+      <p:sp>
+        <p:nvSpPr>
+          <p:cNvPr id="2" name="Title 1"/>
+          <p:cNvSpPr>
+            <a:spLocks noGrp="1"/>
+          </p:cNvSpPr>
+          <p:nvPr>
+            <p:ph type="title"/>
+          </p:nvPr>
+        </p:nvSpPr>
+        <p:spPr/>
+        <p:txBody>
+          <a:bodyPr/>
+          <a:lstStyle/>
+          <a:p>
+            <a:endParaRPr lang="en-US"/>
+          </a:p>
+        </p:txBody>
+      </p:sp>
+      <p:sp>
+        <p:nvSpPr>
+          <p:cNvPr id="3" name="Text Placeholder 2"/>
+          <p:cNvSpPr>
+            <a:spLocks noGrp="1"/>
+          </p:cNvSpPr>
+          <p:nvPr>
+            <p:ph type="body" idx="1"/>
+          </p:nvPr>
+        </p:nvSpPr>
+        <p:spPr/>
+        <p:txBody>
+          <a:bodyPr/>
+          <a:lstStyle/>
+          <a:p>
+            <a:endParaRPr lang="en-US" dirty="0"/>
+          </a:p>
+        </p:txBody>
+      </p:sp>
+      <p:pic>
+        <p:nvPicPr>
+          <p:cNvPr id="4" name="Picture 3"/>
+          <p:cNvPicPr>
+            <a:picLocks noChangeAspect="1"/>
+          </p:cNvPicPr>
+          <p:nvPr/>
+        </p:nvPicPr>
+        <p:blipFill>
+          <a:blip r:embed="rId2"/>
+          <a:stretch>
+            <a:fillRect/>
+          </a:stretch>
+        </p:blipFill>
+        <p:spPr>
+          <a:xfrm>
+            <a:off x="1809119" y="666119"/>
+            <a:ext cx="5525763" cy="5525763"/>
+          </a:xfrm>
+          <a:prstGeom prst="rect">
+            <a:avLst/>
+          </a:prstGeom>
+        </p:spPr>
+      </p:pic>
+    </p:spTree>
+    <p:extLst>
+      <p:ext uri="{BB962C8B-B14F-4D97-AF65-F5344CB8AC3E}">
+        <p14:creationId xmlns:p14="http://schemas.microsoft.com/office/powerpoint/2010/main" val="1774815290"/>
+      </p:ext>
+    </p:extLst>
+  </p:cSld>
+  <p:clrMapOvr>
+    <a:masterClrMapping/>
+  </p:clrMapOvr>
+</p:sld>
+</file>
+
+<file path=ppt/slides/slide18.xml><?xml version="1.0" encoding="utf-8"?>
+<p:sld xmlns:a="http://schemas.openxmlformats.org/drawingml/2006/main" xmlns:r="http://schemas.openxmlformats.org/officeDocument/2006/relationships" xmlns:p="http://schemas.openxmlformats.org/presentationml/2006/main">
+  <p:cSld>
+    <p:spTree>
+      <p:nvGrpSpPr>
         <p:cNvPr id="1" name="Shape 98"/>
         <p:cNvGrpSpPr/>
         <p:nvPr/>
@@ -13513,7 +13609,7 @@
 </p:sld>
 </file>
 
-<file path=ppt/slides/slide18.xml><?xml version="1.0" encoding="utf-8"?>
+<file path=ppt/slides/slide19.xml><?xml version="1.0" encoding="utf-8"?>
 <p:sld xmlns:a="http://schemas.openxmlformats.org/drawingml/2006/main" xmlns:r="http://schemas.openxmlformats.org/officeDocument/2006/relationships" xmlns:p="http://schemas.openxmlformats.org/presentationml/2006/main">
   <p:cSld>
     <p:spTree>
@@ -14438,496 +14534,6 @@
               <a:buNone/>
             </a:pPr>
             <a:endParaRPr dirty="0"/>
-          </a:p>
-        </p:txBody>
-      </p:sp>
-    </p:spTree>
-  </p:cSld>
-  <p:clrMapOvr>
-    <a:masterClrMapping/>
-  </p:clrMapOvr>
-  <p:transition xmlns:p14="http://schemas.microsoft.com/office/powerpoint/2010/main" spd="slow">
-    <p:cut/>
-  </p:transition>
-  <p:timing>
-    <p:tnLst>
-      <p:par>
-        <p:cTn xmlns:p14="http://schemas.microsoft.com/office/powerpoint/2010/main" id="1" dur="indefinite" restart="never" nodeType="tmRoot"/>
-      </p:par>
-    </p:tnLst>
-  </p:timing>
-</p:sld>
-</file>
-
-<file path=ppt/slides/slide19.xml><?xml version="1.0" encoding="utf-8"?>
-<p:sld xmlns:a="http://schemas.openxmlformats.org/drawingml/2006/main" xmlns:r="http://schemas.openxmlformats.org/officeDocument/2006/relationships" xmlns:p="http://schemas.openxmlformats.org/presentationml/2006/main">
-  <p:cSld>
-    <p:spTree>
-      <p:nvGrpSpPr>
-        <p:cNvPr id="1" name="Shape 110"/>
-        <p:cNvGrpSpPr/>
-        <p:nvPr/>
-      </p:nvGrpSpPr>
-      <p:grpSpPr>
-        <a:xfrm>
-          <a:off x="0" y="0"/>
-          <a:ext cx="0" cy="0"/>
-          <a:chOff x="0" y="0"/>
-          <a:chExt cx="0" cy="0"/>
-        </a:xfrm>
-      </p:grpSpPr>
-      <p:sp>
-        <p:nvSpPr>
-          <p:cNvPr id="111" name="Shape 111"/>
-          <p:cNvSpPr txBox="1">
-            <a:spLocks noGrp="1"/>
-          </p:cNvSpPr>
-          <p:nvPr>
-            <p:ph type="title"/>
-          </p:nvPr>
-        </p:nvSpPr>
-        <p:spPr>
-          <a:xfrm>
-            <a:off x="457200" y="274637"/>
-            <a:ext cx="8229600" cy="1143000"/>
-          </a:xfrm>
-          <a:prstGeom prst="rect">
-            <a:avLst/>
-          </a:prstGeom>
-        </p:spPr>
-        <p:txBody>
-          <a:bodyPr lIns="91425" tIns="91425" rIns="91425" bIns="91425" anchor="b" anchorCtr="0">
-            <a:noAutofit/>
-          </a:bodyPr>
-          <a:lstStyle/>
-          <a:p>
-            <a:pPr>
-              <a:spcBef>
-                <a:spcPts val="0"/>
-              </a:spcBef>
-              <a:buNone/>
-            </a:pPr>
-            <a:r>
-              <a:rPr lang="en" sz="7200" dirty="0">
-                <a:solidFill>
-                  <a:srgbClr val="FF0000"/>
-                </a:solidFill>
-                <a:latin typeface="Yanone Kaffeesatz Bold"/>
-                <a:cs typeface="Yanone Kaffeesatz Bold"/>
-                <a:sym typeface="Ubuntu"/>
-              </a:rPr>
-              <a:t>Fun</a:t>
-            </a:r>
-            <a:r>
-              <a:rPr lang="en" b="0" dirty="0">
-                <a:latin typeface="Ubuntu"/>
-                <a:ea typeface="Ubuntu"/>
-                <a:cs typeface="Ubuntu"/>
-                <a:sym typeface="Ubuntu"/>
-              </a:rPr>
-              <a:t> </a:t>
-            </a:r>
-            <a:r>
-              <a:rPr lang="en" sz="7200" dirty="0" smtClean="0">
-                <a:solidFill>
-                  <a:srgbClr val="FF0000"/>
-                </a:solidFill>
-                <a:latin typeface="Yanone Kaffeesatz Bold"/>
-                <a:cs typeface="Yanone Kaffeesatz Bold"/>
-                <a:sym typeface="Ubuntu"/>
-              </a:rPr>
-              <a:t>with Lists</a:t>
-            </a:r>
-            <a:endParaRPr lang="en" sz="7200" dirty="0">
-              <a:solidFill>
-                <a:srgbClr val="FF0000"/>
-              </a:solidFill>
-              <a:latin typeface="Yanone Kaffeesatz Bold"/>
-              <a:cs typeface="Yanone Kaffeesatz Bold"/>
-              <a:sym typeface="Ubuntu"/>
-            </a:endParaRPr>
-          </a:p>
-        </p:txBody>
-      </p:sp>
-      <p:sp>
-        <p:nvSpPr>
-          <p:cNvPr id="112" name="Shape 112"/>
-          <p:cNvSpPr txBox="1">
-            <a:spLocks noGrp="1"/>
-          </p:cNvSpPr>
-          <p:nvPr>
-            <p:ph type="body" idx="1"/>
-          </p:nvPr>
-        </p:nvSpPr>
-        <p:spPr>
-          <a:xfrm>
-            <a:off x="457200" y="1600200"/>
-            <a:ext cx="8229600" cy="4967700"/>
-          </a:xfrm>
-          <a:prstGeom prst="rect">
-            <a:avLst/>
-          </a:prstGeom>
-        </p:spPr>
-        <p:txBody>
-          <a:bodyPr lIns="91425" tIns="91425" rIns="91425" bIns="91425" anchor="t" anchorCtr="0">
-            <a:noAutofit/>
-          </a:bodyPr>
-          <a:lstStyle/>
-          <a:p>
-            <a:pPr lvl="0" rtl="0">
-              <a:spcBef>
-                <a:spcPts val="0"/>
-              </a:spcBef>
-              <a:buNone/>
-            </a:pPr>
-            <a:r>
-              <a:rPr lang="en" sz="2400" dirty="0" smtClean="0">
-                <a:solidFill>
-                  <a:srgbClr val="000000"/>
-                </a:solidFill>
-                <a:latin typeface="Menlo Regular"/>
-                <a:ea typeface="Menlo Regular"/>
-                <a:cs typeface="Menlo Regular"/>
-                <a:sym typeface="Courier New"/>
-              </a:rPr>
-              <a:t>list.append(item)	</a:t>
-            </a:r>
-            <a:r>
-              <a:rPr lang="en" sz="2400" dirty="0" smtClean="0">
-                <a:solidFill>
-                  <a:srgbClr val="000000"/>
-                </a:solidFill>
-              </a:rPr>
-              <a:t># add item to end of list</a:t>
-            </a:r>
-            <a:endParaRPr lang="en" sz="2400" dirty="0">
-              <a:solidFill>
-                <a:srgbClr val="000000"/>
-              </a:solidFill>
-            </a:endParaRPr>
-          </a:p>
-          <a:p>
-            <a:pPr lvl="0" rtl="0">
-              <a:spcBef>
-                <a:spcPts val="0"/>
-              </a:spcBef>
-              <a:buNone/>
-            </a:pPr>
-            <a:r>
-              <a:rPr lang="en" sz="2400" dirty="0" smtClean="0">
-                <a:solidFill>
-                  <a:srgbClr val="000000"/>
-                </a:solidFill>
-                <a:latin typeface="Menlo Regular"/>
-                <a:ea typeface="Menlo Regular"/>
-                <a:cs typeface="Menlo Regular"/>
-                <a:sym typeface="Courier New"/>
-              </a:rPr>
-              <a:t>list.index(item)	</a:t>
-            </a:r>
-            <a:r>
-              <a:rPr lang="en" sz="2400" dirty="0" smtClean="0">
-                <a:solidFill>
-                  <a:srgbClr val="000000"/>
-                </a:solidFill>
-              </a:rPr>
-              <a:t># searches for item and gives its index</a:t>
-            </a:r>
-            <a:endParaRPr lang="en" sz="2400" dirty="0">
-              <a:solidFill>
-                <a:srgbClr val="000000"/>
-              </a:solidFill>
-            </a:endParaRPr>
-          </a:p>
-          <a:p>
-            <a:pPr lvl="0" rtl="0">
-              <a:spcBef>
-                <a:spcPts val="0"/>
-              </a:spcBef>
-              <a:buNone/>
-            </a:pPr>
-            <a:r>
-              <a:rPr lang="en" sz="2400" dirty="0" smtClean="0">
-                <a:solidFill>
-                  <a:srgbClr val="000000"/>
-                </a:solidFill>
-                <a:latin typeface="Menlo Regular"/>
-                <a:ea typeface="Menlo Regular"/>
-                <a:cs typeface="Menlo Regular"/>
-                <a:sym typeface="Courier New"/>
-              </a:rPr>
-              <a:t>list.remove(item)</a:t>
-            </a:r>
-            <a:r>
-              <a:rPr lang="en-US" sz="2400" dirty="0" smtClean="0">
-                <a:solidFill>
-                  <a:srgbClr val="000000"/>
-                </a:solidFill>
-                <a:latin typeface="Menlo Regular"/>
-                <a:ea typeface="Menlo Regular"/>
-                <a:cs typeface="Menlo Regular"/>
-                <a:sym typeface="Courier New"/>
-              </a:rPr>
-              <a:t>	</a:t>
-            </a:r>
-            <a:r>
-              <a:rPr lang="en" sz="2400" dirty="0" smtClean="0">
-                <a:solidFill>
-                  <a:srgbClr val="000000"/>
-                </a:solidFill>
-              </a:rPr>
-              <a:t># removes first item of that name</a:t>
-            </a:r>
-            <a:endParaRPr lang="en" sz="2400" dirty="0">
-              <a:solidFill>
-                <a:srgbClr val="000000"/>
-              </a:solidFill>
-            </a:endParaRPr>
-          </a:p>
-          <a:p>
-            <a:pPr lvl="0">
-              <a:buNone/>
-            </a:pPr>
-            <a:r>
-              <a:rPr lang="en-US" sz="2400" dirty="0">
-                <a:solidFill>
-                  <a:srgbClr val="000000"/>
-                </a:solidFill>
-                <a:latin typeface="Menlo Regular"/>
-                <a:ea typeface="Menlo Regular"/>
-                <a:cs typeface="Menlo Regular"/>
-                <a:sym typeface="Courier New"/>
-              </a:rPr>
-              <a:t>l</a:t>
-            </a:r>
-            <a:r>
-              <a:rPr lang="en" sz="2400" dirty="0">
-                <a:solidFill>
-                  <a:srgbClr val="000000"/>
-                </a:solidFill>
-                <a:latin typeface="Menlo Regular"/>
-                <a:ea typeface="Menlo Regular"/>
-                <a:cs typeface="Menlo Regular"/>
-                <a:sym typeface="Courier New"/>
-              </a:rPr>
-              <a:t>ist.reverse</a:t>
-            </a:r>
-            <a:r>
-              <a:rPr lang="en" sz="2400" dirty="0">
-                <a:solidFill>
-                  <a:srgbClr val="000000"/>
-                </a:solidFill>
-                <a:ea typeface="Menlo Regular"/>
-                <a:cs typeface="Menlo Regular"/>
-              </a:rPr>
-              <a:t>()</a:t>
-            </a:r>
-            <a:r>
-              <a:rPr lang="en" sz="2400" dirty="0">
-                <a:solidFill>
-                  <a:srgbClr val="000000"/>
-                </a:solidFill>
-              </a:rPr>
-              <a:t> 		# reverses the order of a list</a:t>
-            </a:r>
-            <a:endParaRPr lang="en-US" sz="2400" dirty="0" smtClean="0">
-              <a:solidFill>
-                <a:srgbClr val="000000"/>
-              </a:solidFill>
-              <a:latin typeface="Menlo Regular"/>
-              <a:ea typeface="Menlo Regular"/>
-              <a:cs typeface="Menlo Regular"/>
-              <a:sym typeface="Courier New"/>
-            </a:endParaRPr>
-          </a:p>
-          <a:p>
-            <a:pPr lvl="0" rtl="0">
-              <a:spcBef>
-                <a:spcPts val="0"/>
-              </a:spcBef>
-              <a:buNone/>
-            </a:pPr>
-            <a:r>
-              <a:rPr lang="en-US" sz="2400" dirty="0" err="1" smtClean="0">
-                <a:solidFill>
-                  <a:srgbClr val="000000"/>
-                </a:solidFill>
-                <a:latin typeface="Menlo Regular"/>
-                <a:ea typeface="Menlo Regular"/>
-                <a:cs typeface="Menlo Regular"/>
-                <a:sym typeface="Courier New"/>
-              </a:rPr>
-              <a:t>len</a:t>
-            </a:r>
-            <a:r>
-              <a:rPr lang="en-US" sz="2400" dirty="0" smtClean="0">
-                <a:solidFill>
-                  <a:srgbClr val="000000"/>
-                </a:solidFill>
-                <a:latin typeface="Menlo Regular"/>
-                <a:ea typeface="Menlo Regular"/>
-                <a:cs typeface="Menlo Regular"/>
-                <a:sym typeface="Courier New"/>
-              </a:rPr>
-              <a:t>(</a:t>
-            </a:r>
-            <a:r>
-              <a:rPr lang="en" sz="2400" dirty="0" smtClean="0">
-                <a:solidFill>
-                  <a:srgbClr val="000000"/>
-                </a:solidFill>
-                <a:latin typeface="Menlo Regular"/>
-                <a:ea typeface="Menlo Regular"/>
-                <a:cs typeface="Menlo Regular"/>
-                <a:sym typeface="Courier New"/>
-              </a:rPr>
-              <a:t>list)	</a:t>
-            </a:r>
-            <a:r>
-              <a:rPr lang="en" sz="2400" dirty="0" smtClean="0">
-                <a:solidFill>
-                  <a:srgbClr val="000000"/>
-                </a:solidFill>
-              </a:rPr>
-              <a:t>    	# gives number of items in list</a:t>
-            </a:r>
-            <a:endParaRPr lang="en" sz="2400" dirty="0">
-              <a:solidFill>
-                <a:srgbClr val="000000"/>
-              </a:solidFill>
-            </a:endParaRPr>
-          </a:p>
-          <a:p>
-            <a:pPr lvl="0" rtl="0">
-              <a:spcBef>
-                <a:spcPts val="0"/>
-              </a:spcBef>
-              <a:buNone/>
-            </a:pPr>
-            <a:r>
-              <a:rPr lang="en" sz="2400" dirty="0" smtClean="0">
-                <a:solidFill>
-                  <a:srgbClr val="000000"/>
-                </a:solidFill>
-              </a:rPr>
-              <a:t>count(item)		# counts number of that item in list</a:t>
-            </a:r>
-            <a:endParaRPr lang="en" sz="2400" dirty="0">
-              <a:solidFill>
-                <a:srgbClr val="000000"/>
-              </a:solidFill>
-            </a:endParaRPr>
-          </a:p>
-          <a:p>
-            <a:pPr lvl="0" rtl="0">
-              <a:spcBef>
-                <a:spcPts val="0"/>
-              </a:spcBef>
-              <a:buNone/>
-            </a:pPr>
-            <a:endParaRPr dirty="0"/>
-          </a:p>
-          <a:p>
-            <a:pPr lvl="0">
-              <a:buNone/>
-            </a:pPr>
-            <a:r>
-              <a:rPr lang="en" dirty="0">
-                <a:latin typeface="Open Sans"/>
-                <a:ea typeface="Open Sans"/>
-                <a:cs typeface="Open Sans"/>
-                <a:sym typeface="Open Sans"/>
-              </a:rPr>
-              <a:t>There are </a:t>
-            </a:r>
-            <a:r>
-              <a:rPr lang="en-US" b="1" dirty="0" smtClean="0">
-                <a:latin typeface="Open Sans"/>
-                <a:ea typeface="Open Sans"/>
-                <a:cs typeface="Open Sans"/>
-                <a:sym typeface="Open Sans"/>
-              </a:rPr>
-              <a:t>many</a:t>
-            </a:r>
-            <a:r>
-              <a:rPr lang="en-US" dirty="0" smtClean="0">
-                <a:latin typeface="Open Sans"/>
-                <a:ea typeface="Open Sans"/>
-                <a:cs typeface="Open Sans"/>
-                <a:sym typeface="Open Sans"/>
-              </a:rPr>
-              <a:t> </a:t>
-            </a:r>
-            <a:r>
-              <a:rPr lang="en" dirty="0" smtClean="0">
-                <a:latin typeface="Open Sans"/>
-                <a:ea typeface="Open Sans"/>
-                <a:cs typeface="Open Sans"/>
-                <a:sym typeface="Open Sans"/>
-              </a:rPr>
-              <a:t>more methods and things to do with list! </a:t>
-            </a:r>
-            <a:r>
-              <a:rPr lang="en" dirty="0">
-                <a:latin typeface="Open Sans"/>
-                <a:ea typeface="Open Sans"/>
-                <a:cs typeface="Open Sans"/>
-                <a:sym typeface="Open Sans"/>
-              </a:rPr>
-              <a:t>See the </a:t>
-            </a:r>
-            <a:r>
-              <a:rPr lang="en" dirty="0" smtClean="0">
-                <a:sym typeface="Open Sans"/>
-              </a:rPr>
-              <a:t>List documentation </a:t>
-            </a:r>
-            <a:r>
-              <a:rPr lang="en" dirty="0" smtClean="0">
-                <a:sym typeface="Open Sans"/>
-                <a:hlinkClick r:id="rId3"/>
-              </a:rPr>
-              <a:t>here</a:t>
-            </a:r>
-            <a:r>
-              <a:rPr lang="en" dirty="0" smtClean="0">
-                <a:sym typeface="Open Sans"/>
-              </a:rPr>
-              <a:t> and </a:t>
-            </a:r>
-            <a:r>
-              <a:rPr lang="en-US" dirty="0" smtClean="0">
-                <a:sym typeface="Open Sans"/>
-                <a:hlinkClick r:id="rId4"/>
-              </a:rPr>
-              <a:t>here</a:t>
-            </a:r>
-            <a:r>
-              <a:rPr lang="en-US" dirty="0" smtClean="0">
-                <a:sym typeface="Open Sans"/>
-              </a:rPr>
-              <a:t>.</a:t>
-            </a:r>
-            <a:endParaRPr lang="en" dirty="0">
-              <a:latin typeface="Open Sans"/>
-              <a:ea typeface="Open Sans"/>
-              <a:cs typeface="Open Sans"/>
-              <a:sym typeface="Open Sans"/>
-            </a:endParaRPr>
-          </a:p>
-          <a:p>
-            <a:pPr>
-              <a:spcBef>
-                <a:spcPts val="0"/>
-              </a:spcBef>
-              <a:buNone/>
-            </a:pPr>
-            <a:endParaRPr dirty="0">
-              <a:latin typeface="Ubuntu"/>
-              <a:ea typeface="Ubuntu"/>
-              <a:cs typeface="Ubuntu"/>
-              <a:sym typeface="Ubuntu"/>
-            </a:endParaRPr>
           </a:p>
         </p:txBody>
       </p:sp>
@@ -15091,6 +14697,496 @@
   <p:cSld>
     <p:spTree>
       <p:nvGrpSpPr>
+        <p:cNvPr id="1" name="Shape 110"/>
+        <p:cNvGrpSpPr/>
+        <p:nvPr/>
+      </p:nvGrpSpPr>
+      <p:grpSpPr>
+        <a:xfrm>
+          <a:off x="0" y="0"/>
+          <a:ext cx="0" cy="0"/>
+          <a:chOff x="0" y="0"/>
+          <a:chExt cx="0" cy="0"/>
+        </a:xfrm>
+      </p:grpSpPr>
+      <p:sp>
+        <p:nvSpPr>
+          <p:cNvPr id="111" name="Shape 111"/>
+          <p:cNvSpPr txBox="1">
+            <a:spLocks noGrp="1"/>
+          </p:cNvSpPr>
+          <p:nvPr>
+            <p:ph type="title"/>
+          </p:nvPr>
+        </p:nvSpPr>
+        <p:spPr>
+          <a:xfrm>
+            <a:off x="457200" y="274637"/>
+            <a:ext cx="8229600" cy="1143000"/>
+          </a:xfrm>
+          <a:prstGeom prst="rect">
+            <a:avLst/>
+          </a:prstGeom>
+        </p:spPr>
+        <p:txBody>
+          <a:bodyPr lIns="91425" tIns="91425" rIns="91425" bIns="91425" anchor="b" anchorCtr="0">
+            <a:noAutofit/>
+          </a:bodyPr>
+          <a:lstStyle/>
+          <a:p>
+            <a:pPr>
+              <a:spcBef>
+                <a:spcPts val="0"/>
+              </a:spcBef>
+              <a:buNone/>
+            </a:pPr>
+            <a:r>
+              <a:rPr lang="en" sz="7200" dirty="0">
+                <a:solidFill>
+                  <a:srgbClr val="FF0000"/>
+                </a:solidFill>
+                <a:latin typeface="Yanone Kaffeesatz Bold"/>
+                <a:cs typeface="Yanone Kaffeesatz Bold"/>
+                <a:sym typeface="Ubuntu"/>
+              </a:rPr>
+              <a:t>Fun</a:t>
+            </a:r>
+            <a:r>
+              <a:rPr lang="en" b="0" dirty="0">
+                <a:latin typeface="Ubuntu"/>
+                <a:ea typeface="Ubuntu"/>
+                <a:cs typeface="Ubuntu"/>
+                <a:sym typeface="Ubuntu"/>
+              </a:rPr>
+              <a:t> </a:t>
+            </a:r>
+            <a:r>
+              <a:rPr lang="en" sz="7200" dirty="0" smtClean="0">
+                <a:solidFill>
+                  <a:srgbClr val="FF0000"/>
+                </a:solidFill>
+                <a:latin typeface="Yanone Kaffeesatz Bold"/>
+                <a:cs typeface="Yanone Kaffeesatz Bold"/>
+                <a:sym typeface="Ubuntu"/>
+              </a:rPr>
+              <a:t>with Lists</a:t>
+            </a:r>
+            <a:endParaRPr lang="en" sz="7200" dirty="0">
+              <a:solidFill>
+                <a:srgbClr val="FF0000"/>
+              </a:solidFill>
+              <a:latin typeface="Yanone Kaffeesatz Bold"/>
+              <a:cs typeface="Yanone Kaffeesatz Bold"/>
+              <a:sym typeface="Ubuntu"/>
+            </a:endParaRPr>
+          </a:p>
+        </p:txBody>
+      </p:sp>
+      <p:sp>
+        <p:nvSpPr>
+          <p:cNvPr id="112" name="Shape 112"/>
+          <p:cNvSpPr txBox="1">
+            <a:spLocks noGrp="1"/>
+          </p:cNvSpPr>
+          <p:nvPr>
+            <p:ph type="body" idx="1"/>
+          </p:nvPr>
+        </p:nvSpPr>
+        <p:spPr>
+          <a:xfrm>
+            <a:off x="457200" y="1600200"/>
+            <a:ext cx="8229600" cy="4967700"/>
+          </a:xfrm>
+          <a:prstGeom prst="rect">
+            <a:avLst/>
+          </a:prstGeom>
+        </p:spPr>
+        <p:txBody>
+          <a:bodyPr lIns="91425" tIns="91425" rIns="91425" bIns="91425" anchor="t" anchorCtr="0">
+            <a:noAutofit/>
+          </a:bodyPr>
+          <a:lstStyle/>
+          <a:p>
+            <a:pPr lvl="0" rtl="0">
+              <a:spcBef>
+                <a:spcPts val="0"/>
+              </a:spcBef>
+              <a:buNone/>
+            </a:pPr>
+            <a:r>
+              <a:rPr lang="en" sz="2400" dirty="0" smtClean="0">
+                <a:solidFill>
+                  <a:srgbClr val="000000"/>
+                </a:solidFill>
+                <a:latin typeface="Menlo Regular"/>
+                <a:ea typeface="Menlo Regular"/>
+                <a:cs typeface="Menlo Regular"/>
+                <a:sym typeface="Courier New"/>
+              </a:rPr>
+              <a:t>list.append(item)	</a:t>
+            </a:r>
+            <a:r>
+              <a:rPr lang="en" sz="2400" dirty="0" smtClean="0">
+                <a:solidFill>
+                  <a:srgbClr val="000000"/>
+                </a:solidFill>
+              </a:rPr>
+              <a:t># add item to end of list</a:t>
+            </a:r>
+            <a:endParaRPr lang="en" sz="2400" dirty="0">
+              <a:solidFill>
+                <a:srgbClr val="000000"/>
+              </a:solidFill>
+            </a:endParaRPr>
+          </a:p>
+          <a:p>
+            <a:pPr lvl="0" rtl="0">
+              <a:spcBef>
+                <a:spcPts val="0"/>
+              </a:spcBef>
+              <a:buNone/>
+            </a:pPr>
+            <a:r>
+              <a:rPr lang="en" sz="2400" dirty="0" smtClean="0">
+                <a:solidFill>
+                  <a:srgbClr val="000000"/>
+                </a:solidFill>
+                <a:latin typeface="Menlo Regular"/>
+                <a:ea typeface="Menlo Regular"/>
+                <a:cs typeface="Menlo Regular"/>
+                <a:sym typeface="Courier New"/>
+              </a:rPr>
+              <a:t>list.index(item)	</a:t>
+            </a:r>
+            <a:r>
+              <a:rPr lang="en" sz="2400" dirty="0" smtClean="0">
+                <a:solidFill>
+                  <a:srgbClr val="000000"/>
+                </a:solidFill>
+              </a:rPr>
+              <a:t># searches for item and gives its index</a:t>
+            </a:r>
+            <a:endParaRPr lang="en" sz="2400" dirty="0">
+              <a:solidFill>
+                <a:srgbClr val="000000"/>
+              </a:solidFill>
+            </a:endParaRPr>
+          </a:p>
+          <a:p>
+            <a:pPr lvl="0" rtl="0">
+              <a:spcBef>
+                <a:spcPts val="0"/>
+              </a:spcBef>
+              <a:buNone/>
+            </a:pPr>
+            <a:r>
+              <a:rPr lang="en" sz="2400" dirty="0" smtClean="0">
+                <a:solidFill>
+                  <a:srgbClr val="000000"/>
+                </a:solidFill>
+                <a:latin typeface="Menlo Regular"/>
+                <a:ea typeface="Menlo Regular"/>
+                <a:cs typeface="Menlo Regular"/>
+                <a:sym typeface="Courier New"/>
+              </a:rPr>
+              <a:t>list.remove(item)</a:t>
+            </a:r>
+            <a:r>
+              <a:rPr lang="en-US" sz="2400" dirty="0" smtClean="0">
+                <a:solidFill>
+                  <a:srgbClr val="000000"/>
+                </a:solidFill>
+                <a:latin typeface="Menlo Regular"/>
+                <a:ea typeface="Menlo Regular"/>
+                <a:cs typeface="Menlo Regular"/>
+                <a:sym typeface="Courier New"/>
+              </a:rPr>
+              <a:t>	</a:t>
+            </a:r>
+            <a:r>
+              <a:rPr lang="en" sz="2400" dirty="0" smtClean="0">
+                <a:solidFill>
+                  <a:srgbClr val="000000"/>
+                </a:solidFill>
+              </a:rPr>
+              <a:t># removes first item of that name</a:t>
+            </a:r>
+            <a:endParaRPr lang="en" sz="2400" dirty="0">
+              <a:solidFill>
+                <a:srgbClr val="000000"/>
+              </a:solidFill>
+            </a:endParaRPr>
+          </a:p>
+          <a:p>
+            <a:pPr lvl="0">
+              <a:buNone/>
+            </a:pPr>
+            <a:r>
+              <a:rPr lang="en-US" sz="2400" dirty="0">
+                <a:solidFill>
+                  <a:srgbClr val="000000"/>
+                </a:solidFill>
+                <a:latin typeface="Menlo Regular"/>
+                <a:ea typeface="Menlo Regular"/>
+                <a:cs typeface="Menlo Regular"/>
+                <a:sym typeface="Courier New"/>
+              </a:rPr>
+              <a:t>l</a:t>
+            </a:r>
+            <a:r>
+              <a:rPr lang="en" sz="2400" dirty="0">
+                <a:solidFill>
+                  <a:srgbClr val="000000"/>
+                </a:solidFill>
+                <a:latin typeface="Menlo Regular"/>
+                <a:ea typeface="Menlo Regular"/>
+                <a:cs typeface="Menlo Regular"/>
+                <a:sym typeface="Courier New"/>
+              </a:rPr>
+              <a:t>ist.reverse</a:t>
+            </a:r>
+            <a:r>
+              <a:rPr lang="en" sz="2400" dirty="0">
+                <a:solidFill>
+                  <a:srgbClr val="000000"/>
+                </a:solidFill>
+                <a:ea typeface="Menlo Regular"/>
+                <a:cs typeface="Menlo Regular"/>
+              </a:rPr>
+              <a:t>()</a:t>
+            </a:r>
+            <a:r>
+              <a:rPr lang="en" sz="2400" dirty="0">
+                <a:solidFill>
+                  <a:srgbClr val="000000"/>
+                </a:solidFill>
+              </a:rPr>
+              <a:t> 		# reverses the order of a list</a:t>
+            </a:r>
+            <a:endParaRPr lang="en-US" sz="2400" dirty="0" smtClean="0">
+              <a:solidFill>
+                <a:srgbClr val="000000"/>
+              </a:solidFill>
+              <a:latin typeface="Menlo Regular"/>
+              <a:ea typeface="Menlo Regular"/>
+              <a:cs typeface="Menlo Regular"/>
+              <a:sym typeface="Courier New"/>
+            </a:endParaRPr>
+          </a:p>
+          <a:p>
+            <a:pPr lvl="0" rtl="0">
+              <a:spcBef>
+                <a:spcPts val="0"/>
+              </a:spcBef>
+              <a:buNone/>
+            </a:pPr>
+            <a:r>
+              <a:rPr lang="en-US" sz="2400" dirty="0" err="1" smtClean="0">
+                <a:solidFill>
+                  <a:srgbClr val="000000"/>
+                </a:solidFill>
+                <a:latin typeface="Menlo Regular"/>
+                <a:ea typeface="Menlo Regular"/>
+                <a:cs typeface="Menlo Regular"/>
+                <a:sym typeface="Courier New"/>
+              </a:rPr>
+              <a:t>len</a:t>
+            </a:r>
+            <a:r>
+              <a:rPr lang="en-US" sz="2400" dirty="0" smtClean="0">
+                <a:solidFill>
+                  <a:srgbClr val="000000"/>
+                </a:solidFill>
+                <a:latin typeface="Menlo Regular"/>
+                <a:ea typeface="Menlo Regular"/>
+                <a:cs typeface="Menlo Regular"/>
+                <a:sym typeface="Courier New"/>
+              </a:rPr>
+              <a:t>(</a:t>
+            </a:r>
+            <a:r>
+              <a:rPr lang="en" sz="2400" dirty="0" smtClean="0">
+                <a:solidFill>
+                  <a:srgbClr val="000000"/>
+                </a:solidFill>
+                <a:latin typeface="Menlo Regular"/>
+                <a:ea typeface="Menlo Regular"/>
+                <a:cs typeface="Menlo Regular"/>
+                <a:sym typeface="Courier New"/>
+              </a:rPr>
+              <a:t>list)	</a:t>
+            </a:r>
+            <a:r>
+              <a:rPr lang="en" sz="2400" dirty="0" smtClean="0">
+                <a:solidFill>
+                  <a:srgbClr val="000000"/>
+                </a:solidFill>
+              </a:rPr>
+              <a:t>    	# gives number of items in list</a:t>
+            </a:r>
+            <a:endParaRPr lang="en" sz="2400" dirty="0">
+              <a:solidFill>
+                <a:srgbClr val="000000"/>
+              </a:solidFill>
+            </a:endParaRPr>
+          </a:p>
+          <a:p>
+            <a:pPr lvl="0" rtl="0">
+              <a:spcBef>
+                <a:spcPts val="0"/>
+              </a:spcBef>
+              <a:buNone/>
+            </a:pPr>
+            <a:r>
+              <a:rPr lang="en" sz="2400" dirty="0" smtClean="0">
+                <a:solidFill>
+                  <a:srgbClr val="000000"/>
+                </a:solidFill>
+              </a:rPr>
+              <a:t>count(item)		# counts number of that item in list</a:t>
+            </a:r>
+            <a:endParaRPr lang="en" sz="2400" dirty="0">
+              <a:solidFill>
+                <a:srgbClr val="000000"/>
+              </a:solidFill>
+            </a:endParaRPr>
+          </a:p>
+          <a:p>
+            <a:pPr lvl="0" rtl="0">
+              <a:spcBef>
+                <a:spcPts val="0"/>
+              </a:spcBef>
+              <a:buNone/>
+            </a:pPr>
+            <a:endParaRPr dirty="0"/>
+          </a:p>
+          <a:p>
+            <a:pPr lvl="0">
+              <a:buNone/>
+            </a:pPr>
+            <a:r>
+              <a:rPr lang="en" dirty="0">
+                <a:latin typeface="Open Sans"/>
+                <a:ea typeface="Open Sans"/>
+                <a:cs typeface="Open Sans"/>
+                <a:sym typeface="Open Sans"/>
+              </a:rPr>
+              <a:t>There are </a:t>
+            </a:r>
+            <a:r>
+              <a:rPr lang="en-US" b="1" dirty="0" smtClean="0">
+                <a:latin typeface="Open Sans"/>
+                <a:ea typeface="Open Sans"/>
+                <a:cs typeface="Open Sans"/>
+                <a:sym typeface="Open Sans"/>
+              </a:rPr>
+              <a:t>many</a:t>
+            </a:r>
+            <a:r>
+              <a:rPr lang="en-US" dirty="0" smtClean="0">
+                <a:latin typeface="Open Sans"/>
+                <a:ea typeface="Open Sans"/>
+                <a:cs typeface="Open Sans"/>
+                <a:sym typeface="Open Sans"/>
+              </a:rPr>
+              <a:t> </a:t>
+            </a:r>
+            <a:r>
+              <a:rPr lang="en" dirty="0" smtClean="0">
+                <a:latin typeface="Open Sans"/>
+                <a:ea typeface="Open Sans"/>
+                <a:cs typeface="Open Sans"/>
+                <a:sym typeface="Open Sans"/>
+              </a:rPr>
+              <a:t>more methods and things to do with list! </a:t>
+            </a:r>
+            <a:r>
+              <a:rPr lang="en" dirty="0">
+                <a:latin typeface="Open Sans"/>
+                <a:ea typeface="Open Sans"/>
+                <a:cs typeface="Open Sans"/>
+                <a:sym typeface="Open Sans"/>
+              </a:rPr>
+              <a:t>See the </a:t>
+            </a:r>
+            <a:r>
+              <a:rPr lang="en" dirty="0" smtClean="0">
+                <a:sym typeface="Open Sans"/>
+              </a:rPr>
+              <a:t>List documentation </a:t>
+            </a:r>
+            <a:r>
+              <a:rPr lang="en" dirty="0" smtClean="0">
+                <a:sym typeface="Open Sans"/>
+                <a:hlinkClick r:id="rId3"/>
+              </a:rPr>
+              <a:t>here</a:t>
+            </a:r>
+            <a:r>
+              <a:rPr lang="en" dirty="0" smtClean="0">
+                <a:sym typeface="Open Sans"/>
+              </a:rPr>
+              <a:t> and </a:t>
+            </a:r>
+            <a:r>
+              <a:rPr lang="en-US" dirty="0" smtClean="0">
+                <a:sym typeface="Open Sans"/>
+                <a:hlinkClick r:id="rId4"/>
+              </a:rPr>
+              <a:t>here</a:t>
+            </a:r>
+            <a:r>
+              <a:rPr lang="en-US" dirty="0" smtClean="0">
+                <a:sym typeface="Open Sans"/>
+              </a:rPr>
+              <a:t>.</a:t>
+            </a:r>
+            <a:endParaRPr lang="en" dirty="0">
+              <a:latin typeface="Open Sans"/>
+              <a:ea typeface="Open Sans"/>
+              <a:cs typeface="Open Sans"/>
+              <a:sym typeface="Open Sans"/>
+            </a:endParaRPr>
+          </a:p>
+          <a:p>
+            <a:pPr>
+              <a:spcBef>
+                <a:spcPts val="0"/>
+              </a:spcBef>
+              <a:buNone/>
+            </a:pPr>
+            <a:endParaRPr dirty="0">
+              <a:latin typeface="Ubuntu"/>
+              <a:ea typeface="Ubuntu"/>
+              <a:cs typeface="Ubuntu"/>
+              <a:sym typeface="Ubuntu"/>
+            </a:endParaRPr>
+          </a:p>
+        </p:txBody>
+      </p:sp>
+    </p:spTree>
+  </p:cSld>
+  <p:clrMapOvr>
+    <a:masterClrMapping/>
+  </p:clrMapOvr>
+  <p:transition xmlns:p14="http://schemas.microsoft.com/office/powerpoint/2010/main" spd="slow">
+    <p:cut/>
+  </p:transition>
+  <p:timing>
+    <p:tnLst>
+      <p:par>
+        <p:cTn xmlns:p14="http://schemas.microsoft.com/office/powerpoint/2010/main" id="1" dur="indefinite" restart="never" nodeType="tmRoot"/>
+      </p:par>
+    </p:tnLst>
+  </p:timing>
+</p:sld>
+</file>
+
+<file path=ppt/slides/slide21.xml><?xml version="1.0" encoding="utf-8"?>
+<p:sld xmlns:a="http://schemas.openxmlformats.org/drawingml/2006/main" xmlns:r="http://schemas.openxmlformats.org/officeDocument/2006/relationships" xmlns:p="http://schemas.openxmlformats.org/presentationml/2006/main">
+  <p:cSld>
+    <p:spTree>
+      <p:nvGrpSpPr>
         <p:cNvPr id="1" name="Shape 116"/>
         <p:cNvGrpSpPr/>
         <p:nvPr/>
@@ -15709,7 +15805,7 @@
 </p:sld>
 </file>
 
-<file path=ppt/slides/slide21.xml><?xml version="1.0" encoding="utf-8"?>
+<file path=ppt/slides/slide22.xml><?xml version="1.0" encoding="utf-8"?>
 <p:sld xmlns:a="http://schemas.openxmlformats.org/drawingml/2006/main" xmlns:r="http://schemas.openxmlformats.org/officeDocument/2006/relationships" xmlns:p="http://schemas.openxmlformats.org/presentationml/2006/main">
   <p:cSld>
     <p:spTree>
@@ -16660,7 +16756,7 @@
 </p:sld>
 </file>
 
-<file path=ppt/slides/slide22.xml><?xml version="1.0" encoding="utf-8"?>
+<file path=ppt/slides/slide23.xml><?xml version="1.0" encoding="utf-8"?>
 <p:sld xmlns:a="http://schemas.openxmlformats.org/drawingml/2006/main" xmlns:r="http://schemas.openxmlformats.org/officeDocument/2006/relationships" xmlns:p="http://schemas.openxmlformats.org/presentationml/2006/main">
   <p:cSld>
     <p:spTree>
@@ -17398,7 +17494,7 @@
 </p:sld>
 </file>
 
-<file path=ppt/slides/slide23.xml><?xml version="1.0" encoding="utf-8"?>
+<file path=ppt/slides/slide24.xml><?xml version="1.0" encoding="utf-8"?>
 <p:sld xmlns:a="http://schemas.openxmlformats.org/drawingml/2006/main" xmlns:r="http://schemas.openxmlformats.org/officeDocument/2006/relationships" xmlns:p="http://schemas.openxmlformats.org/presentationml/2006/main">
   <p:cSld>
     <p:spTree>
@@ -17951,7 +18047,7 @@
 </p:sld>
 </file>
 
-<file path=ppt/slides/slide24.xml><?xml version="1.0" encoding="utf-8"?>
+<file path=ppt/slides/slide25.xml><?xml version="1.0" encoding="utf-8"?>
 <p:sld xmlns:a="http://schemas.openxmlformats.org/drawingml/2006/main" xmlns:r="http://schemas.openxmlformats.org/officeDocument/2006/relationships" xmlns:p="http://schemas.openxmlformats.org/presentationml/2006/main">
   <p:cSld>
     <p:spTree>
@@ -18452,7 +18548,7 @@
 </p:sld>
 </file>
 
-<file path=ppt/slides/slide25.xml><?xml version="1.0" encoding="utf-8"?>
+<file path=ppt/slides/slide26.xml><?xml version="1.0" encoding="utf-8"?>
 <p:sld xmlns:a="http://schemas.openxmlformats.org/drawingml/2006/main" xmlns:r="http://schemas.openxmlformats.org/officeDocument/2006/relationships" xmlns:p="http://schemas.openxmlformats.org/presentationml/2006/main">
   <p:cSld>
     <p:spTree>
@@ -19428,7 +19524,7 @@
 </p:sld>
 </file>
 
-<file path=ppt/slides/slide26.xml><?xml version="1.0" encoding="utf-8"?>
+<file path=ppt/slides/slide27.xml><?xml version="1.0" encoding="utf-8"?>
 <p:sld xmlns:a="http://schemas.openxmlformats.org/drawingml/2006/main" xmlns:r="http://schemas.openxmlformats.org/officeDocument/2006/relationships" xmlns:p="http://schemas.openxmlformats.org/presentationml/2006/main">
   <p:cSld>
     <p:spTree>
@@ -19625,7 +19721,7 @@
 </p:sld>
 </file>
 
-<file path=ppt/slides/slide27.xml><?xml version="1.0" encoding="utf-8"?>
+<file path=ppt/slides/slide28.xml><?xml version="1.0" encoding="utf-8"?>
 <p:sld xmlns:a="http://schemas.openxmlformats.org/drawingml/2006/main" xmlns:r="http://schemas.openxmlformats.org/officeDocument/2006/relationships" xmlns:p="http://schemas.openxmlformats.org/presentationml/2006/main">
   <p:cSld>
     <p:spTree>
@@ -19808,7 +19904,7 @@
 </p:sld>
 </file>
 
-<file path=ppt/slides/slide28.xml><?xml version="1.0" encoding="utf-8"?>
+<file path=ppt/slides/slide29.xml><?xml version="1.0" encoding="utf-8"?>
 <p:sld xmlns:a="http://schemas.openxmlformats.org/drawingml/2006/main" xmlns:r="http://schemas.openxmlformats.org/officeDocument/2006/relationships" xmlns:p="http://schemas.openxmlformats.org/presentationml/2006/main">
   <p:cSld>
     <p:spTree>
@@ -19867,386 +19963,6 @@
               </a:rPr>
               <a:t>Your Own Command Line Program</a:t>
             </a:r>
-          </a:p>
-        </p:txBody>
-      </p:sp>
-    </p:spTree>
-  </p:cSld>
-  <p:clrMapOvr>
-    <a:masterClrMapping/>
-  </p:clrMapOvr>
-  <p:transition xmlns:p14="http://schemas.microsoft.com/office/powerpoint/2010/main" spd="slow">
-    <p:cut/>
-  </p:transition>
-  <p:timing>
-    <p:tnLst>
-      <p:par>
-        <p:cTn xmlns:p14="http://schemas.microsoft.com/office/powerpoint/2010/main" id="1" dur="indefinite" restart="never" nodeType="tmRoot"/>
-      </p:par>
-    </p:tnLst>
-  </p:timing>
-</p:sld>
-</file>
-
-<file path=ppt/slides/slide29.xml><?xml version="1.0" encoding="utf-8"?>
-<p:sld xmlns:a="http://schemas.openxmlformats.org/drawingml/2006/main" xmlns:r="http://schemas.openxmlformats.org/officeDocument/2006/relationships" xmlns:p="http://schemas.openxmlformats.org/presentationml/2006/main">
-  <p:cSld>
-    <p:spTree>
-      <p:nvGrpSpPr>
-        <p:cNvPr id="1" name="Shape 188"/>
-        <p:cNvGrpSpPr/>
-        <p:nvPr/>
-      </p:nvGrpSpPr>
-      <p:grpSpPr>
-        <a:xfrm>
-          <a:off x="0" y="0"/>
-          <a:ext cx="0" cy="0"/>
-          <a:chOff x="0" y="0"/>
-          <a:chExt cx="0" cy="0"/>
-        </a:xfrm>
-      </p:grpSpPr>
-      <p:sp>
-        <p:nvSpPr>
-          <p:cNvPr id="189" name="Shape 189"/>
-          <p:cNvSpPr txBox="1">
-            <a:spLocks noGrp="1"/>
-          </p:cNvSpPr>
-          <p:nvPr>
-            <p:ph type="title"/>
-          </p:nvPr>
-        </p:nvSpPr>
-        <p:spPr>
-          <a:xfrm>
-            <a:off x="457200" y="274636"/>
-            <a:ext cx="8229600" cy="1325563"/>
-          </a:xfrm>
-          <a:prstGeom prst="rect">
-            <a:avLst/>
-          </a:prstGeom>
-        </p:spPr>
-        <p:txBody>
-          <a:bodyPr lIns="91425" tIns="91425" rIns="91425" bIns="91425" anchor="b" anchorCtr="0">
-            <a:noAutofit/>
-          </a:bodyPr>
-          <a:lstStyle/>
-          <a:p>
-            <a:pPr>
-              <a:spcBef>
-                <a:spcPts val="0"/>
-              </a:spcBef>
-              <a:buNone/>
-            </a:pPr>
-            <a:r>
-              <a:rPr lang="en" sz="9600" dirty="0">
-                <a:solidFill>
-                  <a:srgbClr val="FF0000"/>
-                </a:solidFill>
-                <a:latin typeface="Yanone Kaffeesatz Bold"/>
-                <a:cs typeface="Yanone Kaffeesatz Bold"/>
-                <a:sym typeface="Ubuntu"/>
-              </a:rPr>
-              <a:t>Hello</a:t>
-            </a:r>
-            <a:r>
-              <a:rPr lang="en" dirty="0">
-                <a:latin typeface="Ubuntu"/>
-                <a:ea typeface="Ubuntu"/>
-                <a:cs typeface="Ubuntu"/>
-                <a:sym typeface="Ubuntu"/>
-              </a:rPr>
-              <a:t> </a:t>
-            </a:r>
-            <a:r>
-              <a:rPr lang="en" sz="9600" dirty="0">
-                <a:solidFill>
-                  <a:srgbClr val="FF0000"/>
-                </a:solidFill>
-                <a:latin typeface="Yanone Kaffeesatz Bold"/>
-                <a:cs typeface="Yanone Kaffeesatz Bold"/>
-                <a:sym typeface="Ubuntu"/>
-              </a:rPr>
-              <a:t>World</a:t>
-            </a:r>
-          </a:p>
-        </p:txBody>
-      </p:sp>
-      <p:sp>
-        <p:nvSpPr>
-          <p:cNvPr id="190" name="Shape 190"/>
-          <p:cNvSpPr txBox="1">
-            <a:spLocks noGrp="1"/>
-          </p:cNvSpPr>
-          <p:nvPr>
-            <p:ph type="body" idx="1"/>
-          </p:nvPr>
-        </p:nvSpPr>
-        <p:spPr>
-          <a:xfrm>
-            <a:off x="457200" y="1600200"/>
-            <a:ext cx="8229600" cy="4967700"/>
-          </a:xfrm>
-          <a:prstGeom prst="rect">
-            <a:avLst/>
-          </a:prstGeom>
-        </p:spPr>
-        <p:txBody>
-          <a:bodyPr lIns="91425" tIns="91425" rIns="91425" bIns="91425" anchor="t" anchorCtr="0">
-            <a:noAutofit/>
-          </a:bodyPr>
-          <a:lstStyle/>
-          <a:p>
-            <a:pPr lvl="0" rtl="0">
-              <a:spcBef>
-                <a:spcPts val="0"/>
-              </a:spcBef>
-              <a:buNone/>
-            </a:pPr>
-            <a:r>
-              <a:rPr lang="en" dirty="0"/>
-              <a:t>Create a file </a:t>
-            </a:r>
-            <a:r>
-              <a:rPr lang="en" dirty="0" smtClean="0"/>
-              <a:t>name</a:t>
-            </a:r>
-            <a:r>
-              <a:rPr lang="en-US" dirty="0" smtClean="0"/>
-              <a:t>d</a:t>
-            </a:r>
-            <a:r>
-              <a:rPr lang="en" dirty="0" smtClean="0"/>
-              <a:t> </a:t>
-            </a:r>
-            <a:r>
-              <a:rPr lang="en" dirty="0" smtClean="0">
-                <a:solidFill>
-                  <a:srgbClr val="0B5C92"/>
-                </a:solidFill>
-                <a:latin typeface="Menlo Regular"/>
-                <a:ea typeface="Menlo Regular"/>
-                <a:cs typeface="Menlo Regular"/>
-                <a:sym typeface="Courier New"/>
-              </a:rPr>
-              <a:t>hello.py</a:t>
-            </a:r>
-            <a:r>
-              <a:rPr lang="en" dirty="0" smtClean="0"/>
-              <a:t> </a:t>
-            </a:r>
-            <a:r>
-              <a:rPr lang="en" dirty="0"/>
-              <a:t>and </a:t>
-            </a:r>
-            <a:r>
-              <a:rPr lang="en-US" dirty="0" smtClean="0"/>
-              <a:t>add </a:t>
-            </a:r>
-            <a:r>
-              <a:rPr lang="en" dirty="0" smtClean="0"/>
-              <a:t>the </a:t>
-            </a:r>
-            <a:r>
-              <a:rPr lang="en" dirty="0"/>
-              <a:t>following code</a:t>
-            </a:r>
-          </a:p>
-          <a:p>
-            <a:pPr lvl="0" rtl="0">
-              <a:spcBef>
-                <a:spcPts val="0"/>
-              </a:spcBef>
-              <a:buNone/>
-            </a:pPr>
-            <a:endParaRPr dirty="0"/>
-          </a:p>
-          <a:p>
-            <a:pPr lvl="0" rtl="0">
-              <a:spcBef>
-                <a:spcPts val="0"/>
-              </a:spcBef>
-              <a:buNone/>
-            </a:pPr>
-            <a:r>
-              <a:rPr lang="en-US" dirty="0">
-                <a:solidFill>
-                  <a:srgbClr val="771100"/>
-                </a:solidFill>
-                <a:latin typeface="Menlo Regular"/>
-                <a:ea typeface="Menlo Regular"/>
-                <a:cs typeface="Menlo Regular"/>
-                <a:sym typeface="Courier New"/>
-              </a:rPr>
-              <a:t>p</a:t>
-            </a:r>
-            <a:r>
-              <a:rPr lang="en" dirty="0" smtClean="0">
-                <a:solidFill>
-                  <a:srgbClr val="771100"/>
-                </a:solidFill>
-                <a:latin typeface="Menlo Regular"/>
-                <a:ea typeface="Menlo Regular"/>
-                <a:cs typeface="Menlo Regular"/>
-                <a:sym typeface="Courier New"/>
-              </a:rPr>
-              <a:t>rint("</a:t>
-            </a:r>
-            <a:r>
-              <a:rPr lang="en" dirty="0" smtClean="0">
-                <a:solidFill>
-                  <a:srgbClr val="DD2200"/>
-                </a:solidFill>
-                <a:latin typeface="Menlo Regular"/>
-                <a:ea typeface="Menlo Regular"/>
-                <a:cs typeface="Menlo Regular"/>
-                <a:sym typeface="Courier New"/>
-              </a:rPr>
-              <a:t>Hello</a:t>
-            </a:r>
-            <a:r>
-              <a:rPr lang="en" dirty="0">
-                <a:solidFill>
-                  <a:srgbClr val="DD2200"/>
-                </a:solidFill>
-                <a:latin typeface="Menlo Regular"/>
-                <a:ea typeface="Menlo Regular"/>
-                <a:cs typeface="Menlo Regular"/>
-                <a:sym typeface="Courier New"/>
-              </a:rPr>
-              <a:t>, World</a:t>
-            </a:r>
-            <a:r>
-              <a:rPr lang="en" dirty="0" smtClean="0">
-                <a:solidFill>
-                  <a:srgbClr val="DD2200"/>
-                </a:solidFill>
-                <a:latin typeface="Menlo Regular"/>
-                <a:ea typeface="Menlo Regular"/>
-                <a:cs typeface="Menlo Regular"/>
-                <a:sym typeface="Courier New"/>
-              </a:rPr>
-              <a:t>!</a:t>
-            </a:r>
-            <a:r>
-              <a:rPr lang="en" dirty="0" smtClean="0">
-                <a:solidFill>
-                  <a:srgbClr val="771100"/>
-                </a:solidFill>
-                <a:latin typeface="Menlo Regular"/>
-                <a:ea typeface="Menlo Regular"/>
-                <a:cs typeface="Menlo Regular"/>
-                <a:sym typeface="Courier New"/>
-              </a:rPr>
-              <a:t>“)</a:t>
-            </a:r>
-            <a:endParaRPr lang="en" dirty="0">
-              <a:solidFill>
-                <a:srgbClr val="771100"/>
-              </a:solidFill>
-              <a:latin typeface="Menlo Regular"/>
-              <a:ea typeface="Menlo Regular"/>
-              <a:cs typeface="Menlo Regular"/>
-              <a:sym typeface="Courier New"/>
-            </a:endParaRPr>
-          </a:p>
-          <a:p>
-            <a:pPr lvl="0" rtl="0">
-              <a:spcBef>
-                <a:spcPts val="0"/>
-              </a:spcBef>
-              <a:buNone/>
-            </a:pPr>
-            <a:endParaRPr dirty="0">
-              <a:solidFill>
-                <a:srgbClr val="771100"/>
-              </a:solidFill>
-              <a:latin typeface="Menlo Regular"/>
-              <a:ea typeface="Menlo Regular"/>
-              <a:cs typeface="Menlo Regular"/>
-              <a:sym typeface="Courier New"/>
-            </a:endParaRPr>
-          </a:p>
-          <a:p>
-            <a:pPr lvl="0" rtl="0">
-              <a:spcBef>
-                <a:spcPts val="0"/>
-              </a:spcBef>
-              <a:buNone/>
-            </a:pPr>
-            <a:r>
-              <a:rPr lang="en" dirty="0">
-                <a:solidFill>
-                  <a:srgbClr val="000000"/>
-                </a:solidFill>
-              </a:rPr>
-              <a:t>Now run it</a:t>
-            </a:r>
-          </a:p>
-          <a:p>
-            <a:pPr lvl="0" rtl="0">
-              <a:spcBef>
-                <a:spcPts val="0"/>
-              </a:spcBef>
-              <a:buNone/>
-            </a:pPr>
-            <a:endParaRPr dirty="0">
-              <a:solidFill>
-                <a:srgbClr val="771100"/>
-              </a:solidFill>
-              <a:latin typeface="Menlo Regular"/>
-              <a:ea typeface="Menlo Regular"/>
-              <a:cs typeface="Menlo Regular"/>
-              <a:sym typeface="Courier New"/>
-            </a:endParaRPr>
-          </a:p>
-          <a:p>
-            <a:pPr lvl="0" rtl="0">
-              <a:spcBef>
-                <a:spcPts val="0"/>
-              </a:spcBef>
-              <a:buNone/>
-            </a:pPr>
-            <a:r>
-              <a:rPr lang="en" dirty="0">
-                <a:solidFill>
-                  <a:srgbClr val="0B5C92"/>
-                </a:solidFill>
-                <a:latin typeface="Menlo Regular"/>
-                <a:ea typeface="Menlo Regular"/>
-                <a:cs typeface="Menlo Regular"/>
-                <a:sym typeface="Courier New"/>
-              </a:rPr>
-              <a:t>$ </a:t>
-            </a:r>
-            <a:r>
-              <a:rPr lang="en" dirty="0" smtClean="0">
-                <a:solidFill>
-                  <a:srgbClr val="0B5C92"/>
-                </a:solidFill>
-                <a:latin typeface="Menlo Regular"/>
-                <a:ea typeface="Menlo Regular"/>
-                <a:cs typeface="Menlo Regular"/>
-                <a:sym typeface="Courier New"/>
-              </a:rPr>
-              <a:t>python3 hello.py</a:t>
-            </a:r>
-            <a:endParaRPr lang="en" dirty="0">
-              <a:solidFill>
-                <a:srgbClr val="0B5C92"/>
-              </a:solidFill>
-              <a:latin typeface="Menlo Regular"/>
-              <a:ea typeface="Menlo Regular"/>
-              <a:cs typeface="Menlo Regular"/>
-              <a:sym typeface="Courier New"/>
-            </a:endParaRPr>
-          </a:p>
-          <a:p>
-            <a:pPr>
-              <a:spcBef>
-                <a:spcPts val="0"/>
-              </a:spcBef>
-              <a:buNone/>
-            </a:pPr>
-            <a:endParaRPr dirty="0"/>
           </a:p>
         </p:txBody>
       </p:sp>
@@ -21369,7 +21085,7 @@
   <p:cSld>
     <p:spTree>
       <p:nvGrpSpPr>
-        <p:cNvPr id="1" name="Shape 206"/>
+        <p:cNvPr id="1" name="Shape 188"/>
         <p:cNvGrpSpPr/>
         <p:nvPr/>
       </p:nvGrpSpPr>
@@ -21383,7 +21099,7 @@
       </p:grpSpPr>
       <p:sp>
         <p:nvSpPr>
-          <p:cNvPr id="207" name="Shape 207"/>
+          <p:cNvPr id="189" name="Shape 189"/>
           <p:cNvSpPr txBox="1">
             <a:spLocks noGrp="1"/>
           </p:cNvSpPr>
@@ -21413,7 +21129,7 @@
               <a:buNone/>
             </a:pPr>
             <a:r>
-              <a:rPr lang="en-US" sz="9600" dirty="0" smtClean="0">
+              <a:rPr lang="en" sz="9600" dirty="0">
                 <a:solidFill>
                   <a:srgbClr val="FF0000"/>
                 </a:solidFill>
@@ -21421,22 +21137,34 @@
                 <a:cs typeface="Yanone Kaffeesatz Bold"/>
                 <a:sym typeface="Ubuntu"/>
               </a:rPr>
-              <a:t>Packages</a:t>
-            </a:r>
-            <a:endParaRPr lang="en" sz="9600" dirty="0">
-              <a:solidFill>
-                <a:srgbClr val="FF0000"/>
-              </a:solidFill>
-              <a:latin typeface="Yanone Kaffeesatz Bold"/>
-              <a:cs typeface="Yanone Kaffeesatz Bold"/>
-              <a:sym typeface="Ubuntu"/>
-            </a:endParaRPr>
+              <a:t>Hello</a:t>
+            </a:r>
+            <a:r>
+              <a:rPr lang="en" dirty="0">
+                <a:latin typeface="Ubuntu"/>
+                <a:ea typeface="Ubuntu"/>
+                <a:cs typeface="Ubuntu"/>
+                <a:sym typeface="Ubuntu"/>
+              </a:rPr>
+              <a:t> </a:t>
+            </a:r>
+            <a:r>
+              <a:rPr lang="en" sz="9600" dirty="0">
+                <a:solidFill>
+                  <a:srgbClr val="FF0000"/>
+                </a:solidFill>
+                <a:latin typeface="Yanone Kaffeesatz Bold"/>
+                <a:cs typeface="Yanone Kaffeesatz Bold"/>
+                <a:sym typeface="Ubuntu"/>
+              </a:rPr>
+              <a:t>World</a:t>
+            </a:r>
           </a:p>
         </p:txBody>
       </p:sp>
       <p:sp>
         <p:nvSpPr>
-          <p:cNvPr id="208" name="Shape 208"/>
+          <p:cNvPr id="190" name="Shape 190"/>
           <p:cNvSpPr txBox="1">
             <a:spLocks noGrp="1"/>
           </p:cNvSpPr>
@@ -21467,7 +21195,51 @@
             </a:pPr>
             <a:r>
               <a:rPr lang="en" dirty="0"/>
-              <a:t>Useful behavior beyond the "basics"</a:t>
+              <a:t>Create a file </a:t>
+            </a:r>
+            <a:r>
+              <a:rPr lang="en" dirty="0" smtClean="0"/>
+              <a:t>name</a:t>
+            </a:r>
+            <a:r>
+              <a:rPr lang="en-US" dirty="0" smtClean="0"/>
+              <a:t>d</a:t>
+            </a:r>
+            <a:r>
+              <a:rPr lang="en" dirty="0" smtClean="0"/>
+              <a:t> </a:t>
+            </a:r>
+            <a:r>
+              <a:rPr lang="en" dirty="0" smtClean="0">
+                <a:solidFill>
+                  <a:srgbClr val="0B5C92"/>
+                </a:solidFill>
+                <a:latin typeface="Menlo Regular"/>
+                <a:ea typeface="Menlo Regular"/>
+                <a:cs typeface="Menlo Regular"/>
+                <a:sym typeface="Courier New"/>
+              </a:rPr>
+              <a:t>hello.py</a:t>
+            </a:r>
+            <a:r>
+              <a:rPr lang="en" dirty="0" smtClean="0"/>
+              <a:t> </a:t>
+            </a:r>
+            <a:r>
+              <a:rPr lang="en" dirty="0"/>
+              <a:t>and </a:t>
+            </a:r>
+            <a:r>
+              <a:rPr lang="en-US" dirty="0" smtClean="0"/>
+              <a:t>add </a:t>
+            </a:r>
+            <a:r>
+              <a:rPr lang="en" dirty="0" smtClean="0"/>
+              <a:t>the </a:t>
+            </a:r>
+            <a:r>
+              <a:rPr lang="en" dirty="0"/>
+              <a:t>following code</a:t>
             </a:r>
           </a:p>
           <a:p>
@@ -21480,146 +21252,183 @@
             <a:endParaRPr dirty="0"/>
           </a:p>
           <a:p>
-            <a:pPr marL="457200" lvl="0" indent="-419100" rtl="0">
-              <a:spcBef>
-                <a:spcPts val="0"/>
-              </a:spcBef>
-              <a:buClr>
-                <a:schemeClr val="dk1"/>
-              </a:buClr>
-              <a:buSzPct val="100000"/>
-              <a:buFont typeface="Arial"/>
-              <a:buChar char="●"/>
-            </a:pPr>
-            <a:r>
-              <a:rPr lang="en-US" dirty="0"/>
-              <a:t>Python </a:t>
-            </a:r>
-            <a:r>
-              <a:rPr lang="en" dirty="0"/>
-              <a:t>Standard Library</a:t>
-            </a:r>
-          </a:p>
-          <a:p>
-            <a:pPr marL="914400" lvl="1" indent="-381000" rtl="0">
-              <a:spcBef>
-                <a:spcPts val="0"/>
-              </a:spcBef>
-              <a:buClr>
-                <a:schemeClr val="dk1"/>
-              </a:buClr>
-              <a:buSzPct val="80000"/>
-              <a:buFont typeface="Courier New"/>
-              <a:buChar char="o"/>
+            <a:pPr lvl="0" rtl="0">
+              <a:spcBef>
+                <a:spcPts val="0"/>
+              </a:spcBef>
+              <a:buNone/>
             </a:pPr>
             <a:r>
               <a:rPr lang="en-US" dirty="0">
-                <a:latin typeface="Open Sans"/>
-                <a:ea typeface="Open Sans"/>
-                <a:cs typeface="Open Sans"/>
-              </a:rPr>
-              <a:t>Math functions</a:t>
+                <a:solidFill>
+                  <a:srgbClr val="771100"/>
+                </a:solidFill>
+                <a:latin typeface="Menlo Regular"/>
+                <a:ea typeface="Menlo Regular"/>
+                <a:cs typeface="Menlo Regular"/>
+                <a:sym typeface="Courier New"/>
+              </a:rPr>
+              <a:t>p</a:t>
+            </a:r>
+            <a:r>
+              <a:rPr lang="en" dirty="0" smtClean="0">
+                <a:solidFill>
+                  <a:srgbClr val="771100"/>
+                </a:solidFill>
+                <a:latin typeface="Menlo Regular"/>
+                <a:ea typeface="Menlo Regular"/>
+                <a:cs typeface="Menlo Regular"/>
+                <a:sym typeface="Courier New"/>
+              </a:rPr>
+              <a:t>rint("</a:t>
+            </a:r>
+            <a:r>
+              <a:rPr lang="en" dirty="0" smtClean="0">
+                <a:solidFill>
+                  <a:srgbClr val="DD2200"/>
+                </a:solidFill>
+                <a:latin typeface="Menlo Regular"/>
+                <a:ea typeface="Menlo Regular"/>
+                <a:cs typeface="Menlo Regular"/>
+                <a:sym typeface="Courier New"/>
+              </a:rPr>
+              <a:t>Hello</a:t>
+            </a:r>
+            <a:r>
+              <a:rPr lang="en" dirty="0">
+                <a:solidFill>
+                  <a:srgbClr val="DD2200"/>
+                </a:solidFill>
+                <a:latin typeface="Menlo Regular"/>
+                <a:ea typeface="Menlo Regular"/>
+                <a:cs typeface="Menlo Regular"/>
+                <a:sym typeface="Courier New"/>
+              </a:rPr>
+              <a:t>, World</a:t>
+            </a:r>
+            <a:r>
+              <a:rPr lang="en" dirty="0" smtClean="0">
+                <a:solidFill>
+                  <a:srgbClr val="DD2200"/>
+                </a:solidFill>
+                <a:latin typeface="Menlo Regular"/>
+                <a:ea typeface="Menlo Regular"/>
+                <a:cs typeface="Menlo Regular"/>
+                <a:sym typeface="Courier New"/>
+              </a:rPr>
+              <a:t>!</a:t>
+            </a:r>
+            <a:r>
+              <a:rPr lang="en" dirty="0" smtClean="0">
+                <a:solidFill>
+                  <a:srgbClr val="771100"/>
+                </a:solidFill>
+                <a:latin typeface="Menlo Regular"/>
+                <a:ea typeface="Menlo Regular"/>
+                <a:cs typeface="Menlo Regular"/>
+                <a:sym typeface="Courier New"/>
+              </a:rPr>
+              <a:t>“)</a:t>
             </a:r>
             <a:endParaRPr lang="en" dirty="0">
-              <a:latin typeface="Open Sans"/>
-              <a:ea typeface="Open Sans"/>
-              <a:cs typeface="Open Sans"/>
+              <a:solidFill>
+                <a:srgbClr val="771100"/>
+              </a:solidFill>
+              <a:latin typeface="Menlo Regular"/>
+              <a:ea typeface="Menlo Regular"/>
+              <a:cs typeface="Menlo Regular"/>
+              <a:sym typeface="Courier New"/>
             </a:endParaRPr>
           </a:p>
           <a:p>
-            <a:pPr marL="914400" lvl="1" indent="-381000" rtl="0">
-              <a:spcBef>
-                <a:spcPts val="0"/>
-              </a:spcBef>
-              <a:buClr>
-                <a:schemeClr val="dk1"/>
-              </a:buClr>
-              <a:buSzPct val="80000"/>
-              <a:buFont typeface="Courier New"/>
-              <a:buChar char="o"/>
-            </a:pPr>
-            <a:r>
-              <a:rPr lang="en-US" dirty="0">
-                <a:latin typeface="Open Sans"/>
-                <a:ea typeface="Open Sans"/>
-                <a:cs typeface="Open Sans"/>
-              </a:rPr>
-              <a:t>Everything we've done so far</a:t>
+            <a:pPr lvl="0" rtl="0">
+              <a:spcBef>
+                <a:spcPts val="0"/>
+              </a:spcBef>
+              <a:buNone/>
+            </a:pPr>
+            <a:endParaRPr dirty="0">
+              <a:solidFill>
+                <a:srgbClr val="771100"/>
+              </a:solidFill>
+              <a:latin typeface="Menlo Regular"/>
+              <a:ea typeface="Menlo Regular"/>
+              <a:cs typeface="Menlo Regular"/>
+              <a:sym typeface="Courier New"/>
+            </a:endParaRPr>
+          </a:p>
+          <a:p>
+            <a:pPr lvl="0" rtl="0">
+              <a:spcBef>
+                <a:spcPts val="0"/>
+              </a:spcBef>
+              <a:buNone/>
+            </a:pPr>
+            <a:r>
+              <a:rPr lang="en" dirty="0">
+                <a:solidFill>
+                  <a:srgbClr val="000000"/>
+                </a:solidFill>
+              </a:rPr>
+              <a:t>Now run it</a:t>
+            </a:r>
+          </a:p>
+          <a:p>
+            <a:pPr lvl="0" rtl="0">
+              <a:spcBef>
+                <a:spcPts val="0"/>
+              </a:spcBef>
+              <a:buNone/>
+            </a:pPr>
+            <a:endParaRPr dirty="0">
+              <a:solidFill>
+                <a:srgbClr val="771100"/>
+              </a:solidFill>
+              <a:latin typeface="Menlo Regular"/>
+              <a:ea typeface="Menlo Regular"/>
+              <a:cs typeface="Menlo Regular"/>
+              <a:sym typeface="Courier New"/>
+            </a:endParaRPr>
+          </a:p>
+          <a:p>
+            <a:pPr lvl="0" rtl="0">
+              <a:spcBef>
+                <a:spcPts val="0"/>
+              </a:spcBef>
+              <a:buNone/>
+            </a:pPr>
+            <a:r>
+              <a:rPr lang="en" dirty="0">
+                <a:solidFill>
+                  <a:srgbClr val="0B5C92"/>
+                </a:solidFill>
+                <a:latin typeface="Menlo Regular"/>
+                <a:ea typeface="Menlo Regular"/>
+                <a:cs typeface="Menlo Regular"/>
+                <a:sym typeface="Courier New"/>
+              </a:rPr>
+              <a:t>$ </a:t>
+            </a:r>
+            <a:r>
+              <a:rPr lang="en" dirty="0" smtClean="0">
+                <a:solidFill>
+                  <a:srgbClr val="0B5C92"/>
+                </a:solidFill>
+                <a:latin typeface="Menlo Regular"/>
+                <a:ea typeface="Menlo Regular"/>
+                <a:cs typeface="Menlo Regular"/>
+                <a:sym typeface="Courier New"/>
+              </a:rPr>
+              <a:t>python3 hello.py</a:t>
             </a:r>
             <a:endParaRPr lang="en" dirty="0">
-              <a:latin typeface="Open Sans"/>
-              <a:ea typeface="Open Sans"/>
-              <a:cs typeface="Open Sans"/>
-            </a:endParaRPr>
-          </a:p>
-          <a:p>
-            <a:pPr marL="457200" lvl="0" indent="-419100" rtl="0">
-              <a:spcBef>
-                <a:spcPts val="0"/>
-              </a:spcBef>
-              <a:buClr>
-                <a:schemeClr val="dk1"/>
-              </a:buClr>
-              <a:buSzPct val="100000"/>
-              <a:buFont typeface="Arial"/>
-              <a:buChar char="●"/>
-            </a:pPr>
-            <a:r>
-              <a:rPr lang="en-US" dirty="0"/>
-              <a:t>Python packages</a:t>
-            </a:r>
-            <a:endParaRPr lang="en" dirty="0"/>
-          </a:p>
-          <a:p>
-            <a:pPr marL="914400" lvl="1" indent="-381000" rtl="0">
-              <a:spcBef>
-                <a:spcPts val="0"/>
-              </a:spcBef>
-              <a:buClr>
-                <a:schemeClr val="dk1"/>
-              </a:buClr>
-              <a:buSzPct val="80000"/>
-              <a:buFont typeface="Courier New"/>
-              <a:buChar char="o"/>
-            </a:pPr>
-            <a:r>
-              <a:rPr lang="en" dirty="0">
-                <a:latin typeface="Open Sans"/>
-                <a:ea typeface="Open Sans"/>
-                <a:cs typeface="Open Sans"/>
-              </a:rPr>
-              <a:t>Just about everything else</a:t>
-            </a:r>
-            <a:endParaRPr lang="en-US" dirty="0">
-              <a:latin typeface="Open Sans"/>
-              <a:ea typeface="Open Sans"/>
-              <a:cs typeface="Open Sans"/>
-            </a:endParaRPr>
-          </a:p>
-          <a:p>
-            <a:pPr marL="914400" lvl="1" indent="-381000" rtl="0">
-              <a:spcBef>
-                <a:spcPts val="0"/>
-              </a:spcBef>
-              <a:buClr>
-                <a:schemeClr val="dk1"/>
-              </a:buClr>
-              <a:buSzPct val="80000"/>
-              <a:buFont typeface="Courier New"/>
-              <a:buChar char="o"/>
-            </a:pPr>
-            <a:r>
-              <a:rPr lang="en-US" dirty="0">
-                <a:latin typeface="Open Sans"/>
-                <a:ea typeface="Open Sans"/>
-                <a:cs typeface="Open Sans"/>
-              </a:rPr>
-              <a:t>Anythin you might not need to use everytime</a:t>
-            </a:r>
-            <a:endParaRPr lang="en" dirty="0">
-              <a:latin typeface="Open Sans"/>
-              <a:ea typeface="Open Sans"/>
-              <a:cs typeface="Open Sans"/>
+              <a:solidFill>
+                <a:srgbClr val="0B5C92"/>
+              </a:solidFill>
+              <a:latin typeface="Menlo Regular"/>
+              <a:ea typeface="Menlo Regular"/>
+              <a:cs typeface="Menlo Regular"/>
+              <a:sym typeface="Courier New"/>
             </a:endParaRPr>
           </a:p>
           <a:p>
@@ -21700,7 +21509,7 @@
               <a:buNone/>
             </a:pPr>
             <a:r>
-              <a:rPr lang="en-US" sz="5500" dirty="0" smtClean="0">
+              <a:rPr lang="en-US" sz="9600" dirty="0" smtClean="0">
                 <a:solidFill>
                   <a:srgbClr val="FF0000"/>
                 </a:solidFill>
@@ -21708,9 +21517,9 @@
                 <a:cs typeface="Yanone Kaffeesatz Bold"/>
                 <a:sym typeface="Ubuntu"/>
               </a:rPr>
-              <a:t>Installing Packages</a:t>
-            </a:r>
-            <a:endParaRPr lang="en" sz="5500" dirty="0">
+              <a:t>Packages</a:t>
+            </a:r>
+            <a:endParaRPr lang="en" sz="9600" dirty="0">
               <a:solidFill>
                 <a:srgbClr val="FF0000"/>
               </a:solidFill>
@@ -21753,6 +21562,293 @@
               <a:buNone/>
             </a:pPr>
             <a:r>
+              <a:rPr lang="en" dirty="0"/>
+              <a:t>Useful behavior beyond the "basics"</a:t>
+            </a:r>
+          </a:p>
+          <a:p>
+            <a:pPr lvl="0" rtl="0">
+              <a:spcBef>
+                <a:spcPts val="0"/>
+              </a:spcBef>
+              <a:buNone/>
+            </a:pPr>
+            <a:endParaRPr dirty="0"/>
+          </a:p>
+          <a:p>
+            <a:pPr marL="457200" lvl="0" indent="-419100" rtl="0">
+              <a:spcBef>
+                <a:spcPts val="0"/>
+              </a:spcBef>
+              <a:buClr>
+                <a:schemeClr val="dk1"/>
+              </a:buClr>
+              <a:buSzPct val="100000"/>
+              <a:buFont typeface="Arial"/>
+              <a:buChar char="●"/>
+            </a:pPr>
+            <a:r>
+              <a:rPr lang="en-US" dirty="0"/>
+              <a:t>Python </a:t>
+            </a:r>
+            <a:r>
+              <a:rPr lang="en" dirty="0"/>
+              <a:t>Standard Library</a:t>
+            </a:r>
+          </a:p>
+          <a:p>
+            <a:pPr marL="914400" lvl="1" indent="-381000" rtl="0">
+              <a:spcBef>
+                <a:spcPts val="0"/>
+              </a:spcBef>
+              <a:buClr>
+                <a:schemeClr val="dk1"/>
+              </a:buClr>
+              <a:buSzPct val="80000"/>
+              <a:buFont typeface="Courier New"/>
+              <a:buChar char="o"/>
+            </a:pPr>
+            <a:r>
+              <a:rPr lang="en-US" dirty="0">
+                <a:latin typeface="Open Sans"/>
+                <a:ea typeface="Open Sans"/>
+                <a:cs typeface="Open Sans"/>
+              </a:rPr>
+              <a:t>Math functions</a:t>
+            </a:r>
+            <a:endParaRPr lang="en" dirty="0">
+              <a:latin typeface="Open Sans"/>
+              <a:ea typeface="Open Sans"/>
+              <a:cs typeface="Open Sans"/>
+            </a:endParaRPr>
+          </a:p>
+          <a:p>
+            <a:pPr marL="914400" lvl="1" indent="-381000" rtl="0">
+              <a:spcBef>
+                <a:spcPts val="0"/>
+              </a:spcBef>
+              <a:buClr>
+                <a:schemeClr val="dk1"/>
+              </a:buClr>
+              <a:buSzPct val="80000"/>
+              <a:buFont typeface="Courier New"/>
+              <a:buChar char="o"/>
+            </a:pPr>
+            <a:r>
+              <a:rPr lang="en-US" dirty="0">
+                <a:latin typeface="Open Sans"/>
+                <a:ea typeface="Open Sans"/>
+                <a:cs typeface="Open Sans"/>
+              </a:rPr>
+              <a:t>Everything we've done so far</a:t>
+            </a:r>
+            <a:endParaRPr lang="en" dirty="0">
+              <a:latin typeface="Open Sans"/>
+              <a:ea typeface="Open Sans"/>
+              <a:cs typeface="Open Sans"/>
+            </a:endParaRPr>
+          </a:p>
+          <a:p>
+            <a:pPr marL="457200" lvl="0" indent="-419100" rtl="0">
+              <a:spcBef>
+                <a:spcPts val="0"/>
+              </a:spcBef>
+              <a:buClr>
+                <a:schemeClr val="dk1"/>
+              </a:buClr>
+              <a:buSzPct val="100000"/>
+              <a:buFont typeface="Arial"/>
+              <a:buChar char="●"/>
+            </a:pPr>
+            <a:r>
+              <a:rPr lang="en-US" dirty="0"/>
+              <a:t>Python packages</a:t>
+            </a:r>
+            <a:endParaRPr lang="en" dirty="0"/>
+          </a:p>
+          <a:p>
+            <a:pPr marL="914400" lvl="1" indent="-381000" rtl="0">
+              <a:spcBef>
+                <a:spcPts val="0"/>
+              </a:spcBef>
+              <a:buClr>
+                <a:schemeClr val="dk1"/>
+              </a:buClr>
+              <a:buSzPct val="80000"/>
+              <a:buFont typeface="Courier New"/>
+              <a:buChar char="o"/>
+            </a:pPr>
+            <a:r>
+              <a:rPr lang="en" dirty="0">
+                <a:latin typeface="Open Sans"/>
+                <a:ea typeface="Open Sans"/>
+                <a:cs typeface="Open Sans"/>
+              </a:rPr>
+              <a:t>Just about everything else</a:t>
+            </a:r>
+            <a:endParaRPr lang="en-US" dirty="0">
+              <a:latin typeface="Open Sans"/>
+              <a:ea typeface="Open Sans"/>
+              <a:cs typeface="Open Sans"/>
+            </a:endParaRPr>
+          </a:p>
+          <a:p>
+            <a:pPr marL="914400" lvl="1" indent="-381000" rtl="0">
+              <a:spcBef>
+                <a:spcPts val="0"/>
+              </a:spcBef>
+              <a:buClr>
+                <a:schemeClr val="dk1"/>
+              </a:buClr>
+              <a:buSzPct val="80000"/>
+              <a:buFont typeface="Courier New"/>
+              <a:buChar char="o"/>
+            </a:pPr>
+            <a:r>
+              <a:rPr lang="en-US" dirty="0">
+                <a:latin typeface="Open Sans"/>
+                <a:ea typeface="Open Sans"/>
+                <a:cs typeface="Open Sans"/>
+              </a:rPr>
+              <a:t>Anythin you might not need to use everytime</a:t>
+            </a:r>
+            <a:endParaRPr lang="en" dirty="0">
+              <a:latin typeface="Open Sans"/>
+              <a:ea typeface="Open Sans"/>
+              <a:cs typeface="Open Sans"/>
+            </a:endParaRPr>
+          </a:p>
+          <a:p>
+            <a:pPr>
+              <a:spcBef>
+                <a:spcPts val="0"/>
+              </a:spcBef>
+              <a:buNone/>
+            </a:pPr>
+            <a:endParaRPr dirty="0"/>
+          </a:p>
+        </p:txBody>
+      </p:sp>
+    </p:spTree>
+  </p:cSld>
+  <p:clrMapOvr>
+    <a:masterClrMapping/>
+  </p:clrMapOvr>
+  <p:transition xmlns:p14="http://schemas.microsoft.com/office/powerpoint/2010/main" spd="slow">
+    <p:cut/>
+  </p:transition>
+  <p:timing>
+    <p:tnLst>
+      <p:par>
+        <p:cTn xmlns:p14="http://schemas.microsoft.com/office/powerpoint/2010/main" id="1" dur="indefinite" restart="never" nodeType="tmRoot"/>
+      </p:par>
+    </p:tnLst>
+  </p:timing>
+</p:sld>
+</file>
+
+<file path=ppt/slides/slide32.xml><?xml version="1.0" encoding="utf-8"?>
+<p:sld xmlns:a="http://schemas.openxmlformats.org/drawingml/2006/main" xmlns:r="http://schemas.openxmlformats.org/officeDocument/2006/relationships" xmlns:p="http://schemas.openxmlformats.org/presentationml/2006/main">
+  <p:cSld>
+    <p:spTree>
+      <p:nvGrpSpPr>
+        <p:cNvPr id="1" name="Shape 206"/>
+        <p:cNvGrpSpPr/>
+        <p:nvPr/>
+      </p:nvGrpSpPr>
+      <p:grpSpPr>
+        <a:xfrm>
+          <a:off x="0" y="0"/>
+          <a:ext cx="0" cy="0"/>
+          <a:chOff x="0" y="0"/>
+          <a:chExt cx="0" cy="0"/>
+        </a:xfrm>
+      </p:grpSpPr>
+      <p:sp>
+        <p:nvSpPr>
+          <p:cNvPr id="207" name="Shape 207"/>
+          <p:cNvSpPr txBox="1">
+            <a:spLocks noGrp="1"/>
+          </p:cNvSpPr>
+          <p:nvPr>
+            <p:ph type="title"/>
+          </p:nvPr>
+        </p:nvSpPr>
+        <p:spPr>
+          <a:xfrm>
+            <a:off x="457200" y="274636"/>
+            <a:ext cx="8229600" cy="1325563"/>
+          </a:xfrm>
+          <a:prstGeom prst="rect">
+            <a:avLst/>
+          </a:prstGeom>
+        </p:spPr>
+        <p:txBody>
+          <a:bodyPr lIns="91425" tIns="91425" rIns="91425" bIns="91425" anchor="b" anchorCtr="0">
+            <a:noAutofit/>
+          </a:bodyPr>
+          <a:lstStyle/>
+          <a:p>
+            <a:pPr>
+              <a:spcBef>
+                <a:spcPts val="0"/>
+              </a:spcBef>
+              <a:buNone/>
+            </a:pPr>
+            <a:r>
+              <a:rPr lang="en-US" sz="5500" dirty="0" smtClean="0">
+                <a:solidFill>
+                  <a:srgbClr val="FF0000"/>
+                </a:solidFill>
+                <a:latin typeface="Yanone Kaffeesatz Bold"/>
+                <a:cs typeface="Yanone Kaffeesatz Bold"/>
+                <a:sym typeface="Ubuntu"/>
+              </a:rPr>
+              <a:t>Installing Packages</a:t>
+            </a:r>
+            <a:endParaRPr lang="en" sz="5500" dirty="0">
+              <a:solidFill>
+                <a:srgbClr val="FF0000"/>
+              </a:solidFill>
+              <a:latin typeface="Yanone Kaffeesatz Bold"/>
+              <a:cs typeface="Yanone Kaffeesatz Bold"/>
+              <a:sym typeface="Ubuntu"/>
+            </a:endParaRPr>
+          </a:p>
+        </p:txBody>
+      </p:sp>
+      <p:sp>
+        <p:nvSpPr>
+          <p:cNvPr id="208" name="Shape 208"/>
+          <p:cNvSpPr txBox="1">
+            <a:spLocks noGrp="1"/>
+          </p:cNvSpPr>
+          <p:nvPr>
+            <p:ph type="body" idx="1"/>
+          </p:nvPr>
+        </p:nvSpPr>
+        <p:spPr>
+          <a:xfrm>
+            <a:off x="457200" y="1600200"/>
+            <a:ext cx="8229600" cy="4967700"/>
+          </a:xfrm>
+          <a:prstGeom prst="rect">
+            <a:avLst/>
+          </a:prstGeom>
+        </p:spPr>
+        <p:txBody>
+          <a:bodyPr lIns="91425" tIns="91425" rIns="91425" bIns="91425" anchor="t" anchorCtr="0">
+            <a:noAutofit/>
+          </a:bodyPr>
+          <a:lstStyle/>
+          <a:p>
+            <a:pPr lvl="0" rtl="0">
+              <a:spcBef>
+                <a:spcPts val="0"/>
+              </a:spcBef>
+              <a:buNone/>
+            </a:pPr>
+            <a:r>
               <a:rPr lang="en-US" sz="2000" dirty="0" smtClean="0"/>
               <a:t>How do you get them on your computer?</a:t>
             </a:r>
@@ -21962,7 +22058,7 @@
 </p:sld>
 </file>
 
-<file path=ppt/slides/slide32.xml><?xml version="1.0" encoding="utf-8"?>
+<file path=ppt/slides/slide33.xml><?xml version="1.0" encoding="utf-8"?>
 <p:sld xmlns:a="http://schemas.openxmlformats.org/drawingml/2006/main" xmlns:r="http://schemas.openxmlformats.org/officeDocument/2006/relationships" xmlns:p="http://schemas.openxmlformats.org/presentationml/2006/main">
   <p:cSld>
     <p:spTree>
@@ -22456,7 +22552,7 @@
 </p:sld>
 </file>
 
-<file path=ppt/slides/slide33.xml><?xml version="1.0" encoding="utf-8"?>
+<file path=ppt/slides/slide34.xml><?xml version="1.0" encoding="utf-8"?>
 <p:sld xmlns:a="http://schemas.openxmlformats.org/drawingml/2006/main" xmlns:r="http://schemas.openxmlformats.org/officeDocument/2006/relationships" xmlns:p="http://schemas.openxmlformats.org/presentationml/2006/main">
   <p:cSld>
     <p:spTree>
@@ -22762,7 +22858,7 @@
 </p:sld>
 </file>
 
-<file path=ppt/slides/slide34.xml><?xml version="1.0" encoding="utf-8"?>
+<file path=ppt/slides/slide35.xml><?xml version="1.0" encoding="utf-8"?>
 <p:sld xmlns:a="http://schemas.openxmlformats.org/drawingml/2006/main" xmlns:r="http://schemas.openxmlformats.org/officeDocument/2006/relationships" xmlns:p="http://schemas.openxmlformats.org/presentationml/2006/main">
   <p:cSld>
     <p:spTree>
@@ -23447,7 +23543,99 @@
 </p:sld>
 </file>
 
-<file path=ppt/slides/slide35.xml><?xml version="1.0" encoding="utf-8"?>
+<file path=ppt/slides/slide36.xml><?xml version="1.0" encoding="utf-8"?>
+<p:sld xmlns:a="http://schemas.openxmlformats.org/drawingml/2006/main" xmlns:r="http://schemas.openxmlformats.org/officeDocument/2006/relationships" xmlns:p="http://schemas.openxmlformats.org/presentationml/2006/main">
+  <p:cSld>
+    <p:spTree>
+      <p:nvGrpSpPr>
+        <p:cNvPr id="1" name=""/>
+        <p:cNvGrpSpPr/>
+        <p:nvPr/>
+      </p:nvGrpSpPr>
+      <p:grpSpPr>
+        <a:xfrm>
+          <a:off x="0" y="0"/>
+          <a:ext cx="0" cy="0"/>
+          <a:chOff x="0" y="0"/>
+          <a:chExt cx="0" cy="0"/>
+        </a:xfrm>
+      </p:grpSpPr>
+      <p:sp>
+        <p:nvSpPr>
+          <p:cNvPr id="2" name="Title 1"/>
+          <p:cNvSpPr>
+            <a:spLocks noGrp="1"/>
+          </p:cNvSpPr>
+          <p:nvPr>
+            <p:ph type="title"/>
+          </p:nvPr>
+        </p:nvSpPr>
+        <p:spPr/>
+        <p:txBody>
+          <a:bodyPr/>
+          <a:lstStyle/>
+          <a:p>
+            <a:endParaRPr lang="en-US"/>
+          </a:p>
+        </p:txBody>
+      </p:sp>
+      <p:sp>
+        <p:nvSpPr>
+          <p:cNvPr id="3" name="Text Placeholder 2"/>
+          <p:cNvSpPr>
+            <a:spLocks noGrp="1"/>
+          </p:cNvSpPr>
+          <p:nvPr>
+            <p:ph type="body" idx="1"/>
+          </p:nvPr>
+        </p:nvSpPr>
+        <p:spPr/>
+        <p:txBody>
+          <a:bodyPr/>
+          <a:lstStyle/>
+          <a:p>
+            <a:endParaRPr lang="en-US"/>
+          </a:p>
+        </p:txBody>
+      </p:sp>
+      <p:pic>
+        <p:nvPicPr>
+          <p:cNvPr id="4" name="Picture 3"/>
+          <p:cNvPicPr>
+            <a:picLocks noChangeAspect="1"/>
+          </p:cNvPicPr>
+          <p:nvPr/>
+        </p:nvPicPr>
+        <p:blipFill>
+          <a:blip r:embed="rId2"/>
+          <a:stretch>
+            <a:fillRect/>
+          </a:stretch>
+        </p:blipFill>
+        <p:spPr>
+          <a:xfrm>
+            <a:off x="2146300" y="0"/>
+            <a:ext cx="4834890" cy="6858000"/>
+          </a:xfrm>
+          <a:prstGeom prst="rect">
+            <a:avLst/>
+          </a:prstGeom>
+        </p:spPr>
+      </p:pic>
+    </p:spTree>
+    <p:extLst>
+      <p:ext uri="{BB962C8B-B14F-4D97-AF65-F5344CB8AC3E}">
+        <p14:creationId xmlns:p14="http://schemas.microsoft.com/office/powerpoint/2010/main" val="2003699491"/>
+      </p:ext>
+    </p:extLst>
+  </p:cSld>
+  <p:clrMapOvr>
+    <a:masterClrMapping/>
+  </p:clrMapOvr>
+</p:sld>
+</file>
+
+<file path=ppt/slides/slide37.xml><?xml version="1.0" encoding="utf-8"?>
 <p:sld xmlns:a="http://schemas.openxmlformats.org/drawingml/2006/main" xmlns:r="http://schemas.openxmlformats.org/officeDocument/2006/relationships" xmlns:p="http://schemas.openxmlformats.org/presentationml/2006/main">
   <p:cSld>
     <p:spTree>
@@ -23667,7 +23855,7 @@
 </p:sld>
 </file>
 
-<file path=ppt/slides/slide36.xml><?xml version="1.0" encoding="utf-8"?>
+<file path=ppt/slides/slide38.xml><?xml version="1.0" encoding="utf-8"?>
 <p:sld xmlns:a="http://schemas.openxmlformats.org/drawingml/2006/main" xmlns:r="http://schemas.openxmlformats.org/officeDocument/2006/relationships" xmlns:p="http://schemas.openxmlformats.org/presentationml/2006/main">
   <p:cSld>
     <p:spTree>
@@ -24401,7 +24589,7 @@
 </p:sld>
 </file>
 
-<file path=ppt/slides/slide37.xml><?xml version="1.0" encoding="utf-8"?>
+<file path=ppt/slides/slide39.xml><?xml version="1.0" encoding="utf-8"?>
 <p:sld xmlns:a="http://schemas.openxmlformats.org/drawingml/2006/main" xmlns:r="http://schemas.openxmlformats.org/officeDocument/2006/relationships" xmlns:p="http://schemas.openxmlformats.org/presentationml/2006/main">
   <p:cSld>
     <p:spTree>
@@ -25164,1073 +25352,6 @@
       </p:par>
     </p:tnLst>
   </p:timing>
-</p:sld>
-</file>
-
-<file path=ppt/slides/slide38.xml><?xml version="1.0" encoding="utf-8"?>
-<p:sld xmlns:a="http://schemas.openxmlformats.org/drawingml/2006/main" xmlns:r="http://schemas.openxmlformats.org/officeDocument/2006/relationships" xmlns:p="http://schemas.openxmlformats.org/presentationml/2006/main">
-  <p:cSld>
-    <p:spTree>
-      <p:nvGrpSpPr>
-        <p:cNvPr id="1" name="Shape 248"/>
-        <p:cNvGrpSpPr/>
-        <p:nvPr/>
-      </p:nvGrpSpPr>
-      <p:grpSpPr>
-        <a:xfrm>
-          <a:off x="0" y="0"/>
-          <a:ext cx="0" cy="0"/>
-          <a:chOff x="0" y="0"/>
-          <a:chExt cx="0" cy="0"/>
-        </a:xfrm>
-      </p:grpSpPr>
-      <p:sp>
-        <p:nvSpPr>
-          <p:cNvPr id="249" name="Shape 249"/>
-          <p:cNvSpPr txBox="1">
-            <a:spLocks noGrp="1"/>
-          </p:cNvSpPr>
-          <p:nvPr>
-            <p:ph type="title"/>
-          </p:nvPr>
-        </p:nvSpPr>
-        <p:spPr>
-          <a:xfrm>
-            <a:off x="457200" y="274636"/>
-            <a:ext cx="8229600" cy="1325563"/>
-          </a:xfrm>
-          <a:prstGeom prst="rect">
-            <a:avLst/>
-          </a:prstGeom>
-        </p:spPr>
-        <p:txBody>
-          <a:bodyPr lIns="91425" tIns="91425" rIns="91425" bIns="91425" anchor="b" anchorCtr="0">
-            <a:noAutofit/>
-          </a:bodyPr>
-          <a:lstStyle/>
-          <a:p>
-            <a:pPr>
-              <a:spcBef>
-                <a:spcPts val="0"/>
-              </a:spcBef>
-              <a:buNone/>
-            </a:pPr>
-            <a:r>
-              <a:rPr lang="en" sz="9600" dirty="0" smtClean="0">
-                <a:solidFill>
-                  <a:srgbClr val="FF0000"/>
-                </a:solidFill>
-                <a:latin typeface="Yanone Kaffeesatz Bold"/>
-                <a:cs typeface="Yanone Kaffeesatz Bold"/>
-              </a:rPr>
-              <a:t>Exercise</a:t>
-            </a:r>
-            <a:endParaRPr lang="en" dirty="0"/>
-          </a:p>
-        </p:txBody>
-      </p:sp>
-      <p:sp>
-        <p:nvSpPr>
-          <p:cNvPr id="250" name="Shape 250"/>
-          <p:cNvSpPr txBox="1">
-            <a:spLocks noGrp="1"/>
-          </p:cNvSpPr>
-          <p:nvPr>
-            <p:ph type="body" idx="1"/>
-          </p:nvPr>
-        </p:nvSpPr>
-        <p:spPr>
-          <a:xfrm>
-            <a:off x="457200" y="1600200"/>
-            <a:ext cx="8229600" cy="4967700"/>
-          </a:xfrm>
-          <a:prstGeom prst="rect">
-            <a:avLst/>
-          </a:prstGeom>
-        </p:spPr>
-        <p:txBody>
-          <a:bodyPr lIns="91425" tIns="91425" rIns="91425" bIns="91425" anchor="t" anchorCtr="0">
-            <a:noAutofit/>
-          </a:bodyPr>
-          <a:lstStyle/>
-          <a:p>
-            <a:pPr lvl="0" rtl="0">
-              <a:lnSpc>
-                <a:spcPct val="115000"/>
-              </a:lnSpc>
-              <a:spcBef>
-                <a:spcPts val="0"/>
-              </a:spcBef>
-              <a:buNone/>
-            </a:pPr>
-            <a:r>
-              <a:rPr lang="en" sz="2000" dirty="0">
-                <a:solidFill>
-                  <a:srgbClr val="000000"/>
-                </a:solidFill>
-              </a:rPr>
-              <a:t>Create a collection of 19th- and 20th-century authors (or historical/political figures if that's your bag!) and their birth dates (historical accuracy doesn't matter).  An example:</a:t>
-            </a:r>
-          </a:p>
-          <a:p>
-            <a:pPr lvl="0" rtl="0">
-              <a:lnSpc>
-                <a:spcPct val="115000"/>
-              </a:lnSpc>
-              <a:spcBef>
-                <a:spcPts val="0"/>
-              </a:spcBef>
-              <a:buNone/>
-            </a:pPr>
-            <a:endParaRPr sz="2000" dirty="0">
-              <a:solidFill>
-                <a:srgbClr val="000000"/>
-              </a:solidFill>
-            </a:endParaRPr>
-          </a:p>
-          <a:p>
-            <a:pPr lvl="0" rtl="0">
-              <a:lnSpc>
-                <a:spcPct val="115000"/>
-              </a:lnSpc>
-              <a:spcBef>
-                <a:spcPts val="0"/>
-              </a:spcBef>
-              <a:buNone/>
-            </a:pPr>
-            <a:r>
-              <a:rPr lang="en" sz="2000" dirty="0">
-                <a:solidFill>
-                  <a:srgbClr val="000000"/>
-                </a:solidFill>
-                <a:latin typeface="Menlo Regular"/>
-                <a:ea typeface="Menlo Regular"/>
-                <a:cs typeface="Menlo Regular"/>
-                <a:sym typeface="Courier New"/>
-              </a:rPr>
-              <a:t>birth_dates = </a:t>
-            </a:r>
-            <a:r>
-              <a:rPr lang="en" sz="2000" dirty="0">
-                <a:solidFill>
-                  <a:srgbClr val="FF0000"/>
-                </a:solidFill>
-                <a:latin typeface="Menlo Regular"/>
-                <a:ea typeface="Menlo Regular"/>
-                <a:cs typeface="Menlo Regular"/>
-                <a:sym typeface="Courier New"/>
-              </a:rPr>
-              <a:t>{"Wallace </a:t>
-            </a:r>
-            <a:r>
-              <a:rPr lang="en" sz="2000" dirty="0" smtClean="0">
-                <a:solidFill>
-                  <a:srgbClr val="FF0000"/>
-                </a:solidFill>
-                <a:latin typeface="Menlo Regular"/>
-                <a:ea typeface="Menlo Regular"/>
-                <a:cs typeface="Menlo Regular"/>
-                <a:sym typeface="Courier New"/>
-              </a:rPr>
-              <a:t>Stevens</a:t>
-            </a:r>
-            <a:r>
-              <a:rPr lang="en-US" sz="2000" dirty="0" smtClean="0">
-                <a:solidFill>
-                  <a:srgbClr val="FF0000"/>
-                </a:solidFill>
-                <a:latin typeface="Menlo Regular"/>
-                <a:ea typeface="Menlo Regular"/>
-                <a:cs typeface="Menlo Regular"/>
-                <a:sym typeface="Courier New"/>
-              </a:rPr>
-              <a:t>"</a:t>
-            </a:r>
-            <a:r>
-              <a:rPr lang="en" sz="2000" dirty="0" smtClean="0">
-                <a:solidFill>
-                  <a:srgbClr val="FF0000"/>
-                </a:solidFill>
-                <a:latin typeface="Menlo Regular"/>
-                <a:ea typeface="Menlo Regular"/>
-                <a:cs typeface="Menlo Regular"/>
-                <a:sym typeface="Courier New"/>
-              </a:rPr>
-              <a:t>:</a:t>
-            </a:r>
-            <a:r>
-              <a:rPr lang="en" sz="2000" dirty="0" smtClean="0">
-                <a:solidFill>
-                  <a:srgbClr val="000000"/>
-                </a:solidFill>
-                <a:latin typeface="Menlo Regular"/>
-                <a:ea typeface="Menlo Regular"/>
-                <a:cs typeface="Menlo Regular"/>
-                <a:sym typeface="Courier New"/>
-              </a:rPr>
-              <a:t> </a:t>
-            </a:r>
-            <a:r>
-              <a:rPr lang="en" sz="2000" dirty="0">
-                <a:solidFill>
-                  <a:srgbClr val="11889C"/>
-                </a:solidFill>
-                <a:latin typeface="Menlo Regular"/>
-                <a:ea typeface="Menlo Regular"/>
-                <a:cs typeface="Menlo Regular"/>
-                <a:sym typeface="Courier New"/>
-              </a:rPr>
-              <a:t>1879</a:t>
-            </a:r>
-            <a:r>
-              <a:rPr lang="en" sz="2000" dirty="0">
-                <a:solidFill>
-                  <a:srgbClr val="000000"/>
-                </a:solidFill>
-                <a:latin typeface="Menlo Regular"/>
-                <a:ea typeface="Menlo Regular"/>
-                <a:cs typeface="Menlo Regular"/>
-                <a:sym typeface="Courier New"/>
-              </a:rPr>
-              <a:t>}</a:t>
-            </a:r>
-          </a:p>
-          <a:p>
-            <a:pPr lvl="0" rtl="0">
-              <a:lnSpc>
-                <a:spcPct val="115000"/>
-              </a:lnSpc>
-              <a:spcBef>
-                <a:spcPts val="0"/>
-              </a:spcBef>
-              <a:buNone/>
-            </a:pPr>
-            <a:endParaRPr sz="2000" dirty="0">
-              <a:solidFill>
-                <a:srgbClr val="000000"/>
-              </a:solidFill>
-              <a:latin typeface="Menlo Regular"/>
-              <a:ea typeface="Menlo Regular"/>
-              <a:cs typeface="Menlo Regular"/>
-              <a:sym typeface="Courier New"/>
-            </a:endParaRPr>
-          </a:p>
-          <a:p>
-            <a:pPr lvl="0" rtl="0">
-              <a:lnSpc>
-                <a:spcPct val="115000"/>
-              </a:lnSpc>
-              <a:spcBef>
-                <a:spcPts val="0"/>
-              </a:spcBef>
-              <a:buNone/>
-            </a:pPr>
-            <a:r>
-              <a:rPr lang="en" sz="2000" dirty="0">
-                <a:solidFill>
-                  <a:srgbClr val="000000"/>
-                </a:solidFill>
-              </a:rPr>
-              <a:t>Count the number of 19th-century birth dates and the number of 20th-century birth dates, then print the results like:</a:t>
-            </a:r>
-          </a:p>
-          <a:p>
-            <a:pPr lvl="0" rtl="0">
-              <a:lnSpc>
-                <a:spcPct val="115000"/>
-              </a:lnSpc>
-              <a:spcBef>
-                <a:spcPts val="0"/>
-              </a:spcBef>
-              <a:buNone/>
-            </a:pPr>
-            <a:endParaRPr sz="2000" dirty="0">
-              <a:solidFill>
-                <a:srgbClr val="000000"/>
-              </a:solidFill>
-            </a:endParaRPr>
-          </a:p>
-          <a:p>
-            <a:pPr lvl="0" rtl="0">
-              <a:lnSpc>
-                <a:spcPct val="115000"/>
-              </a:lnSpc>
-              <a:spcBef>
-                <a:spcPts val="0"/>
-              </a:spcBef>
-              <a:buNone/>
-            </a:pPr>
-            <a:r>
-              <a:rPr lang="en" sz="2000" dirty="0">
-                <a:solidFill>
-                  <a:srgbClr val="000000"/>
-                </a:solidFill>
-                <a:latin typeface="Menlo Regular"/>
-                <a:ea typeface="Menlo Regular"/>
-                <a:cs typeface="Menlo Regular"/>
-                <a:sym typeface="Courier New"/>
-              </a:rPr>
-              <a:t>There are 3 19th-c. births and 2 20th-c. births in my collection.</a:t>
-            </a:r>
-          </a:p>
-          <a:p>
-            <a:pPr lvl="0" rtl="0">
-              <a:lnSpc>
-                <a:spcPct val="115000"/>
-              </a:lnSpc>
-              <a:spcBef>
-                <a:spcPts val="0"/>
-              </a:spcBef>
-              <a:buNone/>
-            </a:pPr>
-            <a:endParaRPr sz="2000" dirty="0">
-              <a:solidFill>
-                <a:srgbClr val="000000"/>
-              </a:solidFill>
-            </a:endParaRPr>
-          </a:p>
-          <a:p>
-            <a:pPr>
-              <a:spcBef>
-                <a:spcPts val="0"/>
-              </a:spcBef>
-              <a:buNone/>
-            </a:pPr>
-            <a:endParaRPr sz="2000" dirty="0"/>
-          </a:p>
-        </p:txBody>
-      </p:sp>
-    </p:spTree>
-  </p:cSld>
-  <p:clrMapOvr>
-    <a:masterClrMapping/>
-  </p:clrMapOvr>
-  <p:transition xmlns:p14="http://schemas.microsoft.com/office/powerpoint/2010/main" spd="slow">
-    <p:cut/>
-  </p:transition>
-  <p:timing>
-    <p:tnLst>
-      <p:par>
-        <p:cTn xmlns:p14="http://schemas.microsoft.com/office/powerpoint/2010/main" id="1" dur="indefinite" restart="never" nodeType="tmRoot"/>
-      </p:par>
-    </p:tnLst>
-  </p:timing>
-</p:sld>
-</file>
-
-<file path=ppt/slides/slide39.xml><?xml version="1.0" encoding="utf-8"?>
-<p:sld xmlns:a="http://schemas.openxmlformats.org/drawingml/2006/main" xmlns:r="http://schemas.openxmlformats.org/officeDocument/2006/relationships" xmlns:p="http://schemas.openxmlformats.org/presentationml/2006/main">
-  <p:cSld>
-    <p:spTree>
-      <p:nvGrpSpPr>
-        <p:cNvPr id="1" name="Shape 254"/>
-        <p:cNvGrpSpPr/>
-        <p:nvPr/>
-      </p:nvGrpSpPr>
-      <p:grpSpPr>
-        <a:xfrm>
-          <a:off x="0" y="0"/>
-          <a:ext cx="0" cy="0"/>
-          <a:chOff x="0" y="0"/>
-          <a:chExt cx="0" cy="0"/>
-        </a:xfrm>
-      </p:grpSpPr>
-      <p:sp>
-        <p:nvSpPr>
-          <p:cNvPr id="255" name="Shape 255"/>
-          <p:cNvSpPr txBox="1">
-            <a:spLocks noGrp="1"/>
-          </p:cNvSpPr>
-          <p:nvPr>
-            <p:ph type="title"/>
-          </p:nvPr>
-        </p:nvSpPr>
-        <p:spPr>
-          <a:xfrm>
-            <a:off x="457200" y="274636"/>
-            <a:ext cx="8229600" cy="1325563"/>
-          </a:xfrm>
-          <a:prstGeom prst="rect">
-            <a:avLst/>
-          </a:prstGeom>
-        </p:spPr>
-        <p:txBody>
-          <a:bodyPr lIns="91425" tIns="91425" rIns="91425" bIns="91425" anchor="b" anchorCtr="0">
-            <a:noAutofit/>
-          </a:bodyPr>
-          <a:lstStyle/>
-          <a:p>
-            <a:pPr>
-              <a:spcBef>
-                <a:spcPts val="0"/>
-              </a:spcBef>
-              <a:buNone/>
-            </a:pPr>
-            <a:r>
-              <a:rPr lang="en-US" sz="9600" dirty="0">
-                <a:solidFill>
-                  <a:srgbClr val="FF0000"/>
-                </a:solidFill>
-                <a:latin typeface="Yanone Kaffeesatz Bold"/>
-                <a:cs typeface="Yanone Kaffeesatz Bold"/>
-              </a:rPr>
-              <a:t>An Answer</a:t>
-            </a:r>
-            <a:endParaRPr lang="en" sz="9600" dirty="0">
-              <a:solidFill>
-                <a:srgbClr val="FF0000"/>
-              </a:solidFill>
-              <a:latin typeface="Yanone Kaffeesatz Bold"/>
-              <a:cs typeface="Yanone Kaffeesatz Bold"/>
-            </a:endParaRPr>
-          </a:p>
-        </p:txBody>
-      </p:sp>
-      <p:sp>
-        <p:nvSpPr>
-          <p:cNvPr id="256" name="Shape 256"/>
-          <p:cNvSpPr txBox="1">
-            <a:spLocks noGrp="1"/>
-          </p:cNvSpPr>
-          <p:nvPr>
-            <p:ph type="body" idx="1"/>
-          </p:nvPr>
-        </p:nvSpPr>
-        <p:spPr>
-          <a:xfrm>
-            <a:off x="457200" y="1600200"/>
-            <a:ext cx="8229600" cy="4967700"/>
-          </a:xfrm>
-          <a:prstGeom prst="rect">
-            <a:avLst/>
-          </a:prstGeom>
-        </p:spPr>
-        <p:txBody>
-          <a:bodyPr lIns="91425" tIns="91425" rIns="91425" bIns="91425" anchor="t" anchorCtr="0">
-            <a:noAutofit/>
-          </a:bodyPr>
-          <a:lstStyle/>
-          <a:p>
-            <a:pPr lvl="0" rtl="0">
-              <a:lnSpc>
-                <a:spcPct val="115000"/>
-              </a:lnSpc>
-              <a:spcBef>
-                <a:spcPts val="0"/>
-              </a:spcBef>
-              <a:buNone/>
-            </a:pPr>
-            <a:r>
-              <a:rPr lang="en" sz="2100" dirty="0">
-                <a:solidFill>
-                  <a:schemeClr val="tx1"/>
-                </a:solidFill>
-                <a:latin typeface="Menlo Regular"/>
-                <a:ea typeface="Menlo Regular"/>
-                <a:cs typeface="Menlo Regular"/>
-                <a:sym typeface="Courier New"/>
-              </a:rPr>
-              <a:t>birth_dates = {</a:t>
-            </a:r>
-            <a:r>
-              <a:rPr lang="en" sz="2100" dirty="0">
-                <a:solidFill>
-                  <a:srgbClr val="FF0000"/>
-                </a:solidFill>
-                <a:latin typeface="Menlo Regular"/>
-                <a:ea typeface="Menlo Regular"/>
-                <a:cs typeface="Menlo Regular"/>
-                <a:sym typeface="Courier New"/>
-              </a:rPr>
-              <a:t>'Wallace </a:t>
-            </a:r>
-            <a:r>
-              <a:rPr lang="en" sz="2100" dirty="0" smtClean="0">
-                <a:solidFill>
-                  <a:srgbClr val="FF0000"/>
-                </a:solidFill>
-                <a:latin typeface="Menlo Regular"/>
-                <a:ea typeface="Menlo Regular"/>
-                <a:cs typeface="Menlo Regular"/>
-                <a:sym typeface="Courier New"/>
-              </a:rPr>
-              <a:t>Stevens</a:t>
-            </a:r>
-            <a:r>
-              <a:rPr lang="en-US" sz="2100" dirty="0" smtClean="0">
-                <a:solidFill>
-                  <a:srgbClr val="FF0000"/>
-                </a:solidFill>
-                <a:latin typeface="Menlo Regular"/>
-                <a:ea typeface="Menlo Regular"/>
-                <a:cs typeface="Menlo Regular"/>
-                <a:sym typeface="Courier New"/>
-              </a:rPr>
-              <a:t>'</a:t>
-            </a:r>
-            <a:r>
-              <a:rPr lang="en" sz="2100" dirty="0" smtClean="0">
-                <a:solidFill>
-                  <a:srgbClr val="FF0000"/>
-                </a:solidFill>
-                <a:latin typeface="Menlo Regular"/>
-                <a:ea typeface="Menlo Regular"/>
-                <a:cs typeface="Menlo Regular"/>
-                <a:sym typeface="Courier New"/>
-              </a:rPr>
-              <a:t>:</a:t>
-            </a:r>
-            <a:r>
-              <a:rPr lang="en" sz="2100" dirty="0" smtClean="0">
-                <a:solidFill>
-                  <a:schemeClr val="tx1"/>
-                </a:solidFill>
-                <a:latin typeface="Menlo Regular"/>
-                <a:ea typeface="Menlo Regular"/>
-                <a:cs typeface="Menlo Regular"/>
-                <a:sym typeface="Courier New"/>
-              </a:rPr>
-              <a:t> </a:t>
-            </a:r>
-            <a:r>
-              <a:rPr lang="en" sz="2100" dirty="0">
-                <a:solidFill>
-                  <a:srgbClr val="11889C"/>
-                </a:solidFill>
-                <a:latin typeface="Menlo Regular"/>
-                <a:ea typeface="Menlo Regular"/>
-                <a:cs typeface="Menlo Regular"/>
-                <a:sym typeface="Courier New"/>
-              </a:rPr>
-              <a:t>1897</a:t>
-            </a:r>
-            <a:r>
-              <a:rPr lang="en" sz="2100" dirty="0">
-                <a:solidFill>
-                  <a:schemeClr val="tx1"/>
-                </a:solidFill>
-                <a:latin typeface="Menlo Regular"/>
-                <a:ea typeface="Menlo Regular"/>
-                <a:cs typeface="Menlo Regular"/>
-                <a:sym typeface="Courier New"/>
-              </a:rPr>
-              <a:t>, </a:t>
-            </a:r>
-            <a:r>
-              <a:rPr lang="en-US" sz="2100" dirty="0">
-                <a:solidFill>
-                  <a:srgbClr val="FF0000"/>
-                </a:solidFill>
-                <a:latin typeface="Menlo Regular"/>
-                <a:ea typeface="Menlo Regular"/>
-                <a:cs typeface="Menlo Regular"/>
-                <a:sym typeface="Courier New"/>
-              </a:rPr>
-              <a:t>'</a:t>
-            </a:r>
-            <a:r>
-              <a:rPr lang="en-US" sz="2100" dirty="0" smtClean="0">
-                <a:solidFill>
-                  <a:srgbClr val="FF0000"/>
-                </a:solidFill>
-                <a:latin typeface="Menlo Regular"/>
-                <a:ea typeface="Menlo Regular"/>
-                <a:cs typeface="Menlo Regular"/>
-                <a:sym typeface="Courier New"/>
-              </a:rPr>
-              <a:t>Brandon</a:t>
-            </a:r>
-            <a:r>
-              <a:rPr lang="en" sz="2100" dirty="0" smtClean="0">
-                <a:solidFill>
-                  <a:srgbClr val="FF0000"/>
-                </a:solidFill>
-                <a:latin typeface="Menlo Regular"/>
-                <a:ea typeface="Menlo Regular"/>
-                <a:cs typeface="Menlo Regular"/>
-                <a:sym typeface="Courier New"/>
-              </a:rPr>
-              <a:t> </a:t>
-            </a:r>
-            <a:r>
-              <a:rPr lang="en-US" sz="2100" dirty="0" smtClean="0">
-                <a:solidFill>
-                  <a:srgbClr val="FF0000"/>
-                </a:solidFill>
-                <a:latin typeface="Menlo Regular"/>
-                <a:ea typeface="Menlo Regular"/>
-                <a:cs typeface="Menlo Regular"/>
-                <a:sym typeface="Courier New"/>
-              </a:rPr>
-              <a:t>Walsh</a:t>
-            </a:r>
-            <a:r>
-              <a:rPr lang="en-US" sz="2200" dirty="0">
-                <a:solidFill>
-                  <a:srgbClr val="FF0000"/>
-                </a:solidFill>
-                <a:latin typeface="Menlo Regular"/>
-                <a:ea typeface="Menlo Regular"/>
-                <a:cs typeface="Menlo Regular"/>
-                <a:sym typeface="Courier New"/>
-              </a:rPr>
-              <a:t>'</a:t>
-            </a:r>
-            <a:r>
-              <a:rPr lang="en" sz="2200" dirty="0" smtClean="0">
-                <a:solidFill>
-                  <a:schemeClr val="tx1"/>
-                </a:solidFill>
-                <a:latin typeface="Menlo Regular"/>
-                <a:ea typeface="Menlo Regular"/>
-                <a:cs typeface="Menlo Regular"/>
-                <a:sym typeface="Courier New"/>
-              </a:rPr>
-              <a:t>: </a:t>
-            </a:r>
-            <a:r>
-              <a:rPr lang="en" sz="2200" dirty="0">
-                <a:solidFill>
-                  <a:srgbClr val="11889C"/>
-                </a:solidFill>
-                <a:latin typeface="Menlo Regular"/>
-                <a:ea typeface="Menlo Regular"/>
-                <a:cs typeface="Menlo Regular"/>
-                <a:sym typeface="Courier New"/>
-              </a:rPr>
-              <a:t>1977</a:t>
-            </a:r>
-            <a:r>
-              <a:rPr lang="en" sz="2200" dirty="0">
-                <a:solidFill>
-                  <a:schemeClr val="tx1"/>
-                </a:solidFill>
-                <a:latin typeface="Menlo Regular"/>
-                <a:ea typeface="Menlo Regular"/>
-                <a:cs typeface="Menlo Regular"/>
-                <a:sym typeface="Courier New"/>
-              </a:rPr>
-              <a:t>}</a:t>
-            </a:r>
-          </a:p>
-          <a:p>
-            <a:pPr lvl="0" rtl="0">
-              <a:lnSpc>
-                <a:spcPct val="115000"/>
-              </a:lnSpc>
-              <a:spcBef>
-                <a:spcPts val="0"/>
-              </a:spcBef>
-              <a:buNone/>
-            </a:pPr>
-            <a:endParaRPr sz="1000" dirty="0">
-              <a:solidFill>
-                <a:schemeClr val="tx1"/>
-              </a:solidFill>
-              <a:latin typeface="Menlo Regular"/>
-              <a:ea typeface="Menlo Regular"/>
-              <a:cs typeface="Menlo Regular"/>
-              <a:sym typeface="Courier New"/>
-            </a:endParaRPr>
-          </a:p>
-          <a:p>
-            <a:pPr lvl="0" rtl="0">
-              <a:lnSpc>
-                <a:spcPct val="115000"/>
-              </a:lnSpc>
-              <a:spcBef>
-                <a:spcPts val="0"/>
-              </a:spcBef>
-              <a:buNone/>
-            </a:pPr>
-            <a:r>
-              <a:rPr lang="en" sz="2200" dirty="0">
-                <a:solidFill>
-                  <a:schemeClr val="tx1"/>
-                </a:solidFill>
-                <a:latin typeface="Menlo Regular"/>
-                <a:ea typeface="Menlo Regular"/>
-                <a:cs typeface="Menlo Regular"/>
-                <a:sym typeface="Courier New"/>
-              </a:rPr>
-              <a:t>nineteenth_count = </a:t>
-            </a:r>
-            <a:r>
-              <a:rPr lang="en" sz="2200" dirty="0">
-                <a:solidFill>
-                  <a:srgbClr val="11889C"/>
-                </a:solidFill>
-                <a:latin typeface="Menlo Regular"/>
-                <a:ea typeface="Menlo Regular"/>
-                <a:cs typeface="Menlo Regular"/>
-                <a:sym typeface="Courier New"/>
-              </a:rPr>
-              <a:t>0</a:t>
-            </a:r>
-          </a:p>
-          <a:p>
-            <a:pPr lvl="0" rtl="0">
-              <a:lnSpc>
-                <a:spcPct val="115000"/>
-              </a:lnSpc>
-              <a:spcBef>
-                <a:spcPts val="0"/>
-              </a:spcBef>
-              <a:buNone/>
-            </a:pPr>
-            <a:r>
-              <a:rPr lang="en" sz="2200" dirty="0">
-                <a:solidFill>
-                  <a:schemeClr val="tx1"/>
-                </a:solidFill>
-                <a:latin typeface="Menlo Regular"/>
-                <a:ea typeface="Menlo Regular"/>
-                <a:cs typeface="Menlo Regular"/>
-                <a:sym typeface="Courier New"/>
-              </a:rPr>
-              <a:t>twentieth_count = </a:t>
-            </a:r>
-            <a:r>
-              <a:rPr lang="en" sz="2200" dirty="0">
-                <a:solidFill>
-                  <a:srgbClr val="11889C"/>
-                </a:solidFill>
-                <a:latin typeface="Menlo Regular"/>
-                <a:ea typeface="Menlo Regular"/>
-                <a:cs typeface="Menlo Regular"/>
-                <a:sym typeface="Courier New"/>
-              </a:rPr>
-              <a:t>0</a:t>
-            </a:r>
-            <a:r>
-              <a:rPr lang="en" sz="2200" dirty="0">
-                <a:solidFill>
-                  <a:schemeClr val="tx1"/>
-                </a:solidFill>
-                <a:latin typeface="Menlo Regular"/>
-                <a:ea typeface="Menlo Regular"/>
-                <a:cs typeface="Menlo Regular"/>
-                <a:sym typeface="Courier New"/>
-              </a:rPr>
-              <a:t> </a:t>
-            </a:r>
-            <a:endParaRPr lang="en" sz="2200" dirty="0" smtClean="0">
-              <a:solidFill>
-                <a:schemeClr val="tx1"/>
-              </a:solidFill>
-              <a:latin typeface="Menlo Regular"/>
-              <a:ea typeface="Menlo Regular"/>
-              <a:cs typeface="Menlo Regular"/>
-              <a:sym typeface="Courier New"/>
-            </a:endParaRPr>
-          </a:p>
-          <a:p>
-            <a:pPr lvl="0" rtl="0">
-              <a:lnSpc>
-                <a:spcPct val="115000"/>
-              </a:lnSpc>
-              <a:spcBef>
-                <a:spcPts val="0"/>
-              </a:spcBef>
-              <a:buNone/>
-            </a:pPr>
-            <a:endParaRPr lang="en" sz="2200" dirty="0">
-              <a:solidFill>
-                <a:schemeClr val="tx1"/>
-              </a:solidFill>
-              <a:latin typeface="Menlo Regular"/>
-              <a:ea typeface="Menlo Regular"/>
-              <a:cs typeface="Menlo Regular"/>
-              <a:sym typeface="Courier New"/>
-            </a:endParaRPr>
-          </a:p>
-          <a:p>
-            <a:pPr lvl="0" rtl="0">
-              <a:lnSpc>
-                <a:spcPct val="115000"/>
-              </a:lnSpc>
-              <a:spcBef>
-                <a:spcPts val="0"/>
-              </a:spcBef>
-              <a:buNone/>
-            </a:pPr>
-            <a:r>
-              <a:rPr lang="en-US" sz="2200" dirty="0" smtClean="0">
-                <a:solidFill>
-                  <a:schemeClr val="tx1"/>
-                </a:solidFill>
-                <a:latin typeface="Menlo Regular"/>
-                <a:ea typeface="Menlo Regular"/>
-                <a:cs typeface="Menlo Regular"/>
-                <a:sym typeface="Courier New"/>
-              </a:rPr>
-              <a:t>for person, </a:t>
-            </a:r>
-            <a:r>
-              <a:rPr lang="en-US" sz="2200" dirty="0" err="1" smtClean="0">
-                <a:solidFill>
-                  <a:schemeClr val="tx1"/>
-                </a:solidFill>
-                <a:latin typeface="Menlo Regular"/>
-                <a:ea typeface="Menlo Regular"/>
-                <a:cs typeface="Menlo Regular"/>
-                <a:sym typeface="Courier New"/>
-              </a:rPr>
-              <a:t>b_date</a:t>
-            </a:r>
-            <a:r>
-              <a:rPr lang="en-US" sz="2200" dirty="0" smtClean="0">
-                <a:solidFill>
-                  <a:schemeClr val="tx1"/>
-                </a:solidFill>
-                <a:latin typeface="Menlo Regular"/>
-                <a:ea typeface="Menlo Regular"/>
-                <a:cs typeface="Menlo Regular"/>
-                <a:sym typeface="Courier New"/>
-              </a:rPr>
-              <a:t> in </a:t>
-            </a:r>
-            <a:r>
-              <a:rPr lang="en-US" sz="2200" dirty="0" err="1" smtClean="0">
-                <a:solidFill>
-                  <a:schemeClr val="tx1"/>
-                </a:solidFill>
-                <a:latin typeface="Menlo Regular"/>
-                <a:ea typeface="Menlo Regular"/>
-                <a:cs typeface="Menlo Regular"/>
-                <a:sym typeface="Courier New"/>
-              </a:rPr>
-              <a:t>birth_dates.items</a:t>
-            </a:r>
-            <a:r>
-              <a:rPr lang="en-US" sz="2200" dirty="0" smtClean="0">
-                <a:solidFill>
-                  <a:schemeClr val="tx1"/>
-                </a:solidFill>
-                <a:latin typeface="Menlo Regular"/>
-                <a:ea typeface="Menlo Regular"/>
-                <a:cs typeface="Menlo Regular"/>
-                <a:sym typeface="Courier New"/>
-              </a:rPr>
-              <a:t>():</a:t>
-            </a:r>
-            <a:endParaRPr lang="en" sz="2200" dirty="0">
-              <a:solidFill>
-                <a:schemeClr val="tx1"/>
-              </a:solidFill>
-              <a:latin typeface="Menlo Regular"/>
-              <a:ea typeface="Menlo Regular"/>
-              <a:cs typeface="Menlo Regular"/>
-              <a:sym typeface="Courier New"/>
-            </a:endParaRPr>
-          </a:p>
-          <a:p>
-            <a:pPr lvl="0" rtl="0">
-              <a:lnSpc>
-                <a:spcPct val="115000"/>
-              </a:lnSpc>
-              <a:spcBef>
-                <a:spcPts val="0"/>
-              </a:spcBef>
-              <a:buNone/>
-            </a:pPr>
-            <a:r>
-              <a:rPr lang="en" sz="2200" dirty="0">
-                <a:solidFill>
-                  <a:schemeClr val="tx1"/>
-                </a:solidFill>
-                <a:latin typeface="Menlo Regular"/>
-                <a:ea typeface="Menlo Regular"/>
-                <a:cs typeface="Menlo Regular"/>
-                <a:sym typeface="Courier New"/>
-              </a:rPr>
-              <a:t>  if b_date &lt; </a:t>
-            </a:r>
-            <a:r>
-              <a:rPr lang="en" sz="2200" dirty="0" smtClean="0">
-                <a:solidFill>
-                  <a:srgbClr val="11889C"/>
-                </a:solidFill>
-                <a:latin typeface="Menlo Regular"/>
-                <a:ea typeface="Menlo Regular"/>
-                <a:cs typeface="Menlo Regular"/>
-                <a:sym typeface="Courier New"/>
-              </a:rPr>
-              <a:t>1900:</a:t>
-            </a:r>
-            <a:endParaRPr lang="en" sz="2200" dirty="0">
-              <a:solidFill>
-                <a:srgbClr val="11889C"/>
-              </a:solidFill>
-              <a:latin typeface="Menlo Regular"/>
-              <a:ea typeface="Menlo Regular"/>
-              <a:cs typeface="Menlo Regular"/>
-              <a:sym typeface="Courier New"/>
-            </a:endParaRPr>
-          </a:p>
-          <a:p>
-            <a:pPr lvl="0" rtl="0">
-              <a:lnSpc>
-                <a:spcPct val="115000"/>
-              </a:lnSpc>
-              <a:spcBef>
-                <a:spcPts val="0"/>
-              </a:spcBef>
-              <a:buNone/>
-            </a:pPr>
-            <a:r>
-              <a:rPr lang="en" sz="2200" dirty="0">
-                <a:solidFill>
-                  <a:schemeClr val="tx1"/>
-                </a:solidFill>
-                <a:latin typeface="Menlo Regular"/>
-                <a:ea typeface="Menlo Regular"/>
-                <a:cs typeface="Menlo Regular"/>
-                <a:sym typeface="Courier New"/>
-              </a:rPr>
-              <a:t>    nineteenth_count += </a:t>
-            </a:r>
-            <a:r>
-              <a:rPr lang="en" sz="2200" dirty="0">
-                <a:solidFill>
-                  <a:srgbClr val="11889C"/>
-                </a:solidFill>
-                <a:latin typeface="Menlo Regular"/>
-                <a:ea typeface="Menlo Regular"/>
-                <a:cs typeface="Menlo Regular"/>
-                <a:sym typeface="Courier New"/>
-              </a:rPr>
-              <a:t>1</a:t>
-            </a:r>
-          </a:p>
-          <a:p>
-            <a:pPr lvl="0" rtl="0">
-              <a:lnSpc>
-                <a:spcPct val="115000"/>
-              </a:lnSpc>
-              <a:spcBef>
-                <a:spcPts val="0"/>
-              </a:spcBef>
-              <a:buNone/>
-            </a:pPr>
-            <a:r>
-              <a:rPr lang="en" sz="2200" dirty="0">
-                <a:solidFill>
-                  <a:schemeClr val="tx1"/>
-                </a:solidFill>
-                <a:latin typeface="Menlo Regular"/>
-                <a:ea typeface="Menlo Regular"/>
-                <a:cs typeface="Menlo Regular"/>
-                <a:sym typeface="Courier New"/>
-              </a:rPr>
-              <a:t>  </a:t>
-            </a:r>
-            <a:r>
-              <a:rPr lang="en" sz="2200" dirty="0" smtClean="0">
-                <a:solidFill>
-                  <a:schemeClr val="tx1"/>
-                </a:solidFill>
-                <a:latin typeface="Menlo Regular"/>
-                <a:ea typeface="Menlo Regular"/>
-                <a:cs typeface="Menlo Regular"/>
-                <a:sym typeface="Courier New"/>
-              </a:rPr>
-              <a:t>else:</a:t>
-            </a:r>
-            <a:endParaRPr lang="en" sz="2200" dirty="0">
-              <a:solidFill>
-                <a:schemeClr val="tx1"/>
-              </a:solidFill>
-              <a:latin typeface="Menlo Regular"/>
-              <a:ea typeface="Menlo Regular"/>
-              <a:cs typeface="Menlo Regular"/>
-              <a:sym typeface="Courier New"/>
-            </a:endParaRPr>
-          </a:p>
-          <a:p>
-            <a:pPr lvl="0" rtl="0">
-              <a:lnSpc>
-                <a:spcPct val="115000"/>
-              </a:lnSpc>
-              <a:spcBef>
-                <a:spcPts val="0"/>
-              </a:spcBef>
-              <a:buNone/>
-            </a:pPr>
-            <a:r>
-              <a:rPr lang="en" sz="2200" dirty="0">
-                <a:solidFill>
-                  <a:schemeClr val="tx1"/>
-                </a:solidFill>
-                <a:latin typeface="Menlo Regular"/>
-                <a:ea typeface="Menlo Regular"/>
-                <a:cs typeface="Menlo Regular"/>
-                <a:sym typeface="Courier New"/>
-              </a:rPr>
-              <a:t>    twentieth_count += </a:t>
-            </a:r>
-            <a:r>
-              <a:rPr lang="en" sz="2200" dirty="0" smtClean="0">
-                <a:solidFill>
-                  <a:srgbClr val="11889C"/>
-                </a:solidFill>
-                <a:latin typeface="Menlo Regular"/>
-                <a:ea typeface="Menlo Regular"/>
-                <a:cs typeface="Menlo Regular"/>
-                <a:sym typeface="Courier New"/>
-              </a:rPr>
-              <a:t>1</a:t>
-            </a:r>
-            <a:endParaRPr lang="en" sz="2200" dirty="0">
-              <a:solidFill>
-                <a:schemeClr val="tx1"/>
-              </a:solidFill>
-              <a:latin typeface="Menlo Regular"/>
-              <a:ea typeface="Menlo Regular"/>
-              <a:cs typeface="Menlo Regular"/>
-              <a:sym typeface="Courier New"/>
-            </a:endParaRPr>
-          </a:p>
-          <a:p>
-            <a:pPr lvl="0" rtl="0">
-              <a:spcBef>
-                <a:spcPts val="0"/>
-              </a:spcBef>
-              <a:buNone/>
-            </a:pPr>
-            <a:endParaRPr sz="1800" b="1" dirty="0">
-              <a:solidFill>
-                <a:srgbClr val="000000"/>
-              </a:solidFill>
-              <a:latin typeface="Menlo Regular"/>
-              <a:ea typeface="Menlo Regular"/>
-              <a:cs typeface="Menlo Regular"/>
-              <a:sym typeface="Courier New"/>
-            </a:endParaRPr>
-          </a:p>
-          <a:p>
-            <a:pPr>
-              <a:spcBef>
-                <a:spcPts val="0"/>
-              </a:spcBef>
-              <a:buNone/>
-            </a:pPr>
-            <a:endParaRPr dirty="0">
-              <a:solidFill>
-                <a:srgbClr val="000000"/>
-              </a:solidFill>
-            </a:endParaRPr>
-          </a:p>
-        </p:txBody>
-      </p:sp>
-    </p:spTree>
-  </p:cSld>
-  <p:clrMapOvr>
-    <a:masterClrMapping/>
-  </p:clrMapOvr>
-  <p:transition xmlns:p14="http://schemas.microsoft.com/office/powerpoint/2010/main" spd="slow">
-    <p:cut/>
-  </p:transition>
 </p:sld>
 </file>
 
@@ -26808,6 +25929,1165 @@
   <p:cSld>
     <p:spTree>
       <p:nvGrpSpPr>
+        <p:cNvPr id="1" name=""/>
+        <p:cNvGrpSpPr/>
+        <p:nvPr/>
+      </p:nvGrpSpPr>
+      <p:grpSpPr>
+        <a:xfrm>
+          <a:off x="0" y="0"/>
+          <a:ext cx="0" cy="0"/>
+          <a:chOff x="0" y="0"/>
+          <a:chExt cx="0" cy="0"/>
+        </a:xfrm>
+      </p:grpSpPr>
+      <p:sp>
+        <p:nvSpPr>
+          <p:cNvPr id="2" name="Title 1"/>
+          <p:cNvSpPr>
+            <a:spLocks noGrp="1"/>
+          </p:cNvSpPr>
+          <p:nvPr>
+            <p:ph type="title"/>
+          </p:nvPr>
+        </p:nvSpPr>
+        <p:spPr/>
+        <p:txBody>
+          <a:bodyPr/>
+          <a:lstStyle/>
+          <a:p>
+            <a:endParaRPr lang="en-US"/>
+          </a:p>
+        </p:txBody>
+      </p:sp>
+      <p:sp>
+        <p:nvSpPr>
+          <p:cNvPr id="3" name="Text Placeholder 2"/>
+          <p:cNvSpPr>
+            <a:spLocks noGrp="1"/>
+          </p:cNvSpPr>
+          <p:nvPr>
+            <p:ph type="body" idx="1"/>
+          </p:nvPr>
+        </p:nvSpPr>
+        <p:spPr/>
+        <p:txBody>
+          <a:bodyPr/>
+          <a:lstStyle/>
+          <a:p>
+            <a:endParaRPr lang="en-US"/>
+          </a:p>
+        </p:txBody>
+      </p:sp>
+      <p:pic>
+        <p:nvPicPr>
+          <p:cNvPr id="4" name="Picture 3"/>
+          <p:cNvPicPr>
+            <a:picLocks noChangeAspect="1"/>
+          </p:cNvPicPr>
+          <p:nvPr/>
+        </p:nvPicPr>
+        <p:blipFill>
+          <a:blip r:embed="rId2"/>
+          <a:stretch>
+            <a:fillRect/>
+          </a:stretch>
+        </p:blipFill>
+        <p:spPr>
+          <a:xfrm>
+            <a:off x="762000" y="990600"/>
+            <a:ext cx="7620000" cy="4864100"/>
+          </a:xfrm>
+          <a:prstGeom prst="rect">
+            <a:avLst/>
+          </a:prstGeom>
+        </p:spPr>
+      </p:pic>
+    </p:spTree>
+    <p:extLst>
+      <p:ext uri="{BB962C8B-B14F-4D97-AF65-F5344CB8AC3E}">
+        <p14:creationId xmlns:p14="http://schemas.microsoft.com/office/powerpoint/2010/main" val="2230707868"/>
+      </p:ext>
+    </p:extLst>
+  </p:cSld>
+  <p:clrMapOvr>
+    <a:masterClrMapping/>
+  </p:clrMapOvr>
+</p:sld>
+</file>
+
+<file path=ppt/slides/slide41.xml><?xml version="1.0" encoding="utf-8"?>
+<p:sld xmlns:a="http://schemas.openxmlformats.org/drawingml/2006/main" xmlns:r="http://schemas.openxmlformats.org/officeDocument/2006/relationships" xmlns:p="http://schemas.openxmlformats.org/presentationml/2006/main">
+  <p:cSld>
+    <p:spTree>
+      <p:nvGrpSpPr>
+        <p:cNvPr id="1" name="Shape 248"/>
+        <p:cNvGrpSpPr/>
+        <p:nvPr/>
+      </p:nvGrpSpPr>
+      <p:grpSpPr>
+        <a:xfrm>
+          <a:off x="0" y="0"/>
+          <a:ext cx="0" cy="0"/>
+          <a:chOff x="0" y="0"/>
+          <a:chExt cx="0" cy="0"/>
+        </a:xfrm>
+      </p:grpSpPr>
+      <p:sp>
+        <p:nvSpPr>
+          <p:cNvPr id="249" name="Shape 249"/>
+          <p:cNvSpPr txBox="1">
+            <a:spLocks noGrp="1"/>
+          </p:cNvSpPr>
+          <p:nvPr>
+            <p:ph type="title"/>
+          </p:nvPr>
+        </p:nvSpPr>
+        <p:spPr>
+          <a:xfrm>
+            <a:off x="457200" y="274636"/>
+            <a:ext cx="8229600" cy="1325563"/>
+          </a:xfrm>
+          <a:prstGeom prst="rect">
+            <a:avLst/>
+          </a:prstGeom>
+        </p:spPr>
+        <p:txBody>
+          <a:bodyPr lIns="91425" tIns="91425" rIns="91425" bIns="91425" anchor="b" anchorCtr="0">
+            <a:noAutofit/>
+          </a:bodyPr>
+          <a:lstStyle/>
+          <a:p>
+            <a:pPr>
+              <a:spcBef>
+                <a:spcPts val="0"/>
+              </a:spcBef>
+              <a:buNone/>
+            </a:pPr>
+            <a:r>
+              <a:rPr lang="en" sz="9600" dirty="0" smtClean="0">
+                <a:solidFill>
+                  <a:srgbClr val="FF0000"/>
+                </a:solidFill>
+                <a:latin typeface="Yanone Kaffeesatz Bold"/>
+                <a:cs typeface="Yanone Kaffeesatz Bold"/>
+              </a:rPr>
+              <a:t>Exercise</a:t>
+            </a:r>
+            <a:endParaRPr lang="en" dirty="0"/>
+          </a:p>
+        </p:txBody>
+      </p:sp>
+      <p:sp>
+        <p:nvSpPr>
+          <p:cNvPr id="250" name="Shape 250"/>
+          <p:cNvSpPr txBox="1">
+            <a:spLocks noGrp="1"/>
+          </p:cNvSpPr>
+          <p:nvPr>
+            <p:ph type="body" idx="1"/>
+          </p:nvPr>
+        </p:nvSpPr>
+        <p:spPr>
+          <a:xfrm>
+            <a:off x="457200" y="1600200"/>
+            <a:ext cx="8229600" cy="4967700"/>
+          </a:xfrm>
+          <a:prstGeom prst="rect">
+            <a:avLst/>
+          </a:prstGeom>
+        </p:spPr>
+        <p:txBody>
+          <a:bodyPr lIns="91425" tIns="91425" rIns="91425" bIns="91425" anchor="t" anchorCtr="0">
+            <a:noAutofit/>
+          </a:bodyPr>
+          <a:lstStyle/>
+          <a:p>
+            <a:pPr lvl="0" rtl="0">
+              <a:lnSpc>
+                <a:spcPct val="115000"/>
+              </a:lnSpc>
+              <a:spcBef>
+                <a:spcPts val="0"/>
+              </a:spcBef>
+              <a:buNone/>
+            </a:pPr>
+            <a:r>
+              <a:rPr lang="en" sz="2000" dirty="0">
+                <a:solidFill>
+                  <a:srgbClr val="000000"/>
+                </a:solidFill>
+              </a:rPr>
+              <a:t>Create a collection of 19th- and 20th-century authors (or historical/political figures if that's your bag!) and their birth dates (historical accuracy doesn't matter).  An example:</a:t>
+            </a:r>
+          </a:p>
+          <a:p>
+            <a:pPr lvl="0" rtl="0">
+              <a:lnSpc>
+                <a:spcPct val="115000"/>
+              </a:lnSpc>
+              <a:spcBef>
+                <a:spcPts val="0"/>
+              </a:spcBef>
+              <a:buNone/>
+            </a:pPr>
+            <a:endParaRPr sz="2000" dirty="0">
+              <a:solidFill>
+                <a:srgbClr val="000000"/>
+              </a:solidFill>
+            </a:endParaRPr>
+          </a:p>
+          <a:p>
+            <a:pPr lvl="0" rtl="0">
+              <a:lnSpc>
+                <a:spcPct val="115000"/>
+              </a:lnSpc>
+              <a:spcBef>
+                <a:spcPts val="0"/>
+              </a:spcBef>
+              <a:buNone/>
+            </a:pPr>
+            <a:r>
+              <a:rPr lang="en" sz="2000" dirty="0">
+                <a:solidFill>
+                  <a:srgbClr val="000000"/>
+                </a:solidFill>
+                <a:latin typeface="Menlo Regular"/>
+                <a:ea typeface="Menlo Regular"/>
+                <a:cs typeface="Menlo Regular"/>
+                <a:sym typeface="Courier New"/>
+              </a:rPr>
+              <a:t>birth_dates = </a:t>
+            </a:r>
+            <a:r>
+              <a:rPr lang="en" sz="2000" dirty="0">
+                <a:solidFill>
+                  <a:srgbClr val="FF0000"/>
+                </a:solidFill>
+                <a:latin typeface="Menlo Regular"/>
+                <a:ea typeface="Menlo Regular"/>
+                <a:cs typeface="Menlo Regular"/>
+                <a:sym typeface="Courier New"/>
+              </a:rPr>
+              <a:t>{"Wallace </a:t>
+            </a:r>
+            <a:r>
+              <a:rPr lang="en" sz="2000" dirty="0" smtClean="0">
+                <a:solidFill>
+                  <a:srgbClr val="FF0000"/>
+                </a:solidFill>
+                <a:latin typeface="Menlo Regular"/>
+                <a:ea typeface="Menlo Regular"/>
+                <a:cs typeface="Menlo Regular"/>
+                <a:sym typeface="Courier New"/>
+              </a:rPr>
+              <a:t>Stevens</a:t>
+            </a:r>
+            <a:r>
+              <a:rPr lang="en-US" sz="2000" dirty="0" smtClean="0">
+                <a:solidFill>
+                  <a:srgbClr val="FF0000"/>
+                </a:solidFill>
+                <a:latin typeface="Menlo Regular"/>
+                <a:ea typeface="Menlo Regular"/>
+                <a:cs typeface="Menlo Regular"/>
+                <a:sym typeface="Courier New"/>
+              </a:rPr>
+              <a:t>"</a:t>
+            </a:r>
+            <a:r>
+              <a:rPr lang="en" sz="2000" dirty="0" smtClean="0">
+                <a:solidFill>
+                  <a:srgbClr val="FF0000"/>
+                </a:solidFill>
+                <a:latin typeface="Menlo Regular"/>
+                <a:ea typeface="Menlo Regular"/>
+                <a:cs typeface="Menlo Regular"/>
+                <a:sym typeface="Courier New"/>
+              </a:rPr>
+              <a:t>:</a:t>
+            </a:r>
+            <a:r>
+              <a:rPr lang="en" sz="2000" dirty="0" smtClean="0">
+                <a:solidFill>
+                  <a:srgbClr val="000000"/>
+                </a:solidFill>
+                <a:latin typeface="Menlo Regular"/>
+                <a:ea typeface="Menlo Regular"/>
+                <a:cs typeface="Menlo Regular"/>
+                <a:sym typeface="Courier New"/>
+              </a:rPr>
+              <a:t> </a:t>
+            </a:r>
+            <a:r>
+              <a:rPr lang="en" sz="2000" dirty="0">
+                <a:solidFill>
+                  <a:srgbClr val="11889C"/>
+                </a:solidFill>
+                <a:latin typeface="Menlo Regular"/>
+                <a:ea typeface="Menlo Regular"/>
+                <a:cs typeface="Menlo Regular"/>
+                <a:sym typeface="Courier New"/>
+              </a:rPr>
+              <a:t>1879</a:t>
+            </a:r>
+            <a:r>
+              <a:rPr lang="en" sz="2000" dirty="0">
+                <a:solidFill>
+                  <a:srgbClr val="000000"/>
+                </a:solidFill>
+                <a:latin typeface="Menlo Regular"/>
+                <a:ea typeface="Menlo Regular"/>
+                <a:cs typeface="Menlo Regular"/>
+                <a:sym typeface="Courier New"/>
+              </a:rPr>
+              <a:t>}</a:t>
+            </a:r>
+          </a:p>
+          <a:p>
+            <a:pPr lvl="0" rtl="0">
+              <a:lnSpc>
+                <a:spcPct val="115000"/>
+              </a:lnSpc>
+              <a:spcBef>
+                <a:spcPts val="0"/>
+              </a:spcBef>
+              <a:buNone/>
+            </a:pPr>
+            <a:endParaRPr sz="2000" dirty="0">
+              <a:solidFill>
+                <a:srgbClr val="000000"/>
+              </a:solidFill>
+              <a:latin typeface="Menlo Regular"/>
+              <a:ea typeface="Menlo Regular"/>
+              <a:cs typeface="Menlo Regular"/>
+              <a:sym typeface="Courier New"/>
+            </a:endParaRPr>
+          </a:p>
+          <a:p>
+            <a:pPr lvl="0" rtl="0">
+              <a:lnSpc>
+                <a:spcPct val="115000"/>
+              </a:lnSpc>
+              <a:spcBef>
+                <a:spcPts val="0"/>
+              </a:spcBef>
+              <a:buNone/>
+            </a:pPr>
+            <a:r>
+              <a:rPr lang="en" sz="2000" dirty="0">
+                <a:solidFill>
+                  <a:srgbClr val="000000"/>
+                </a:solidFill>
+              </a:rPr>
+              <a:t>Count the number of 19th-century birth dates and the number of 20th-century birth dates, then print the results like:</a:t>
+            </a:r>
+          </a:p>
+          <a:p>
+            <a:pPr lvl="0" rtl="0">
+              <a:lnSpc>
+                <a:spcPct val="115000"/>
+              </a:lnSpc>
+              <a:spcBef>
+                <a:spcPts val="0"/>
+              </a:spcBef>
+              <a:buNone/>
+            </a:pPr>
+            <a:endParaRPr sz="2000" dirty="0">
+              <a:solidFill>
+                <a:srgbClr val="000000"/>
+              </a:solidFill>
+            </a:endParaRPr>
+          </a:p>
+          <a:p>
+            <a:pPr lvl="0" rtl="0">
+              <a:lnSpc>
+                <a:spcPct val="115000"/>
+              </a:lnSpc>
+              <a:spcBef>
+                <a:spcPts val="0"/>
+              </a:spcBef>
+              <a:buNone/>
+            </a:pPr>
+            <a:r>
+              <a:rPr lang="en" sz="2000" dirty="0">
+                <a:solidFill>
+                  <a:srgbClr val="000000"/>
+                </a:solidFill>
+                <a:latin typeface="Menlo Regular"/>
+                <a:ea typeface="Menlo Regular"/>
+                <a:cs typeface="Menlo Regular"/>
+                <a:sym typeface="Courier New"/>
+              </a:rPr>
+              <a:t>There are 3 19th-c. births and 2 20th-c. births in my collection.</a:t>
+            </a:r>
+          </a:p>
+          <a:p>
+            <a:pPr lvl="0" rtl="0">
+              <a:lnSpc>
+                <a:spcPct val="115000"/>
+              </a:lnSpc>
+              <a:spcBef>
+                <a:spcPts val="0"/>
+              </a:spcBef>
+              <a:buNone/>
+            </a:pPr>
+            <a:endParaRPr sz="2000" dirty="0">
+              <a:solidFill>
+                <a:srgbClr val="000000"/>
+              </a:solidFill>
+            </a:endParaRPr>
+          </a:p>
+          <a:p>
+            <a:pPr>
+              <a:spcBef>
+                <a:spcPts val="0"/>
+              </a:spcBef>
+              <a:buNone/>
+            </a:pPr>
+            <a:endParaRPr sz="2000" dirty="0"/>
+          </a:p>
+        </p:txBody>
+      </p:sp>
+    </p:spTree>
+  </p:cSld>
+  <p:clrMapOvr>
+    <a:masterClrMapping/>
+  </p:clrMapOvr>
+  <p:transition xmlns:p14="http://schemas.microsoft.com/office/powerpoint/2010/main" spd="slow">
+    <p:cut/>
+  </p:transition>
+  <p:timing>
+    <p:tnLst>
+      <p:par>
+        <p:cTn xmlns:p14="http://schemas.microsoft.com/office/powerpoint/2010/main" id="1" dur="indefinite" restart="never" nodeType="tmRoot"/>
+      </p:par>
+    </p:tnLst>
+  </p:timing>
+</p:sld>
+</file>
+
+<file path=ppt/slides/slide42.xml><?xml version="1.0" encoding="utf-8"?>
+<p:sld xmlns:a="http://schemas.openxmlformats.org/drawingml/2006/main" xmlns:r="http://schemas.openxmlformats.org/officeDocument/2006/relationships" xmlns:p="http://schemas.openxmlformats.org/presentationml/2006/main">
+  <p:cSld>
+    <p:spTree>
+      <p:nvGrpSpPr>
+        <p:cNvPr id="1" name="Shape 254"/>
+        <p:cNvGrpSpPr/>
+        <p:nvPr/>
+      </p:nvGrpSpPr>
+      <p:grpSpPr>
+        <a:xfrm>
+          <a:off x="0" y="0"/>
+          <a:ext cx="0" cy="0"/>
+          <a:chOff x="0" y="0"/>
+          <a:chExt cx="0" cy="0"/>
+        </a:xfrm>
+      </p:grpSpPr>
+      <p:sp>
+        <p:nvSpPr>
+          <p:cNvPr id="255" name="Shape 255"/>
+          <p:cNvSpPr txBox="1">
+            <a:spLocks noGrp="1"/>
+          </p:cNvSpPr>
+          <p:nvPr>
+            <p:ph type="title"/>
+          </p:nvPr>
+        </p:nvSpPr>
+        <p:spPr>
+          <a:xfrm>
+            <a:off x="457200" y="274636"/>
+            <a:ext cx="8229600" cy="1325563"/>
+          </a:xfrm>
+          <a:prstGeom prst="rect">
+            <a:avLst/>
+          </a:prstGeom>
+        </p:spPr>
+        <p:txBody>
+          <a:bodyPr lIns="91425" tIns="91425" rIns="91425" bIns="91425" anchor="b" anchorCtr="0">
+            <a:noAutofit/>
+          </a:bodyPr>
+          <a:lstStyle/>
+          <a:p>
+            <a:pPr>
+              <a:spcBef>
+                <a:spcPts val="0"/>
+              </a:spcBef>
+              <a:buNone/>
+            </a:pPr>
+            <a:r>
+              <a:rPr lang="en-US" sz="9600" dirty="0">
+                <a:solidFill>
+                  <a:srgbClr val="FF0000"/>
+                </a:solidFill>
+                <a:latin typeface="Yanone Kaffeesatz Bold"/>
+                <a:cs typeface="Yanone Kaffeesatz Bold"/>
+              </a:rPr>
+              <a:t>An Answer</a:t>
+            </a:r>
+            <a:endParaRPr lang="en" sz="9600" dirty="0">
+              <a:solidFill>
+                <a:srgbClr val="FF0000"/>
+              </a:solidFill>
+              <a:latin typeface="Yanone Kaffeesatz Bold"/>
+              <a:cs typeface="Yanone Kaffeesatz Bold"/>
+            </a:endParaRPr>
+          </a:p>
+        </p:txBody>
+      </p:sp>
+      <p:sp>
+        <p:nvSpPr>
+          <p:cNvPr id="256" name="Shape 256"/>
+          <p:cNvSpPr txBox="1">
+            <a:spLocks noGrp="1"/>
+          </p:cNvSpPr>
+          <p:nvPr>
+            <p:ph type="body" idx="1"/>
+          </p:nvPr>
+        </p:nvSpPr>
+        <p:spPr>
+          <a:xfrm>
+            <a:off x="457200" y="1600200"/>
+            <a:ext cx="8229600" cy="4967700"/>
+          </a:xfrm>
+          <a:prstGeom prst="rect">
+            <a:avLst/>
+          </a:prstGeom>
+        </p:spPr>
+        <p:txBody>
+          <a:bodyPr lIns="91425" tIns="91425" rIns="91425" bIns="91425" anchor="t" anchorCtr="0">
+            <a:noAutofit/>
+          </a:bodyPr>
+          <a:lstStyle/>
+          <a:p>
+            <a:pPr lvl="0" rtl="0">
+              <a:lnSpc>
+                <a:spcPct val="115000"/>
+              </a:lnSpc>
+              <a:spcBef>
+                <a:spcPts val="0"/>
+              </a:spcBef>
+              <a:buNone/>
+            </a:pPr>
+            <a:r>
+              <a:rPr lang="en" sz="2100" dirty="0">
+                <a:solidFill>
+                  <a:schemeClr val="tx1"/>
+                </a:solidFill>
+                <a:latin typeface="Menlo Regular"/>
+                <a:ea typeface="Menlo Regular"/>
+                <a:cs typeface="Menlo Regular"/>
+                <a:sym typeface="Courier New"/>
+              </a:rPr>
+              <a:t>birth_dates = {</a:t>
+            </a:r>
+            <a:r>
+              <a:rPr lang="en" sz="2100" dirty="0">
+                <a:solidFill>
+                  <a:srgbClr val="FF0000"/>
+                </a:solidFill>
+                <a:latin typeface="Menlo Regular"/>
+                <a:ea typeface="Menlo Regular"/>
+                <a:cs typeface="Menlo Regular"/>
+                <a:sym typeface="Courier New"/>
+              </a:rPr>
+              <a:t>'Wallace </a:t>
+            </a:r>
+            <a:r>
+              <a:rPr lang="en" sz="2100" dirty="0" smtClean="0">
+                <a:solidFill>
+                  <a:srgbClr val="FF0000"/>
+                </a:solidFill>
+                <a:latin typeface="Menlo Regular"/>
+                <a:ea typeface="Menlo Regular"/>
+                <a:cs typeface="Menlo Regular"/>
+                <a:sym typeface="Courier New"/>
+              </a:rPr>
+              <a:t>Stevens</a:t>
+            </a:r>
+            <a:r>
+              <a:rPr lang="en-US" sz="2100" dirty="0" smtClean="0">
+                <a:solidFill>
+                  <a:srgbClr val="FF0000"/>
+                </a:solidFill>
+                <a:latin typeface="Menlo Regular"/>
+                <a:ea typeface="Menlo Regular"/>
+                <a:cs typeface="Menlo Regular"/>
+                <a:sym typeface="Courier New"/>
+              </a:rPr>
+              <a:t>'</a:t>
+            </a:r>
+            <a:r>
+              <a:rPr lang="en" sz="2100" dirty="0" smtClean="0">
+                <a:solidFill>
+                  <a:srgbClr val="FF0000"/>
+                </a:solidFill>
+                <a:latin typeface="Menlo Regular"/>
+                <a:ea typeface="Menlo Regular"/>
+                <a:cs typeface="Menlo Regular"/>
+                <a:sym typeface="Courier New"/>
+              </a:rPr>
+              <a:t>:</a:t>
+            </a:r>
+            <a:r>
+              <a:rPr lang="en" sz="2100" dirty="0" smtClean="0">
+                <a:solidFill>
+                  <a:schemeClr val="tx1"/>
+                </a:solidFill>
+                <a:latin typeface="Menlo Regular"/>
+                <a:ea typeface="Menlo Regular"/>
+                <a:cs typeface="Menlo Regular"/>
+                <a:sym typeface="Courier New"/>
+              </a:rPr>
+              <a:t> </a:t>
+            </a:r>
+            <a:r>
+              <a:rPr lang="en" sz="2100" dirty="0">
+                <a:solidFill>
+                  <a:srgbClr val="11889C"/>
+                </a:solidFill>
+                <a:latin typeface="Menlo Regular"/>
+                <a:ea typeface="Menlo Regular"/>
+                <a:cs typeface="Menlo Regular"/>
+                <a:sym typeface="Courier New"/>
+              </a:rPr>
+              <a:t>1897</a:t>
+            </a:r>
+            <a:r>
+              <a:rPr lang="en" sz="2100" dirty="0">
+                <a:solidFill>
+                  <a:schemeClr val="tx1"/>
+                </a:solidFill>
+                <a:latin typeface="Menlo Regular"/>
+                <a:ea typeface="Menlo Regular"/>
+                <a:cs typeface="Menlo Regular"/>
+                <a:sym typeface="Courier New"/>
+              </a:rPr>
+              <a:t>, </a:t>
+            </a:r>
+            <a:r>
+              <a:rPr lang="en-US" sz="2100" dirty="0">
+                <a:solidFill>
+                  <a:srgbClr val="FF0000"/>
+                </a:solidFill>
+                <a:latin typeface="Menlo Regular"/>
+                <a:ea typeface="Menlo Regular"/>
+                <a:cs typeface="Menlo Regular"/>
+                <a:sym typeface="Courier New"/>
+              </a:rPr>
+              <a:t>'</a:t>
+            </a:r>
+            <a:r>
+              <a:rPr lang="en-US" sz="2100" dirty="0" smtClean="0">
+                <a:solidFill>
+                  <a:srgbClr val="FF0000"/>
+                </a:solidFill>
+                <a:latin typeface="Menlo Regular"/>
+                <a:ea typeface="Menlo Regular"/>
+                <a:cs typeface="Menlo Regular"/>
+                <a:sym typeface="Courier New"/>
+              </a:rPr>
+              <a:t>Brandon</a:t>
+            </a:r>
+            <a:r>
+              <a:rPr lang="en" sz="2100" dirty="0" smtClean="0">
+                <a:solidFill>
+                  <a:srgbClr val="FF0000"/>
+                </a:solidFill>
+                <a:latin typeface="Menlo Regular"/>
+                <a:ea typeface="Menlo Regular"/>
+                <a:cs typeface="Menlo Regular"/>
+                <a:sym typeface="Courier New"/>
+              </a:rPr>
+              <a:t> </a:t>
+            </a:r>
+            <a:r>
+              <a:rPr lang="en-US" sz="2100" dirty="0" smtClean="0">
+                <a:solidFill>
+                  <a:srgbClr val="FF0000"/>
+                </a:solidFill>
+                <a:latin typeface="Menlo Regular"/>
+                <a:ea typeface="Menlo Regular"/>
+                <a:cs typeface="Menlo Regular"/>
+                <a:sym typeface="Courier New"/>
+              </a:rPr>
+              <a:t>Walsh</a:t>
+            </a:r>
+            <a:r>
+              <a:rPr lang="en-US" sz="2200" dirty="0">
+                <a:solidFill>
+                  <a:srgbClr val="FF0000"/>
+                </a:solidFill>
+                <a:latin typeface="Menlo Regular"/>
+                <a:ea typeface="Menlo Regular"/>
+                <a:cs typeface="Menlo Regular"/>
+                <a:sym typeface="Courier New"/>
+              </a:rPr>
+              <a:t>'</a:t>
+            </a:r>
+            <a:r>
+              <a:rPr lang="en" sz="2200" dirty="0" smtClean="0">
+                <a:solidFill>
+                  <a:schemeClr val="tx1"/>
+                </a:solidFill>
+                <a:latin typeface="Menlo Regular"/>
+                <a:ea typeface="Menlo Regular"/>
+                <a:cs typeface="Menlo Regular"/>
+                <a:sym typeface="Courier New"/>
+              </a:rPr>
+              <a:t>: </a:t>
+            </a:r>
+            <a:r>
+              <a:rPr lang="en" sz="2200" dirty="0">
+                <a:solidFill>
+                  <a:srgbClr val="11889C"/>
+                </a:solidFill>
+                <a:latin typeface="Menlo Regular"/>
+                <a:ea typeface="Menlo Regular"/>
+                <a:cs typeface="Menlo Regular"/>
+                <a:sym typeface="Courier New"/>
+              </a:rPr>
+              <a:t>1977</a:t>
+            </a:r>
+            <a:r>
+              <a:rPr lang="en" sz="2200" dirty="0">
+                <a:solidFill>
+                  <a:schemeClr val="tx1"/>
+                </a:solidFill>
+                <a:latin typeface="Menlo Regular"/>
+                <a:ea typeface="Menlo Regular"/>
+                <a:cs typeface="Menlo Regular"/>
+                <a:sym typeface="Courier New"/>
+              </a:rPr>
+              <a:t>}</a:t>
+            </a:r>
+          </a:p>
+          <a:p>
+            <a:pPr lvl="0" rtl="0">
+              <a:lnSpc>
+                <a:spcPct val="115000"/>
+              </a:lnSpc>
+              <a:spcBef>
+                <a:spcPts val="0"/>
+              </a:spcBef>
+              <a:buNone/>
+            </a:pPr>
+            <a:endParaRPr sz="1000" dirty="0">
+              <a:solidFill>
+                <a:schemeClr val="tx1"/>
+              </a:solidFill>
+              <a:latin typeface="Menlo Regular"/>
+              <a:ea typeface="Menlo Regular"/>
+              <a:cs typeface="Menlo Regular"/>
+              <a:sym typeface="Courier New"/>
+            </a:endParaRPr>
+          </a:p>
+          <a:p>
+            <a:pPr lvl="0" rtl="0">
+              <a:lnSpc>
+                <a:spcPct val="115000"/>
+              </a:lnSpc>
+              <a:spcBef>
+                <a:spcPts val="0"/>
+              </a:spcBef>
+              <a:buNone/>
+            </a:pPr>
+            <a:r>
+              <a:rPr lang="en" sz="2200" dirty="0">
+                <a:solidFill>
+                  <a:schemeClr val="tx1"/>
+                </a:solidFill>
+                <a:latin typeface="Menlo Regular"/>
+                <a:ea typeface="Menlo Regular"/>
+                <a:cs typeface="Menlo Regular"/>
+                <a:sym typeface="Courier New"/>
+              </a:rPr>
+              <a:t>nineteenth_count = </a:t>
+            </a:r>
+            <a:r>
+              <a:rPr lang="en" sz="2200" dirty="0">
+                <a:solidFill>
+                  <a:srgbClr val="11889C"/>
+                </a:solidFill>
+                <a:latin typeface="Menlo Regular"/>
+                <a:ea typeface="Menlo Regular"/>
+                <a:cs typeface="Menlo Regular"/>
+                <a:sym typeface="Courier New"/>
+              </a:rPr>
+              <a:t>0</a:t>
+            </a:r>
+          </a:p>
+          <a:p>
+            <a:pPr lvl="0" rtl="0">
+              <a:lnSpc>
+                <a:spcPct val="115000"/>
+              </a:lnSpc>
+              <a:spcBef>
+                <a:spcPts val="0"/>
+              </a:spcBef>
+              <a:buNone/>
+            </a:pPr>
+            <a:r>
+              <a:rPr lang="en" sz="2200" dirty="0">
+                <a:solidFill>
+                  <a:schemeClr val="tx1"/>
+                </a:solidFill>
+                <a:latin typeface="Menlo Regular"/>
+                <a:ea typeface="Menlo Regular"/>
+                <a:cs typeface="Menlo Regular"/>
+                <a:sym typeface="Courier New"/>
+              </a:rPr>
+              <a:t>twentieth_count = </a:t>
+            </a:r>
+            <a:r>
+              <a:rPr lang="en" sz="2200" dirty="0">
+                <a:solidFill>
+                  <a:srgbClr val="11889C"/>
+                </a:solidFill>
+                <a:latin typeface="Menlo Regular"/>
+                <a:ea typeface="Menlo Regular"/>
+                <a:cs typeface="Menlo Regular"/>
+                <a:sym typeface="Courier New"/>
+              </a:rPr>
+              <a:t>0</a:t>
+            </a:r>
+            <a:r>
+              <a:rPr lang="en" sz="2200" dirty="0">
+                <a:solidFill>
+                  <a:schemeClr val="tx1"/>
+                </a:solidFill>
+                <a:latin typeface="Menlo Regular"/>
+                <a:ea typeface="Menlo Regular"/>
+                <a:cs typeface="Menlo Regular"/>
+                <a:sym typeface="Courier New"/>
+              </a:rPr>
+              <a:t> </a:t>
+            </a:r>
+            <a:endParaRPr lang="en" sz="2200" dirty="0" smtClean="0">
+              <a:solidFill>
+                <a:schemeClr val="tx1"/>
+              </a:solidFill>
+              <a:latin typeface="Menlo Regular"/>
+              <a:ea typeface="Menlo Regular"/>
+              <a:cs typeface="Menlo Regular"/>
+              <a:sym typeface="Courier New"/>
+            </a:endParaRPr>
+          </a:p>
+          <a:p>
+            <a:pPr lvl="0" rtl="0">
+              <a:lnSpc>
+                <a:spcPct val="115000"/>
+              </a:lnSpc>
+              <a:spcBef>
+                <a:spcPts val="0"/>
+              </a:spcBef>
+              <a:buNone/>
+            </a:pPr>
+            <a:endParaRPr lang="en" sz="2200" dirty="0">
+              <a:solidFill>
+                <a:schemeClr val="tx1"/>
+              </a:solidFill>
+              <a:latin typeface="Menlo Regular"/>
+              <a:ea typeface="Menlo Regular"/>
+              <a:cs typeface="Menlo Regular"/>
+              <a:sym typeface="Courier New"/>
+            </a:endParaRPr>
+          </a:p>
+          <a:p>
+            <a:pPr lvl="0" rtl="0">
+              <a:lnSpc>
+                <a:spcPct val="115000"/>
+              </a:lnSpc>
+              <a:spcBef>
+                <a:spcPts val="0"/>
+              </a:spcBef>
+              <a:buNone/>
+            </a:pPr>
+            <a:r>
+              <a:rPr lang="en-US" sz="2200" dirty="0" smtClean="0">
+                <a:solidFill>
+                  <a:schemeClr val="tx1"/>
+                </a:solidFill>
+                <a:latin typeface="Menlo Regular"/>
+                <a:ea typeface="Menlo Regular"/>
+                <a:cs typeface="Menlo Regular"/>
+                <a:sym typeface="Courier New"/>
+              </a:rPr>
+              <a:t>for person, </a:t>
+            </a:r>
+            <a:r>
+              <a:rPr lang="en-US" sz="2200" dirty="0" err="1" smtClean="0">
+                <a:solidFill>
+                  <a:schemeClr val="tx1"/>
+                </a:solidFill>
+                <a:latin typeface="Menlo Regular"/>
+                <a:ea typeface="Menlo Regular"/>
+                <a:cs typeface="Menlo Regular"/>
+                <a:sym typeface="Courier New"/>
+              </a:rPr>
+              <a:t>b_date</a:t>
+            </a:r>
+            <a:r>
+              <a:rPr lang="en-US" sz="2200" dirty="0" smtClean="0">
+                <a:solidFill>
+                  <a:schemeClr val="tx1"/>
+                </a:solidFill>
+                <a:latin typeface="Menlo Regular"/>
+                <a:ea typeface="Menlo Regular"/>
+                <a:cs typeface="Menlo Regular"/>
+                <a:sym typeface="Courier New"/>
+              </a:rPr>
+              <a:t> in </a:t>
+            </a:r>
+            <a:r>
+              <a:rPr lang="en-US" sz="2200" dirty="0" err="1" smtClean="0">
+                <a:solidFill>
+                  <a:schemeClr val="tx1"/>
+                </a:solidFill>
+                <a:latin typeface="Menlo Regular"/>
+                <a:ea typeface="Menlo Regular"/>
+                <a:cs typeface="Menlo Regular"/>
+                <a:sym typeface="Courier New"/>
+              </a:rPr>
+              <a:t>birth_dates.items</a:t>
+            </a:r>
+            <a:r>
+              <a:rPr lang="en-US" sz="2200" dirty="0" smtClean="0">
+                <a:solidFill>
+                  <a:schemeClr val="tx1"/>
+                </a:solidFill>
+                <a:latin typeface="Menlo Regular"/>
+                <a:ea typeface="Menlo Regular"/>
+                <a:cs typeface="Menlo Regular"/>
+                <a:sym typeface="Courier New"/>
+              </a:rPr>
+              <a:t>():</a:t>
+            </a:r>
+            <a:endParaRPr lang="en" sz="2200" dirty="0">
+              <a:solidFill>
+                <a:schemeClr val="tx1"/>
+              </a:solidFill>
+              <a:latin typeface="Menlo Regular"/>
+              <a:ea typeface="Menlo Regular"/>
+              <a:cs typeface="Menlo Regular"/>
+              <a:sym typeface="Courier New"/>
+            </a:endParaRPr>
+          </a:p>
+          <a:p>
+            <a:pPr lvl="0" rtl="0">
+              <a:lnSpc>
+                <a:spcPct val="115000"/>
+              </a:lnSpc>
+              <a:spcBef>
+                <a:spcPts val="0"/>
+              </a:spcBef>
+              <a:buNone/>
+            </a:pPr>
+            <a:r>
+              <a:rPr lang="en" sz="2200" dirty="0">
+                <a:solidFill>
+                  <a:schemeClr val="tx1"/>
+                </a:solidFill>
+                <a:latin typeface="Menlo Regular"/>
+                <a:ea typeface="Menlo Regular"/>
+                <a:cs typeface="Menlo Regular"/>
+                <a:sym typeface="Courier New"/>
+              </a:rPr>
+              <a:t>  if b_date &lt; </a:t>
+            </a:r>
+            <a:r>
+              <a:rPr lang="en" sz="2200" dirty="0" smtClean="0">
+                <a:solidFill>
+                  <a:srgbClr val="11889C"/>
+                </a:solidFill>
+                <a:latin typeface="Menlo Regular"/>
+                <a:ea typeface="Menlo Regular"/>
+                <a:cs typeface="Menlo Regular"/>
+                <a:sym typeface="Courier New"/>
+              </a:rPr>
+              <a:t>1900:</a:t>
+            </a:r>
+            <a:endParaRPr lang="en" sz="2200" dirty="0">
+              <a:solidFill>
+                <a:srgbClr val="11889C"/>
+              </a:solidFill>
+              <a:latin typeface="Menlo Regular"/>
+              <a:ea typeface="Menlo Regular"/>
+              <a:cs typeface="Menlo Regular"/>
+              <a:sym typeface="Courier New"/>
+            </a:endParaRPr>
+          </a:p>
+          <a:p>
+            <a:pPr lvl="0" rtl="0">
+              <a:lnSpc>
+                <a:spcPct val="115000"/>
+              </a:lnSpc>
+              <a:spcBef>
+                <a:spcPts val="0"/>
+              </a:spcBef>
+              <a:buNone/>
+            </a:pPr>
+            <a:r>
+              <a:rPr lang="en" sz="2200" dirty="0">
+                <a:solidFill>
+                  <a:schemeClr val="tx1"/>
+                </a:solidFill>
+                <a:latin typeface="Menlo Regular"/>
+                <a:ea typeface="Menlo Regular"/>
+                <a:cs typeface="Menlo Regular"/>
+                <a:sym typeface="Courier New"/>
+              </a:rPr>
+              <a:t>    nineteenth_count += </a:t>
+            </a:r>
+            <a:r>
+              <a:rPr lang="en" sz="2200" dirty="0">
+                <a:solidFill>
+                  <a:srgbClr val="11889C"/>
+                </a:solidFill>
+                <a:latin typeface="Menlo Regular"/>
+                <a:ea typeface="Menlo Regular"/>
+                <a:cs typeface="Menlo Regular"/>
+                <a:sym typeface="Courier New"/>
+              </a:rPr>
+              <a:t>1</a:t>
+            </a:r>
+          </a:p>
+          <a:p>
+            <a:pPr lvl="0" rtl="0">
+              <a:lnSpc>
+                <a:spcPct val="115000"/>
+              </a:lnSpc>
+              <a:spcBef>
+                <a:spcPts val="0"/>
+              </a:spcBef>
+              <a:buNone/>
+            </a:pPr>
+            <a:r>
+              <a:rPr lang="en" sz="2200" dirty="0">
+                <a:solidFill>
+                  <a:schemeClr val="tx1"/>
+                </a:solidFill>
+                <a:latin typeface="Menlo Regular"/>
+                <a:ea typeface="Menlo Regular"/>
+                <a:cs typeface="Menlo Regular"/>
+                <a:sym typeface="Courier New"/>
+              </a:rPr>
+              <a:t>  </a:t>
+            </a:r>
+            <a:r>
+              <a:rPr lang="en" sz="2200" dirty="0" smtClean="0">
+                <a:solidFill>
+                  <a:schemeClr val="tx1"/>
+                </a:solidFill>
+                <a:latin typeface="Menlo Regular"/>
+                <a:ea typeface="Menlo Regular"/>
+                <a:cs typeface="Menlo Regular"/>
+                <a:sym typeface="Courier New"/>
+              </a:rPr>
+              <a:t>else:</a:t>
+            </a:r>
+            <a:endParaRPr lang="en" sz="2200" dirty="0">
+              <a:solidFill>
+                <a:schemeClr val="tx1"/>
+              </a:solidFill>
+              <a:latin typeface="Menlo Regular"/>
+              <a:ea typeface="Menlo Regular"/>
+              <a:cs typeface="Menlo Regular"/>
+              <a:sym typeface="Courier New"/>
+            </a:endParaRPr>
+          </a:p>
+          <a:p>
+            <a:pPr lvl="0" rtl="0">
+              <a:lnSpc>
+                <a:spcPct val="115000"/>
+              </a:lnSpc>
+              <a:spcBef>
+                <a:spcPts val="0"/>
+              </a:spcBef>
+              <a:buNone/>
+            </a:pPr>
+            <a:r>
+              <a:rPr lang="en" sz="2200" dirty="0">
+                <a:solidFill>
+                  <a:schemeClr val="tx1"/>
+                </a:solidFill>
+                <a:latin typeface="Menlo Regular"/>
+                <a:ea typeface="Menlo Regular"/>
+                <a:cs typeface="Menlo Regular"/>
+                <a:sym typeface="Courier New"/>
+              </a:rPr>
+              <a:t>    twentieth_count += </a:t>
+            </a:r>
+            <a:r>
+              <a:rPr lang="en" sz="2200" dirty="0" smtClean="0">
+                <a:solidFill>
+                  <a:srgbClr val="11889C"/>
+                </a:solidFill>
+                <a:latin typeface="Menlo Regular"/>
+                <a:ea typeface="Menlo Regular"/>
+                <a:cs typeface="Menlo Regular"/>
+                <a:sym typeface="Courier New"/>
+              </a:rPr>
+              <a:t>1</a:t>
+            </a:r>
+            <a:endParaRPr lang="en" sz="2200" dirty="0">
+              <a:solidFill>
+                <a:schemeClr val="tx1"/>
+              </a:solidFill>
+              <a:latin typeface="Menlo Regular"/>
+              <a:ea typeface="Menlo Regular"/>
+              <a:cs typeface="Menlo Regular"/>
+              <a:sym typeface="Courier New"/>
+            </a:endParaRPr>
+          </a:p>
+          <a:p>
+            <a:pPr lvl="0" rtl="0">
+              <a:spcBef>
+                <a:spcPts val="0"/>
+              </a:spcBef>
+              <a:buNone/>
+            </a:pPr>
+            <a:endParaRPr sz="1800" b="1" dirty="0">
+              <a:solidFill>
+                <a:srgbClr val="000000"/>
+              </a:solidFill>
+              <a:latin typeface="Menlo Regular"/>
+              <a:ea typeface="Menlo Regular"/>
+              <a:cs typeface="Menlo Regular"/>
+              <a:sym typeface="Courier New"/>
+            </a:endParaRPr>
+          </a:p>
+          <a:p>
+            <a:pPr>
+              <a:spcBef>
+                <a:spcPts val="0"/>
+              </a:spcBef>
+              <a:buNone/>
+            </a:pPr>
+            <a:endParaRPr dirty="0">
+              <a:solidFill>
+                <a:srgbClr val="000000"/>
+              </a:solidFill>
+            </a:endParaRPr>
+          </a:p>
+        </p:txBody>
+      </p:sp>
+    </p:spTree>
+  </p:cSld>
+  <p:clrMapOvr>
+    <a:masterClrMapping/>
+  </p:clrMapOvr>
+  <p:transition xmlns:p14="http://schemas.microsoft.com/office/powerpoint/2010/main" spd="slow">
+    <p:cut/>
+  </p:transition>
+</p:sld>
+</file>
+
+<file path=ppt/slides/slide43.xml><?xml version="1.0" encoding="utf-8"?>
+<p:sld xmlns:a="http://schemas.openxmlformats.org/drawingml/2006/main" xmlns:r="http://schemas.openxmlformats.org/officeDocument/2006/relationships" xmlns:p="http://schemas.openxmlformats.org/presentationml/2006/main">
+  <p:cSld>
+    <p:spTree>
+      <p:nvGrpSpPr>
         <p:cNvPr id="1" name="Shape 260"/>
         <p:cNvGrpSpPr/>
         <p:nvPr/>
@@ -27122,7 +27402,99 @@
 </p:sld>
 </file>
 
-<file path=ppt/slides/slide41.xml><?xml version="1.0" encoding="utf-8"?>
+<file path=ppt/slides/slide44.xml><?xml version="1.0" encoding="utf-8"?>
+<p:sld xmlns:a="http://schemas.openxmlformats.org/drawingml/2006/main" xmlns:r="http://schemas.openxmlformats.org/officeDocument/2006/relationships" xmlns:p="http://schemas.openxmlformats.org/presentationml/2006/main">
+  <p:cSld>
+    <p:spTree>
+      <p:nvGrpSpPr>
+        <p:cNvPr id="1" name=""/>
+        <p:cNvGrpSpPr/>
+        <p:nvPr/>
+      </p:nvGrpSpPr>
+      <p:grpSpPr>
+        <a:xfrm>
+          <a:off x="0" y="0"/>
+          <a:ext cx="0" cy="0"/>
+          <a:chOff x="0" y="0"/>
+          <a:chExt cx="0" cy="0"/>
+        </a:xfrm>
+      </p:grpSpPr>
+      <p:sp>
+        <p:nvSpPr>
+          <p:cNvPr id="2" name="Title 1"/>
+          <p:cNvSpPr>
+            <a:spLocks noGrp="1"/>
+          </p:cNvSpPr>
+          <p:nvPr>
+            <p:ph type="title"/>
+          </p:nvPr>
+        </p:nvSpPr>
+        <p:spPr/>
+        <p:txBody>
+          <a:bodyPr/>
+          <a:lstStyle/>
+          <a:p>
+            <a:endParaRPr lang="en-US"/>
+          </a:p>
+        </p:txBody>
+      </p:sp>
+      <p:sp>
+        <p:nvSpPr>
+          <p:cNvPr id="3" name="Text Placeholder 2"/>
+          <p:cNvSpPr>
+            <a:spLocks noGrp="1"/>
+          </p:cNvSpPr>
+          <p:nvPr>
+            <p:ph type="body" idx="1"/>
+          </p:nvPr>
+        </p:nvSpPr>
+        <p:spPr/>
+        <p:txBody>
+          <a:bodyPr/>
+          <a:lstStyle/>
+          <a:p>
+            <a:endParaRPr lang="en-US" dirty="0"/>
+          </a:p>
+        </p:txBody>
+      </p:sp>
+      <p:pic>
+        <p:nvPicPr>
+          <p:cNvPr id="4" name="Picture 3"/>
+          <p:cNvPicPr>
+            <a:picLocks noChangeAspect="1"/>
+          </p:cNvPicPr>
+          <p:nvPr/>
+        </p:nvPicPr>
+        <p:blipFill>
+          <a:blip r:embed="rId2"/>
+          <a:stretch>
+            <a:fillRect/>
+          </a:stretch>
+        </p:blipFill>
+        <p:spPr>
+          <a:xfrm>
+            <a:off x="2650737" y="87673"/>
+            <a:ext cx="3842526" cy="6682654"/>
+          </a:xfrm>
+          <a:prstGeom prst="rect">
+            <a:avLst/>
+          </a:prstGeom>
+        </p:spPr>
+      </p:pic>
+    </p:spTree>
+    <p:extLst>
+      <p:ext uri="{BB962C8B-B14F-4D97-AF65-F5344CB8AC3E}">
+        <p14:creationId xmlns:p14="http://schemas.microsoft.com/office/powerpoint/2010/main" val="2758202568"/>
+      </p:ext>
+    </p:extLst>
+  </p:cSld>
+  <p:clrMapOvr>
+    <a:masterClrMapping/>
+  </p:clrMapOvr>
+</p:sld>
+</file>
+
+<file path=ppt/slides/slide45.xml><?xml version="1.0" encoding="utf-8"?>
 <p:sld xmlns:a="http://schemas.openxmlformats.org/drawingml/2006/main" xmlns:r="http://schemas.openxmlformats.org/officeDocument/2006/relationships" xmlns:p="http://schemas.openxmlformats.org/presentationml/2006/main">
   <p:cSld>
     <p:spTree>

</xml_diff>

<commit_message>
updated dates on powerpoints
</commit_message>
<xml_diff>
--- a/2018/python/Python Programming Concepts II.pptx
+++ b/2018/python/Python Programming Concepts II.pptx
@@ -280,7 +280,7 @@
   </p:defaultTextStyle>
   <p:extLst>
     <p:ext uri="{EFAFB233-063F-42B5-8137-9DF3F51BA10A}">
-      <p15:sldGuideLst xmlns:p15="http://schemas.microsoft.com/office/powerpoint/2012/main" xmlns="">
+      <p15:sldGuideLst xmlns:p15="http://schemas.microsoft.com/office/powerpoint/2012/main">
         <p15:guide id="1" orient="horz" pos="2160">
           <p15:clr>
             <a:srgbClr val="A4A3A4"/>
@@ -4679,6 +4679,11 @@
         </p:txBody>
       </p:sp>
     </p:spTree>
+    <p:extLst>
+      <p:ext uri="{BB962C8B-B14F-4D97-AF65-F5344CB8AC3E}">
+        <p14:creationId xmlns:p14="http://schemas.microsoft.com/office/powerpoint/2010/main" val="1358397458"/>
+      </p:ext>
+    </p:extLst>
   </p:cSld>
   <p:clrMapOvr>
     <a:masterClrMapping/>
@@ -12170,7 +12175,7 @@
             </a:r>
             <a:r>
               <a:rPr lang="en-US" dirty="0"/>
-              <a:t>7</a:t>
+              <a:t>8</a:t>
             </a:r>
             <a:endParaRPr lang="en" dirty="0"/>
           </a:p>
@@ -12181,13 +12186,13 @@
   <p:clrMapOvr>
     <a:masterClrMapping/>
   </p:clrMapOvr>
-  <p:transition xmlns:p14="http://schemas.microsoft.com/office/powerpoint/2010/main" spd="slow">
+  <p:transition spd="slow">
     <p:cut/>
   </p:transition>
   <p:timing>
     <p:tnLst>
       <p:par>
-        <p:cTn xmlns:p14="http://schemas.microsoft.com/office/powerpoint/2010/main" id="1" dur="indefinite" restart="never" nodeType="tmRoot"/>
+        <p:cTn id="1" dur="indefinite" restart="never" nodeType="tmRoot"/>
       </p:par>
     </p:tnLst>
   </p:timing>
@@ -12527,13 +12532,13 @@
   <p:clrMapOvr>
     <a:masterClrMapping/>
   </p:clrMapOvr>
-  <p:transition xmlns:p14="http://schemas.microsoft.com/office/powerpoint/2010/main" spd="slow">
+  <p:transition spd="slow">
     <p:cut/>
   </p:transition>
   <p:timing>
     <p:tnLst>
       <p:par>
-        <p:cTn xmlns:p14="http://schemas.microsoft.com/office/powerpoint/2010/main" id="1" dur="indefinite" restart="never" nodeType="tmRoot"/>
+        <p:cTn id="1" dur="indefinite" restart="never" nodeType="tmRoot"/>
       </p:par>
     </p:tnLst>
   </p:timing>
@@ -12913,13 +12918,13 @@
   <p:clrMapOvr>
     <a:masterClrMapping/>
   </p:clrMapOvr>
-  <p:transition xmlns:p14="http://schemas.microsoft.com/office/powerpoint/2010/main" spd="slow">
+  <p:transition spd="slow">
     <p:cut/>
   </p:transition>
   <p:timing>
     <p:tnLst>
       <p:par>
-        <p:cTn xmlns:p14="http://schemas.microsoft.com/office/powerpoint/2010/main" id="1" dur="indefinite" restart="never" nodeType="tmRoot"/>
+        <p:cTn id="1" dur="indefinite" restart="never" nodeType="tmRoot"/>
       </p:par>
     </p:tnLst>
   </p:timing>
@@ -13387,13 +13392,13 @@
   <p:clrMapOvr>
     <a:masterClrMapping/>
   </p:clrMapOvr>
-  <p:transition xmlns:p14="http://schemas.microsoft.com/office/powerpoint/2010/main" spd="slow">
+  <p:transition spd="slow">
     <p:cut/>
   </p:transition>
   <p:timing>
     <p:tnLst>
       <p:par>
-        <p:cTn xmlns:p14="http://schemas.microsoft.com/office/powerpoint/2010/main" id="1" dur="indefinite" restart="never" nodeType="tmRoot"/>
+        <p:cTn id="1" dur="indefinite" restart="never" nodeType="tmRoot"/>
       </p:par>
     </p:tnLst>
   </p:timing>
@@ -13781,13 +13786,13 @@
   <p:clrMapOvr>
     <a:masterClrMapping/>
   </p:clrMapOvr>
-  <p:transition xmlns:p14="http://schemas.microsoft.com/office/powerpoint/2010/main" spd="slow">
+  <p:transition spd="slow">
     <p:cut/>
   </p:transition>
   <p:timing>
     <p:tnLst>
       <p:par>
-        <p:cTn xmlns:p14="http://schemas.microsoft.com/office/powerpoint/2010/main" id="1" dur="indefinite" restart="never" nodeType="tmRoot"/>
+        <p:cTn id="1" dur="indefinite" restart="never" nodeType="tmRoot"/>
       </p:par>
     </p:tnLst>
   </p:timing>
@@ -14173,13 +14178,13 @@
   <p:clrMapOvr>
     <a:masterClrMapping/>
   </p:clrMapOvr>
-  <p:transition xmlns:p14="http://schemas.microsoft.com/office/powerpoint/2010/main" spd="slow">
+  <p:transition spd="slow">
     <p:cut/>
   </p:transition>
   <p:timing>
     <p:tnLst>
       <p:par>
-        <p:cTn xmlns:p14="http://schemas.microsoft.com/office/powerpoint/2010/main" id="1" dur="indefinite" restart="never" nodeType="tmRoot"/>
+        <p:cTn id="1" dur="indefinite" restart="never" nodeType="tmRoot"/>
       </p:par>
     </p:tnLst>
   </p:timing>
@@ -14658,13 +14663,13 @@
   <p:clrMapOvr>
     <a:masterClrMapping/>
   </p:clrMapOvr>
-  <p:transition xmlns:p14="http://schemas.microsoft.com/office/powerpoint/2010/main" spd="slow">
+  <p:transition spd="slow">
     <p:cut/>
   </p:transition>
   <p:timing>
     <p:tnLst>
       <p:par>
-        <p:cTn xmlns:p14="http://schemas.microsoft.com/office/powerpoint/2010/main" id="1" dur="indefinite" restart="never" nodeType="tmRoot"/>
+        <p:cTn id="1" dur="indefinite" restart="never" nodeType="tmRoot"/>
       </p:par>
     </p:tnLst>
   </p:timing>
@@ -14859,13 +14864,13 @@
   <p:clrMapOvr>
     <a:masterClrMapping/>
   </p:clrMapOvr>
-  <p:transition xmlns:p14="http://schemas.microsoft.com/office/powerpoint/2010/main" spd="slow">
+  <p:transition spd="slow">
     <p:cut/>
   </p:transition>
   <p:timing>
     <p:tnLst>
       <p:par>
-        <p:cTn xmlns:p14="http://schemas.microsoft.com/office/powerpoint/2010/main" id="1" dur="indefinite" restart="never" nodeType="tmRoot"/>
+        <p:cTn id="1" dur="indefinite" restart="never" nodeType="tmRoot"/>
       </p:par>
     </p:tnLst>
   </p:timing>
@@ -15335,13 +15340,13 @@
   <p:clrMapOvr>
     <a:masterClrMapping/>
   </p:clrMapOvr>
-  <p:transition xmlns:p14="http://schemas.microsoft.com/office/powerpoint/2010/main" spd="slow">
+  <p:transition spd="slow">
     <p:cut/>
   </p:transition>
   <p:timing>
     <p:tnLst>
       <p:par>
-        <p:cTn xmlns:p14="http://schemas.microsoft.com/office/powerpoint/2010/main" id="1" dur="indefinite" restart="never" nodeType="tmRoot"/>
+        <p:cTn id="1" dur="indefinite" restart="never" nodeType="tmRoot"/>
       </p:par>
     </p:tnLst>
   </p:timing>
@@ -15605,13 +15610,13 @@
   <p:clrMapOvr>
     <a:overrideClrMapping bg1="lt1" tx1="dk1" bg2="dk2" tx2="lt2" accent1="accent1" accent2="accent2" accent3="accent3" accent4="accent4" accent5="accent5" accent6="accent6" hlink="hlink" folHlink="folHlink"/>
   </p:clrMapOvr>
-  <p:transition xmlns:p14="http://schemas.microsoft.com/office/powerpoint/2010/main" spd="slow">
+  <p:transition spd="slow">
     <p:cut/>
   </p:transition>
   <p:timing>
     <p:tnLst>
       <p:par>
-        <p:cTn xmlns:p14="http://schemas.microsoft.com/office/powerpoint/2010/main" id="1" dur="indefinite" restart="never" nodeType="tmRoot"/>
+        <p:cTn id="1" dur="indefinite" restart="never" nodeType="tmRoot"/>
       </p:par>
     </p:tnLst>
   </p:timing>
@@ -15950,13 +15955,13 @@
   <p:clrMapOvr>
     <a:masterClrMapping/>
   </p:clrMapOvr>
-  <p:transition xmlns:p14="http://schemas.microsoft.com/office/powerpoint/2010/main" spd="slow">
+  <p:transition spd="slow">
     <p:cut/>
   </p:transition>
   <p:timing>
     <p:tnLst>
       <p:par>
-        <p:cTn xmlns:p14="http://schemas.microsoft.com/office/powerpoint/2010/main" id="1" dur="indefinite" restart="never" nodeType="tmRoot"/>
+        <p:cTn id="1" dur="indefinite" restart="never" nodeType="tmRoot"/>
       </p:par>
     </p:tnLst>
   </p:timing>
@@ -16087,13 +16092,13 @@
   <p:clrMapOvr>
     <a:masterClrMapping/>
   </p:clrMapOvr>
-  <p:transition xmlns:p14="http://schemas.microsoft.com/office/powerpoint/2010/main" spd="slow">
+  <p:transition spd="slow">
     <p:cut/>
   </p:transition>
   <p:timing>
     <p:tnLst>
       <p:par>
-        <p:cTn xmlns:p14="http://schemas.microsoft.com/office/powerpoint/2010/main" id="1" dur="indefinite" restart="never" nodeType="tmRoot"/>
+        <p:cTn id="1" dur="indefinite" restart="never" nodeType="tmRoot"/>
       </p:par>
     </p:tnLst>
   </p:timing>
@@ -16312,13 +16317,13 @@
   <p:clrMapOvr>
     <a:masterClrMapping/>
   </p:clrMapOvr>
-  <p:transition xmlns:p14="http://schemas.microsoft.com/office/powerpoint/2010/main" spd="slow">
+  <p:transition spd="slow">
     <p:cut/>
   </p:transition>
   <p:timing>
     <p:tnLst>
       <p:par>
-        <p:cTn xmlns:p14="http://schemas.microsoft.com/office/powerpoint/2010/main" id="1" dur="indefinite" restart="never" nodeType="tmRoot"/>
+        <p:cTn id="1" dur="indefinite" restart="never" nodeType="tmRoot"/>
       </p:par>
     </p:tnLst>
   </p:timing>
@@ -16884,13 +16889,13 @@
   <p:clrMapOvr>
     <a:masterClrMapping/>
   </p:clrMapOvr>
-  <p:transition xmlns:p14="http://schemas.microsoft.com/office/powerpoint/2010/main" spd="slow">
+  <p:transition spd="slow">
     <p:cut/>
   </p:transition>
   <p:timing>
     <p:tnLst>
       <p:par>
-        <p:cTn xmlns:p14="http://schemas.microsoft.com/office/powerpoint/2010/main" id="1" dur="indefinite" restart="never" nodeType="tmRoot"/>
+        <p:cTn id="1" dur="indefinite" restart="never" nodeType="tmRoot"/>
       </p:par>
     </p:tnLst>
   </p:timing>
@@ -17830,13 +17835,13 @@
   <p:clrMapOvr>
     <a:masterClrMapping/>
   </p:clrMapOvr>
-  <p:transition xmlns:p14="http://schemas.microsoft.com/office/powerpoint/2010/main" spd="slow">
+  <p:transition spd="slow">
     <p:cut/>
   </p:transition>
   <p:timing>
     <p:tnLst>
       <p:par>
-        <p:cTn xmlns:p14="http://schemas.microsoft.com/office/powerpoint/2010/main" id="1" dur="indefinite" restart="never" nodeType="tmRoot"/>
+        <p:cTn id="1" dur="indefinite" restart="never" nodeType="tmRoot"/>
       </p:par>
     </p:tnLst>
   </p:timing>
@@ -18320,13 +18325,13 @@
   <p:clrMapOvr>
     <a:masterClrMapping/>
   </p:clrMapOvr>
-  <p:transition xmlns:p14="http://schemas.microsoft.com/office/powerpoint/2010/main" spd="slow">
+  <p:transition spd="slow">
     <p:cut/>
   </p:transition>
   <p:timing>
     <p:tnLst>
       <p:par>
-        <p:cTn xmlns:p14="http://schemas.microsoft.com/office/powerpoint/2010/main" id="1" dur="indefinite" restart="never" nodeType="tmRoot"/>
+        <p:cTn id="1" dur="indefinite" restart="never" nodeType="tmRoot"/>
       </p:par>
     </p:tnLst>
   </p:timing>
@@ -18943,13 +18948,13 @@
   <p:clrMapOvr>
     <a:masterClrMapping/>
   </p:clrMapOvr>
-  <p:transition xmlns:p14="http://schemas.microsoft.com/office/powerpoint/2010/main" spd="slow">
+  <p:transition spd="slow">
     <p:cut/>
   </p:transition>
   <p:timing>
     <p:tnLst>
       <p:par>
-        <p:cTn xmlns:p14="http://schemas.microsoft.com/office/powerpoint/2010/main" id="1" dur="indefinite" restart="never" nodeType="tmRoot"/>
+        <p:cTn id="1" dur="indefinite" restart="never" nodeType="tmRoot"/>
       </p:par>
     </p:tnLst>
   </p:timing>
@@ -19894,13 +19899,13 @@
   <p:clrMapOvr>
     <a:masterClrMapping/>
   </p:clrMapOvr>
-  <p:transition xmlns:p14="http://schemas.microsoft.com/office/powerpoint/2010/main" spd="slow">
+  <p:transition spd="slow">
     <p:cut/>
   </p:transition>
   <p:timing>
     <p:tnLst>
       <p:par>
-        <p:cTn xmlns:p14="http://schemas.microsoft.com/office/powerpoint/2010/main" id="1" dur="indefinite" restart="never" nodeType="tmRoot"/>
+        <p:cTn id="1" dur="indefinite" restart="never" nodeType="tmRoot"/>
       </p:par>
     </p:tnLst>
   </p:timing>
@@ -20632,13 +20637,13 @@
   <p:clrMapOvr>
     <a:masterClrMapping/>
   </p:clrMapOvr>
-  <p:transition xmlns:p14="http://schemas.microsoft.com/office/powerpoint/2010/main" spd="slow">
+  <p:transition spd="slow">
     <p:cut/>
   </p:transition>
   <p:timing>
     <p:tnLst>
       <p:par>
-        <p:cTn xmlns:p14="http://schemas.microsoft.com/office/powerpoint/2010/main" id="1" dur="indefinite" restart="never" nodeType="tmRoot"/>
+        <p:cTn id="1" dur="indefinite" restart="never" nodeType="tmRoot"/>
       </p:par>
     </p:tnLst>
   </p:timing>
@@ -21185,13 +21190,13 @@
   <p:clrMapOvr>
     <a:masterClrMapping/>
   </p:clrMapOvr>
-  <p:transition xmlns:p14="http://schemas.microsoft.com/office/powerpoint/2010/main" spd="slow">
+  <p:transition spd="slow">
     <p:cut/>
   </p:transition>
   <p:timing>
     <p:tnLst>
       <p:par>
-        <p:cTn xmlns:p14="http://schemas.microsoft.com/office/powerpoint/2010/main" id="1" dur="indefinite" restart="never" nodeType="tmRoot"/>
+        <p:cTn id="1" dur="indefinite" restart="never" nodeType="tmRoot"/>
       </p:par>
     </p:tnLst>
   </p:timing>
@@ -21686,13 +21691,13 @@
   <p:clrMapOvr>
     <a:masterClrMapping/>
   </p:clrMapOvr>
-  <p:transition xmlns:p14="http://schemas.microsoft.com/office/powerpoint/2010/main" spd="slow">
+  <p:transition spd="slow">
     <p:cut/>
   </p:transition>
   <p:timing>
     <p:tnLst>
       <p:par>
-        <p:cTn xmlns:p14="http://schemas.microsoft.com/office/powerpoint/2010/main" id="1" dur="indefinite" restart="never" nodeType="tmRoot"/>
+        <p:cTn id="1" dur="indefinite" restart="never" nodeType="tmRoot"/>
       </p:par>
     </p:tnLst>
   </p:timing>
@@ -22782,13 +22787,13 @@
   <p:clrMapOvr>
     <a:masterClrMapping/>
   </p:clrMapOvr>
-  <p:transition xmlns:p14="http://schemas.microsoft.com/office/powerpoint/2010/main" spd="slow">
+  <p:transition spd="slow">
     <p:cut/>
   </p:transition>
   <p:timing>
     <p:tnLst>
       <p:par>
-        <p:cTn xmlns:p14="http://schemas.microsoft.com/office/powerpoint/2010/main" id="1" dur="indefinite" restart="never" nodeType="tmRoot"/>
+        <p:cTn id="1" dur="indefinite" restart="never" nodeType="tmRoot"/>
       </p:par>
     </p:tnLst>
   </p:timing>
@@ -23758,13 +23763,13 @@
   <p:clrMapOvr>
     <a:masterClrMapping/>
   </p:clrMapOvr>
-  <p:transition xmlns:p14="http://schemas.microsoft.com/office/powerpoint/2010/main" spd="slow">
+  <p:transition spd="slow">
     <p:cut/>
   </p:transition>
   <p:timing>
     <p:tnLst>
       <p:par>
-        <p:cTn xmlns:p14="http://schemas.microsoft.com/office/powerpoint/2010/main" id="1" dur="indefinite" restart="never" nodeType="tmRoot"/>
+        <p:cTn id="1" dur="indefinite" restart="never" nodeType="tmRoot"/>
       </p:par>
     </p:tnLst>
   </p:timing>
@@ -24045,13 +24050,13 @@
   <p:clrMapOvr>
     <a:masterClrMapping/>
   </p:clrMapOvr>
-  <p:transition xmlns:p14="http://schemas.microsoft.com/office/powerpoint/2010/main" spd="slow">
+  <p:transition spd="slow">
     <p:cut/>
   </p:transition>
   <p:timing>
     <p:tnLst>
       <p:par>
-        <p:cTn xmlns:p14="http://schemas.microsoft.com/office/powerpoint/2010/main" id="1" dur="indefinite" restart="never" nodeType="tmRoot"/>
+        <p:cTn id="1" dur="indefinite" restart="never" nodeType="tmRoot"/>
       </p:par>
     </p:tnLst>
   </p:timing>
@@ -24356,13 +24361,13 @@
   <p:clrMapOvr>
     <a:masterClrMapping/>
   </p:clrMapOvr>
-  <p:transition xmlns:p14="http://schemas.microsoft.com/office/powerpoint/2010/main" spd="slow">
+  <p:transition spd="slow">
     <p:cut/>
   </p:transition>
   <p:timing>
     <p:tnLst>
       <p:par>
-        <p:cTn xmlns:p14="http://schemas.microsoft.com/office/powerpoint/2010/main" id="1" dur="indefinite" restart="never" nodeType="tmRoot"/>
+        <p:cTn id="1" dur="indefinite" restart="never" nodeType="tmRoot"/>
       </p:par>
     </p:tnLst>
   </p:timing>
@@ -24850,13 +24855,13 @@
   <p:clrMapOvr>
     <a:masterClrMapping/>
   </p:clrMapOvr>
-  <p:transition xmlns:p14="http://schemas.microsoft.com/office/powerpoint/2010/main" spd="slow">
+  <p:transition spd="slow">
     <p:cut/>
   </p:transition>
   <p:timing>
     <p:tnLst>
       <p:par>
-        <p:cTn xmlns:p14="http://schemas.microsoft.com/office/powerpoint/2010/main" id="1" dur="indefinite" restart="never" nodeType="tmRoot"/>
+        <p:cTn id="1" dur="indefinite" restart="never" nodeType="tmRoot"/>
       </p:par>
     </p:tnLst>
   </p:timing>
@@ -25053,13 +25058,13 @@
   <p:clrMapOvr>
     <a:masterClrMapping/>
   </p:clrMapOvr>
-  <p:transition xmlns:p14="http://schemas.microsoft.com/office/powerpoint/2010/main" spd="slow">
+  <p:transition spd="slow">
     <p:cut/>
   </p:transition>
   <p:timing>
     <p:tnLst>
       <p:par>
-        <p:cTn xmlns:p14="http://schemas.microsoft.com/office/powerpoint/2010/main" id="1" dur="indefinite" restart="never" nodeType="tmRoot"/>
+        <p:cTn id="1" dur="indefinite" restart="never" nodeType="tmRoot"/>
       </p:par>
     </p:tnLst>
   </p:timing>
@@ -25313,13 +25318,13 @@
   <p:clrMapOvr>
     <a:masterClrMapping/>
   </p:clrMapOvr>
-  <p:transition xmlns:p14="http://schemas.microsoft.com/office/powerpoint/2010/main" spd="slow">
+  <p:transition spd="slow">
     <p:cut/>
   </p:transition>
   <p:timing>
     <p:tnLst>
       <p:par>
-        <p:cTn xmlns:p14="http://schemas.microsoft.com/office/powerpoint/2010/main" id="1" dur="indefinite" restart="never" nodeType="tmRoot"/>
+        <p:cTn id="1" dur="indefinite" restart="never" nodeType="tmRoot"/>
       </p:par>
     </p:tnLst>
   </p:timing>
@@ -25568,13 +25573,13 @@
   <p:clrMapOvr>
     <a:masterClrMapping/>
   </p:clrMapOvr>
-  <p:transition xmlns:p14="http://schemas.microsoft.com/office/powerpoint/2010/main" spd="slow">
+  <p:transition spd="slow">
     <p:cut/>
   </p:transition>
   <p:timing>
     <p:tnLst>
       <p:par>
-        <p:cTn xmlns:p14="http://schemas.microsoft.com/office/powerpoint/2010/main" id="1" dur="indefinite" restart="never" nodeType="tmRoot"/>
+        <p:cTn id="1" dur="indefinite" restart="never" nodeType="tmRoot"/>
       </p:par>
     </p:tnLst>
   </p:timing>
@@ -25812,13 +25817,13 @@
   <p:clrMapOvr>
     <a:masterClrMapping/>
   </p:clrMapOvr>
-  <p:transition xmlns:p14="http://schemas.microsoft.com/office/powerpoint/2010/main" spd="slow">
+  <p:transition spd="slow">
     <p:cut/>
   </p:transition>
   <p:timing>
     <p:tnLst>
       <p:par>
-        <p:cTn xmlns:p14="http://schemas.microsoft.com/office/powerpoint/2010/main" id="1" dur="indefinite" restart="never" nodeType="tmRoot"/>
+        <p:cTn id="1" dur="indefinite" restart="never" nodeType="tmRoot"/>
       </p:par>
     </p:tnLst>
   </p:timing>
@@ -26056,13 +26061,13 @@
   <p:clrMapOvr>
     <a:masterClrMapping/>
   </p:clrMapOvr>
-  <p:transition xmlns:p14="http://schemas.microsoft.com/office/powerpoint/2010/main" spd="slow">
+  <p:transition spd="slow">
     <p:cut/>
   </p:transition>
   <p:timing>
     <p:tnLst>
       <p:par>
-        <p:cTn xmlns:p14="http://schemas.microsoft.com/office/powerpoint/2010/main" id="1" dur="indefinite" restart="never" nodeType="tmRoot"/>
+        <p:cTn id="1" dur="indefinite" restart="never" nodeType="tmRoot"/>
       </p:par>
     </p:tnLst>
   </p:timing>
@@ -26417,13 +26422,13 @@
   <p:clrMapOvr>
     <a:masterClrMapping/>
   </p:clrMapOvr>
-  <p:transition xmlns:p14="http://schemas.microsoft.com/office/powerpoint/2010/main" spd="slow">
+  <p:transition spd="slow">
     <p:cut/>
   </p:transition>
   <p:timing>
     <p:tnLst>
       <p:par>
-        <p:cTn xmlns:p14="http://schemas.microsoft.com/office/powerpoint/2010/main" id="1" dur="indefinite" restart="never" nodeType="tmRoot"/>
+        <p:cTn id="1" dur="indefinite" restart="never" nodeType="tmRoot"/>
       </p:par>
     </p:tnLst>
   </p:timing>
@@ -27018,13 +27023,13 @@
   <p:clrMapOvr>
     <a:masterClrMapping/>
   </p:clrMapOvr>
-  <p:transition xmlns:p14="http://schemas.microsoft.com/office/powerpoint/2010/main" spd="slow">
+  <p:transition spd="slow">
     <p:cut/>
   </p:transition>
   <p:timing>
     <p:tnLst>
       <p:par>
-        <p:cTn xmlns:p14="http://schemas.microsoft.com/office/powerpoint/2010/main" id="1" dur="indefinite" restart="never" nodeType="tmRoot"/>
+        <p:cTn id="1" dur="indefinite" restart="never" nodeType="tmRoot"/>
       </p:par>
     </p:tnLst>
   </p:timing>
@@ -27352,13 +27357,13 @@
   <p:clrMapOvr>
     <a:masterClrMapping/>
   </p:clrMapOvr>
-  <p:transition xmlns:p14="http://schemas.microsoft.com/office/powerpoint/2010/main" spd="slow">
+  <p:transition spd="slow">
     <p:cut/>
   </p:transition>
   <p:timing>
     <p:tnLst>
       <p:par>
-        <p:cTn xmlns:p14="http://schemas.microsoft.com/office/powerpoint/2010/main" id="1" dur="indefinite" restart="never" nodeType="tmRoot"/>
+        <p:cTn id="1" dur="indefinite" restart="never" nodeType="tmRoot"/>
       </p:par>
     </p:tnLst>
   </p:timing>
@@ -28078,13 +28083,13 @@
   <p:clrMapOvr>
     <a:masterClrMapping/>
   </p:clrMapOvr>
-  <p:transition xmlns:p14="http://schemas.microsoft.com/office/powerpoint/2010/main" spd="slow">
+  <p:transition spd="slow">
     <p:cut/>
   </p:transition>
   <p:timing>
     <p:tnLst>
       <p:par>
-        <p:cTn xmlns:p14="http://schemas.microsoft.com/office/powerpoint/2010/main" id="1" dur="indefinite" restart="never" nodeType="tmRoot"/>
+        <p:cTn id="1" dur="indefinite" restart="never" nodeType="tmRoot"/>
       </p:par>
     </p:tnLst>
   </p:timing>
@@ -28285,13 +28290,13 @@
   <p:clrMapOvr>
     <a:masterClrMapping/>
   </p:clrMapOvr>
-  <p:transition xmlns:p14="http://schemas.microsoft.com/office/powerpoint/2010/main" spd="slow">
+  <p:transition spd="slow">
     <p:cut/>
   </p:transition>
   <p:timing>
     <p:tnLst>
       <p:par>
-        <p:cTn xmlns:p14="http://schemas.microsoft.com/office/powerpoint/2010/main" id="1" dur="indefinite" restart="never" nodeType="tmRoot"/>
+        <p:cTn id="1" dur="indefinite" restart="never" nodeType="tmRoot"/>
       </p:par>
     </p:tnLst>
   </p:timing>
@@ -28636,13 +28641,13 @@
   <p:clrMapOvr>
     <a:masterClrMapping/>
   </p:clrMapOvr>
-  <p:transition xmlns:p14="http://schemas.microsoft.com/office/powerpoint/2010/main" spd="slow">
+  <p:transition spd="slow">
     <p:cut/>
   </p:transition>
   <p:timing>
     <p:tnLst>
       <p:par>
-        <p:cTn xmlns:p14="http://schemas.microsoft.com/office/powerpoint/2010/main" id="1" dur="indefinite" restart="never" nodeType="tmRoot"/>
+        <p:cTn id="1" dur="indefinite" restart="never" nodeType="tmRoot"/>
       </p:par>
     </p:tnLst>
   </p:timing>
@@ -29321,13 +29326,13 @@
   <p:clrMapOvr>
     <a:masterClrMapping/>
   </p:clrMapOvr>
-  <p:transition xmlns:p14="http://schemas.microsoft.com/office/powerpoint/2010/main" spd="slow">
+  <p:transition spd="slow">
     <p:cut/>
   </p:transition>
   <p:timing>
     <p:tnLst>
       <p:par>
-        <p:cTn xmlns:p14="http://schemas.microsoft.com/office/powerpoint/2010/main" id="1" dur="indefinite" restart="never" nodeType="tmRoot"/>
+        <p:cTn id="1" dur="indefinite" restart="never" nodeType="tmRoot"/>
       </p:par>
     </p:tnLst>
   </p:timing>
@@ -29633,13 +29638,13 @@
   <p:clrMapOvr>
     <a:masterClrMapping/>
   </p:clrMapOvr>
-  <p:transition xmlns:p14="http://schemas.microsoft.com/office/powerpoint/2010/main" spd="slow">
+  <p:transition spd="slow">
     <p:cut/>
   </p:transition>
   <p:timing>
     <p:tnLst>
       <p:par>
-        <p:cTn xmlns:p14="http://schemas.microsoft.com/office/powerpoint/2010/main" id="1" dur="indefinite" restart="never" nodeType="tmRoot"/>
+        <p:cTn id="1" dur="indefinite" restart="never" nodeType="tmRoot"/>
       </p:par>
     </p:tnLst>
   </p:timing>
@@ -30367,13 +30372,13 @@
   <p:clrMapOvr>
     <a:masterClrMapping/>
   </p:clrMapOvr>
-  <p:transition xmlns:p14="http://schemas.microsoft.com/office/powerpoint/2010/main" spd="slow">
+  <p:transition spd="slow">
     <p:cut/>
   </p:transition>
   <p:timing>
     <p:tnLst>
       <p:par>
-        <p:cTn xmlns:p14="http://schemas.microsoft.com/office/powerpoint/2010/main" id="1" dur="indefinite" restart="never" nodeType="tmRoot"/>
+        <p:cTn id="1" dur="indefinite" restart="never" nodeType="tmRoot"/>
       </p:par>
     </p:tnLst>
   </p:timing>
@@ -31133,13 +31138,13 @@
   <p:clrMapOvr>
     <a:masterClrMapping/>
   </p:clrMapOvr>
-  <p:transition xmlns:p14="http://schemas.microsoft.com/office/powerpoint/2010/main" spd="slow">
+  <p:transition spd="slow">
     <p:cut/>
   </p:transition>
   <p:timing>
     <p:tnLst>
       <p:par>
-        <p:cTn xmlns:p14="http://schemas.microsoft.com/office/powerpoint/2010/main" id="1" dur="indefinite" restart="never" nodeType="tmRoot"/>
+        <p:cTn id="1" dur="indefinite" restart="never" nodeType="tmRoot"/>
       </p:par>
     </p:tnLst>
   </p:timing>
@@ -31621,13 +31626,13 @@
   <p:clrMapOvr>
     <a:masterClrMapping/>
   </p:clrMapOvr>
-  <p:transition xmlns:p14="http://schemas.microsoft.com/office/powerpoint/2010/main" spd="slow">
+  <p:transition spd="slow">
     <p:cut/>
   </p:transition>
   <p:timing>
     <p:tnLst>
       <p:par>
-        <p:cTn xmlns:p14="http://schemas.microsoft.com/office/powerpoint/2010/main" id="1" dur="indefinite" restart="never" nodeType="tmRoot"/>
+        <p:cTn id="1" dur="indefinite" restart="never" nodeType="tmRoot"/>
       </p:par>
     </p:tnLst>
   </p:timing>
@@ -31972,13 +31977,13 @@
   <p:clrMapOvr>
     <a:masterClrMapping/>
   </p:clrMapOvr>
-  <p:transition xmlns:p14="http://schemas.microsoft.com/office/powerpoint/2010/main" spd="slow">
+  <p:transition spd="slow">
     <p:cut/>
   </p:transition>
   <p:timing>
     <p:tnLst>
       <p:par>
-        <p:cTn xmlns:p14="http://schemas.microsoft.com/office/powerpoint/2010/main" id="1" dur="indefinite" restart="never" nodeType="tmRoot"/>
+        <p:cTn id="1" dur="indefinite" restart="never" nodeType="tmRoot"/>
       </p:par>
     </p:tnLst>
   </p:timing>
@@ -32695,7 +32700,7 @@
   <p:clrMapOvr>
     <a:masterClrMapping/>
   </p:clrMapOvr>
-  <p:transition xmlns:p14="http://schemas.microsoft.com/office/powerpoint/2010/main" spd="slow">
+  <p:transition spd="slow">
     <p:cut/>
   </p:transition>
 </p:sld>
@@ -33014,7 +33019,7 @@
   <p:clrMapOvr>
     <a:masterClrMapping/>
   </p:clrMapOvr>
-  <p:transition xmlns:p14="http://schemas.microsoft.com/office/powerpoint/2010/main" spd="slow">
+  <p:transition spd="slow">
     <p:cut/>
   </p:transition>
 </p:sld>
@@ -33178,7 +33183,7 @@
   <p:clrMapOvr>
     <a:masterClrMapping/>
   </p:clrMapOvr>
-  <p:transition xmlns:p14="http://schemas.microsoft.com/office/powerpoint/2010/main" spd="slow">
+  <p:transition spd="slow">
     <p:cut/>
   </p:transition>
 </p:sld>
@@ -33488,13 +33493,13 @@
   <p:clrMapOvr>
     <a:masterClrMapping/>
   </p:clrMapOvr>
-  <p:transition xmlns:p14="http://schemas.microsoft.com/office/powerpoint/2010/main" spd="slow">
+  <p:transition spd="slow">
     <p:cut/>
   </p:transition>
   <p:timing>
     <p:tnLst>
       <p:par>
-        <p:cTn xmlns:p14="http://schemas.microsoft.com/office/powerpoint/2010/main" id="1" dur="indefinite" restart="never" nodeType="tmRoot"/>
+        <p:cTn id="1" dur="indefinite" restart="never" nodeType="tmRoot"/>
       </p:par>
     </p:tnLst>
   </p:timing>
@@ -33924,13 +33929,13 @@
   <p:clrMapOvr>
     <a:masterClrMapping/>
   </p:clrMapOvr>
-  <p:transition xmlns:p14="http://schemas.microsoft.com/office/powerpoint/2010/main" spd="slow">
+  <p:transition spd="slow">
     <p:cut/>
   </p:transition>
   <p:timing>
     <p:tnLst>
       <p:par>
-        <p:cTn xmlns:p14="http://schemas.microsoft.com/office/powerpoint/2010/main" id="1" dur="indefinite" restart="never" nodeType="tmRoot"/>
+        <p:cTn id="1" dur="indefinite" restart="never" nodeType="tmRoot"/>
       </p:par>
     </p:tnLst>
   </p:timing>
@@ -34476,13 +34481,13 @@
   <p:clrMapOvr>
     <a:masterClrMapping/>
   </p:clrMapOvr>
-  <p:transition xmlns:p14="http://schemas.microsoft.com/office/powerpoint/2010/main" spd="slow">
+  <p:transition spd="slow">
     <p:cut/>
   </p:transition>
   <p:timing>
     <p:tnLst>
       <p:par>
-        <p:cTn xmlns:p14="http://schemas.microsoft.com/office/powerpoint/2010/main" id="1" dur="indefinite" restart="never" nodeType="tmRoot"/>
+        <p:cTn id="1" dur="indefinite" restart="never" nodeType="tmRoot"/>
       </p:par>
     </p:tnLst>
   </p:timing>
@@ -34793,13 +34798,13 @@
   <p:clrMapOvr>
     <a:masterClrMapping/>
   </p:clrMapOvr>
-  <p:transition xmlns:p14="http://schemas.microsoft.com/office/powerpoint/2010/main" spd="slow">
+  <p:transition spd="slow">
     <p:cut/>
   </p:transition>
   <p:timing>
     <p:tnLst>
       <p:par>
-        <p:cTn xmlns:p14="http://schemas.microsoft.com/office/powerpoint/2010/main" id="1" dur="indefinite" restart="never" nodeType="tmRoot"/>
+        <p:cTn id="1" dur="indefinite" restart="never" nodeType="tmRoot"/>
       </p:par>
     </p:tnLst>
   </p:timing>

</xml_diff>